<commit_message>
Añadir concepto de vision y mision de la empresa
</commit_message>
<xml_diff>
--- a/Presentacion - Exposicion.pptx
+++ b/Presentacion - Exposicion.pptx
@@ -12,10 +12,11 @@
     <p:sldId id="262" r:id="rId6"/>
     <p:sldId id="265" r:id="rId7"/>
     <p:sldId id="266" r:id="rId8"/>
-    <p:sldId id="261" r:id="rId9"/>
-    <p:sldId id="263" r:id="rId10"/>
-    <p:sldId id="260" r:id="rId11"/>
-    <p:sldId id="259" r:id="rId12"/>
+    <p:sldId id="267" r:id="rId9"/>
+    <p:sldId id="261" r:id="rId10"/>
+    <p:sldId id="263" r:id="rId11"/>
+    <p:sldId id="260" r:id="rId12"/>
+    <p:sldId id="259" r:id="rId13"/>
   </p:sldIdLst>
   <p:sldSz cx="12192000" cy="6858000"/>
   <p:notesSz cx="6858000" cy="9144000"/>
@@ -114,6 +115,11 @@
       </a:defRPr>
     </a:lvl9pPr>
   </p:defaultTextStyle>
+  <p:extLst>
+    <p:ext uri="{EFAFB233-063F-42B5-8137-9DF3F51BA10A}">
+      <p15:sldGuideLst xmlns:p15="http://schemas.microsoft.com/office/powerpoint/2012/main"/>
+    </p:ext>
+  </p:extLst>
 </p:presentation>
 </file>
 
@@ -3440,6 +3446,99 @@
           <a:p>
             <a:r>
               <a:rPr lang="es-BO" b="1" dirty="0"/>
+              <a:t>4.	LIDERAZGO</a:t>
+            </a:r>
+          </a:p>
+        </p:txBody>
+      </p:sp>
+      <p:sp>
+        <p:nvSpPr>
+          <p:cNvPr id="3" name="Marcador de contenido 2">
+            <a:extLst>
+              <a:ext uri="{FF2B5EF4-FFF2-40B4-BE49-F238E27FC236}">
+                <a16:creationId xmlns:a16="http://schemas.microsoft.com/office/drawing/2014/main" id="{A03F4793-332F-447C-FEBA-8C99D67BE98B}"/>
+              </a:ext>
+            </a:extLst>
+          </p:cNvPr>
+          <p:cNvSpPr>
+            <a:spLocks noGrp="1"/>
+          </p:cNvSpPr>
+          <p:nvPr>
+            <p:ph idx="1"/>
+          </p:nvPr>
+        </p:nvSpPr>
+        <p:spPr>
+          <a:xfrm>
+            <a:off x="994117" y="1941342"/>
+            <a:ext cx="10203766" cy="3798685"/>
+          </a:xfrm>
+        </p:spPr>
+        <p:txBody>
+          <a:bodyPr/>
+          <a:lstStyle/>
+          <a:p>
+            <a:endParaRPr lang="es-BO" dirty="0"/>
+          </a:p>
+        </p:txBody>
+      </p:sp>
+    </p:spTree>
+    <p:extLst>
+      <p:ext uri="{BB962C8B-B14F-4D97-AF65-F5344CB8AC3E}">
+        <p14:creationId xmlns:p14="http://schemas.microsoft.com/office/powerpoint/2010/main" val="2951684488"/>
+      </p:ext>
+    </p:extLst>
+  </p:cSld>
+  <p:clrMapOvr>
+    <a:masterClrMapping/>
+  </p:clrMapOvr>
+</p:sld>
+</file>
+
+<file path=ppt/slides/slide11.xml><?xml version="1.0" encoding="utf-8"?>
+<p:sld xmlns:a="http://schemas.openxmlformats.org/drawingml/2006/main" xmlns:r="http://schemas.openxmlformats.org/officeDocument/2006/relationships" xmlns:p="http://schemas.openxmlformats.org/presentationml/2006/main">
+  <p:cSld>
+    <p:spTree>
+      <p:nvGrpSpPr>
+        <p:cNvPr id="1" name=""/>
+        <p:cNvGrpSpPr/>
+        <p:nvPr/>
+      </p:nvGrpSpPr>
+      <p:grpSpPr>
+        <a:xfrm>
+          <a:off x="0" y="0"/>
+          <a:ext cx="0" cy="0"/>
+          <a:chOff x="0" y="0"/>
+          <a:chExt cx="0" cy="0"/>
+        </a:xfrm>
+      </p:grpSpPr>
+      <p:sp>
+        <p:nvSpPr>
+          <p:cNvPr id="2" name="Título 1">
+            <a:extLst>
+              <a:ext uri="{FF2B5EF4-FFF2-40B4-BE49-F238E27FC236}">
+                <a16:creationId xmlns:a16="http://schemas.microsoft.com/office/drawing/2014/main" id="{E28CA087-FA30-60BE-45DB-5FAAAEE20665}"/>
+              </a:ext>
+            </a:extLst>
+          </p:cNvPr>
+          <p:cNvSpPr>
+            <a:spLocks noGrp="1"/>
+          </p:cNvSpPr>
+          <p:nvPr>
+            <p:ph type="title"/>
+          </p:nvPr>
+        </p:nvSpPr>
+        <p:spPr>
+          <a:xfrm>
+            <a:off x="994117" y="964692"/>
+            <a:ext cx="10203766" cy="793770"/>
+          </a:xfrm>
+        </p:spPr>
+        <p:txBody>
+          <a:bodyPr/>
+          <a:lstStyle/>
+          <a:p>
+            <a:r>
+              <a:rPr lang="es-BO" b="1" dirty="0"/>
               <a:t>5.	CONTROL</a:t>
             </a:r>
           </a:p>
@@ -3488,7 +3587,7 @@
 </p:sld>
 </file>
 
-<file path=ppt/slides/slide11.xml><?xml version="1.0" encoding="utf-8"?>
+<file path=ppt/slides/slide12.xml><?xml version="1.0" encoding="utf-8"?>
 <p:sld xmlns:a="http://schemas.openxmlformats.org/drawingml/2006/main" xmlns:r="http://schemas.openxmlformats.org/officeDocument/2006/relationships" xmlns:p="http://schemas.openxmlformats.org/presentationml/2006/main">
   <p:cSld>
     <p:spTree>
@@ -5121,15 +5220,382 @@
             <p:ph idx="1"/>
           </p:nvPr>
         </p:nvSpPr>
-        <p:spPr/>
-        <p:txBody>
-          <a:bodyPr/>
-          <a:lstStyle/>
-          <a:p>
-            <a:endParaRPr lang="es-BO"/>
-          </a:p>
-        </p:txBody>
-      </p:sp>
+        <p:spPr>
+          <a:xfrm>
+            <a:off x="994117" y="2001939"/>
+            <a:ext cx="5234405" cy="2461495"/>
+          </a:xfrm>
+        </p:spPr>
+        <p:txBody>
+          <a:bodyPr>
+            <a:normAutofit/>
+          </a:bodyPr>
+          <a:lstStyle/>
+          <a:p>
+            <a:pPr marL="0" indent="0">
+              <a:buNone/>
+            </a:pPr>
+            <a:r>
+              <a:rPr lang="es-BO" dirty="0"/>
+              <a:t>La misión de una empresa se refiere a la declaración que describe el propósito fundamental y la razón de ser de la organización. Es una breve pero significativa descripción de lo que la empresa hace, a quién sirve y cómo lo hace. La misión proporciona una orientación clara sobre el enfoque y los objetivos principales de la empresa en su día a día.</a:t>
+            </a:r>
+          </a:p>
+        </p:txBody>
+      </p:sp>
+      <p:pic>
+        <p:nvPicPr>
+          <p:cNvPr id="4" name="Imagen 3">
+            <a:extLst>
+              <a:ext uri="{FF2B5EF4-FFF2-40B4-BE49-F238E27FC236}">
+                <a16:creationId xmlns:a16="http://schemas.microsoft.com/office/drawing/2014/main" id="{90882D80-4D80-0E17-0C00-01CC421AAA26}"/>
+              </a:ext>
+            </a:extLst>
+          </p:cNvPr>
+          <p:cNvPicPr>
+            <a:picLocks noChangeAspect="1"/>
+          </p:cNvPicPr>
+          <p:nvPr/>
+        </p:nvPicPr>
+        <p:blipFill>
+          <a:blip r:embed="rId2"/>
+          <a:stretch>
+            <a:fillRect/>
+          </a:stretch>
+        </p:blipFill>
+        <p:spPr>
+          <a:xfrm>
+            <a:off x="7042125" y="2014347"/>
+            <a:ext cx="4155758" cy="2064973"/>
+          </a:xfrm>
+          <a:prstGeom prst="rect">
+            <a:avLst/>
+          </a:prstGeom>
+        </p:spPr>
+      </p:pic>
+      <p:sp>
+        <p:nvSpPr>
+          <p:cNvPr id="5" name="CuadroTexto 4">
+            <a:extLst>
+              <a:ext uri="{FF2B5EF4-FFF2-40B4-BE49-F238E27FC236}">
+                <a16:creationId xmlns:a16="http://schemas.microsoft.com/office/drawing/2014/main" id="{17580752-A3EE-38EA-BD26-0F253C55B7FE}"/>
+              </a:ext>
+            </a:extLst>
+          </p:cNvPr>
+          <p:cNvSpPr txBox="1"/>
+          <p:nvPr/>
+        </p:nvSpPr>
+        <p:spPr>
+          <a:xfrm>
+            <a:off x="7434470" y="4863548"/>
+            <a:ext cx="184731" cy="369332"/>
+          </a:xfrm>
+          <a:prstGeom prst="rect">
+            <a:avLst/>
+          </a:prstGeom>
+          <a:noFill/>
+        </p:spPr>
+        <p:txBody>
+          <a:bodyPr wrap="none" rtlCol="0">
+            <a:spAutoFit/>
+          </a:bodyPr>
+          <a:lstStyle/>
+          <a:p>
+            <a:endParaRPr lang="es-BO" dirty="0"/>
+          </a:p>
+        </p:txBody>
+      </p:sp>
+      <p:sp>
+        <p:nvSpPr>
+          <p:cNvPr id="9" name="Marcador de contenido 5">
+            <a:extLst>
+              <a:ext uri="{FF2B5EF4-FFF2-40B4-BE49-F238E27FC236}">
+                <a16:creationId xmlns:a16="http://schemas.microsoft.com/office/drawing/2014/main" id="{4A3E3E6A-0E44-3982-8693-C96E9DC78352}"/>
+              </a:ext>
+            </a:extLst>
+          </p:cNvPr>
+          <p:cNvSpPr txBox="1">
+            <a:spLocks/>
+          </p:cNvSpPr>
+          <p:nvPr/>
+        </p:nvSpPr>
+        <p:spPr>
+          <a:xfrm>
+            <a:off x="5804452" y="4419768"/>
+            <a:ext cx="5485993" cy="2461495"/>
+          </a:xfrm>
+          <a:prstGeom prst="rect">
+            <a:avLst/>
+          </a:prstGeom>
+        </p:spPr>
+        <p:txBody>
+          <a:bodyPr vert="horz" lIns="91440" tIns="45720" rIns="91440" bIns="45720" rtlCol="0">
+            <a:normAutofit/>
+          </a:bodyPr>
+          <a:lstStyle>
+            <a:lvl1pPr marL="228600" indent="-228600" algn="l" defTabSz="914400" rtl="0" eaLnBrk="1" latinLnBrk="0" hangingPunct="1">
+              <a:lnSpc>
+                <a:spcPct val="100000"/>
+              </a:lnSpc>
+              <a:spcBef>
+                <a:spcPts val="1000"/>
+              </a:spcBef>
+              <a:buClr>
+                <a:schemeClr val="accent2"/>
+              </a:buClr>
+              <a:buFont typeface="Arial" panose="020B0604020202020204" pitchFamily="34" charset="0"/>
+              <a:buChar char="•"/>
+              <a:defRPr sz="1800" kern="1200">
+                <a:solidFill>
+                  <a:schemeClr val="tx1">
+                    <a:lumMod val="85000"/>
+                    <a:lumOff val="15000"/>
+                  </a:schemeClr>
+                </a:solidFill>
+                <a:latin typeface="+mn-lt"/>
+                <a:ea typeface="+mn-ea"/>
+                <a:cs typeface="+mn-cs"/>
+              </a:defRPr>
+            </a:lvl1pPr>
+            <a:lvl2pPr marL="457200" indent="-228600" algn="l" defTabSz="914400" rtl="0" eaLnBrk="1" latinLnBrk="0" hangingPunct="1">
+              <a:lnSpc>
+                <a:spcPct val="100000"/>
+              </a:lnSpc>
+              <a:spcBef>
+                <a:spcPts val="1000"/>
+              </a:spcBef>
+              <a:buClr>
+                <a:schemeClr val="accent2"/>
+              </a:buClr>
+              <a:buFont typeface="Arial" panose="020B0604020202020204" pitchFamily="34" charset="0"/>
+              <a:buChar char="•"/>
+              <a:defRPr sz="1600" kern="1200">
+                <a:solidFill>
+                  <a:schemeClr val="tx1">
+                    <a:lumMod val="85000"/>
+                    <a:lumOff val="15000"/>
+                  </a:schemeClr>
+                </a:solidFill>
+                <a:latin typeface="+mn-lt"/>
+                <a:ea typeface="+mn-ea"/>
+                <a:cs typeface="+mn-cs"/>
+              </a:defRPr>
+            </a:lvl2pPr>
+            <a:lvl3pPr marL="685800" indent="-228600" algn="l" defTabSz="914400" rtl="0" eaLnBrk="1" latinLnBrk="0" hangingPunct="1">
+              <a:lnSpc>
+                <a:spcPct val="100000"/>
+              </a:lnSpc>
+              <a:spcBef>
+                <a:spcPts val="1000"/>
+              </a:spcBef>
+              <a:buClr>
+                <a:schemeClr val="accent2"/>
+              </a:buClr>
+              <a:buFont typeface="Arial" panose="020B0604020202020204" pitchFamily="34" charset="0"/>
+              <a:buChar char="•"/>
+              <a:defRPr sz="1600" kern="1200">
+                <a:solidFill>
+                  <a:schemeClr val="tx1">
+                    <a:lumMod val="85000"/>
+                    <a:lumOff val="15000"/>
+                  </a:schemeClr>
+                </a:solidFill>
+                <a:latin typeface="+mn-lt"/>
+                <a:ea typeface="+mn-ea"/>
+                <a:cs typeface="+mn-cs"/>
+              </a:defRPr>
+            </a:lvl3pPr>
+            <a:lvl4pPr marL="914400" indent="-228600" algn="l" defTabSz="914400" rtl="0" eaLnBrk="1" latinLnBrk="0" hangingPunct="1">
+              <a:lnSpc>
+                <a:spcPct val="100000"/>
+              </a:lnSpc>
+              <a:spcBef>
+                <a:spcPts val="1000"/>
+              </a:spcBef>
+              <a:buClr>
+                <a:schemeClr val="accent2"/>
+              </a:buClr>
+              <a:buFont typeface="Arial" panose="020B0604020202020204" pitchFamily="34" charset="0"/>
+              <a:buChar char="•"/>
+              <a:defRPr sz="1600" kern="1200">
+                <a:solidFill>
+                  <a:schemeClr val="tx1">
+                    <a:lumMod val="85000"/>
+                    <a:lumOff val="15000"/>
+                  </a:schemeClr>
+                </a:solidFill>
+                <a:latin typeface="+mn-lt"/>
+                <a:ea typeface="+mn-ea"/>
+                <a:cs typeface="+mn-cs"/>
+              </a:defRPr>
+            </a:lvl4pPr>
+            <a:lvl5pPr marL="1143000" indent="-228600" algn="l" defTabSz="914400" rtl="0" eaLnBrk="1" latinLnBrk="0" hangingPunct="1">
+              <a:lnSpc>
+                <a:spcPct val="100000"/>
+              </a:lnSpc>
+              <a:spcBef>
+                <a:spcPts val="1000"/>
+              </a:spcBef>
+              <a:buClr>
+                <a:schemeClr val="accent2"/>
+              </a:buClr>
+              <a:buFont typeface="Arial" panose="020B0604020202020204" pitchFamily="34" charset="0"/>
+              <a:buChar char="•"/>
+              <a:defRPr sz="1600" kern="1200">
+                <a:solidFill>
+                  <a:schemeClr val="tx1">
+                    <a:lumMod val="85000"/>
+                    <a:lumOff val="15000"/>
+                  </a:schemeClr>
+                </a:solidFill>
+                <a:latin typeface="+mn-lt"/>
+                <a:ea typeface="+mn-ea"/>
+                <a:cs typeface="+mn-cs"/>
+              </a:defRPr>
+            </a:lvl5pPr>
+            <a:lvl6pPr marL="1312863" indent="-228600" algn="l" defTabSz="914400" rtl="0" eaLnBrk="1" latinLnBrk="0" hangingPunct="1">
+              <a:lnSpc>
+                <a:spcPct val="100000"/>
+              </a:lnSpc>
+              <a:spcBef>
+                <a:spcPts val="1000"/>
+              </a:spcBef>
+              <a:buClr>
+                <a:schemeClr val="accent2"/>
+              </a:buClr>
+              <a:buFont typeface="Arial" panose="020B0604020202020204" pitchFamily="34" charset="0"/>
+              <a:buChar char="•"/>
+              <a:defRPr sz="1600" kern="1200">
+                <a:solidFill>
+                  <a:schemeClr val="tx1"/>
+                </a:solidFill>
+                <a:latin typeface="+mn-lt"/>
+                <a:ea typeface="+mn-ea"/>
+                <a:cs typeface="+mn-cs"/>
+              </a:defRPr>
+            </a:lvl6pPr>
+            <a:lvl7pPr marL="1484313" indent="-228600" algn="l" defTabSz="914400" rtl="0" eaLnBrk="1" latinLnBrk="0" hangingPunct="1">
+              <a:lnSpc>
+                <a:spcPct val="100000"/>
+              </a:lnSpc>
+              <a:spcBef>
+                <a:spcPts val="1000"/>
+              </a:spcBef>
+              <a:buClr>
+                <a:schemeClr val="accent2"/>
+              </a:buClr>
+              <a:buFont typeface="Arial" panose="020B0604020202020204" pitchFamily="34" charset="0"/>
+              <a:buChar char="•"/>
+              <a:defRPr sz="1600" kern="1200">
+                <a:solidFill>
+                  <a:schemeClr val="tx1"/>
+                </a:solidFill>
+                <a:latin typeface="+mn-lt"/>
+                <a:ea typeface="+mn-ea"/>
+                <a:cs typeface="+mn-cs"/>
+              </a:defRPr>
+            </a:lvl7pPr>
+            <a:lvl8pPr marL="1657350" indent="-228600" algn="l" defTabSz="914400" rtl="0" eaLnBrk="1" latinLnBrk="0" hangingPunct="1">
+              <a:lnSpc>
+                <a:spcPct val="100000"/>
+              </a:lnSpc>
+              <a:spcBef>
+                <a:spcPts val="1000"/>
+              </a:spcBef>
+              <a:buClr>
+                <a:schemeClr val="accent2"/>
+              </a:buClr>
+              <a:buFont typeface="Arial" panose="020B0604020202020204" pitchFamily="34" charset="0"/>
+              <a:buChar char="•"/>
+              <a:defRPr sz="1600" kern="1200" baseline="0">
+                <a:solidFill>
+                  <a:schemeClr val="tx1"/>
+                </a:solidFill>
+                <a:latin typeface="+mn-lt"/>
+                <a:ea typeface="+mn-ea"/>
+                <a:cs typeface="+mn-cs"/>
+              </a:defRPr>
+            </a:lvl8pPr>
+            <a:lvl9pPr marL="1882775" indent="-228600" algn="l" defTabSz="914400" rtl="0" eaLnBrk="1" latinLnBrk="0" hangingPunct="1">
+              <a:lnSpc>
+                <a:spcPct val="100000"/>
+              </a:lnSpc>
+              <a:spcBef>
+                <a:spcPts val="1000"/>
+              </a:spcBef>
+              <a:buClr>
+                <a:schemeClr val="accent2"/>
+              </a:buClr>
+              <a:buFont typeface="Arial" panose="020B0604020202020204" pitchFamily="34" charset="0"/>
+              <a:buChar char="•"/>
+              <a:defRPr sz="1600" kern="1200" baseline="0">
+                <a:solidFill>
+                  <a:schemeClr val="tx1"/>
+                </a:solidFill>
+                <a:latin typeface="+mn-lt"/>
+                <a:ea typeface="+mn-ea"/>
+                <a:cs typeface="+mn-cs"/>
+              </a:defRPr>
+            </a:lvl9pPr>
+          </a:lstStyle>
+          <a:p>
+            <a:pPr marL="0" indent="0">
+              <a:buFont typeface="Arial" panose="020B0604020202020204" pitchFamily="34" charset="0"/>
+              <a:buNone/>
+            </a:pPr>
+            <a:r>
+              <a:rPr lang="es-BO" dirty="0"/>
+              <a:t>Es importante destacar que la misión no se limita a la generación de ganancias o al cumplimiento de objetivos financieros, sino que se enfoca en el propósito más amplio y la contribución de la empresa a la sociedad.</a:t>
+            </a:r>
+          </a:p>
+        </p:txBody>
+      </p:sp>
+      <p:pic>
+        <p:nvPicPr>
+          <p:cNvPr id="1030" name="Picture 6" descr="Qué son la misión y visión de una empresa? 3 ejemplos prácticos">
+            <a:extLst>
+              <a:ext uri="{FF2B5EF4-FFF2-40B4-BE49-F238E27FC236}">
+                <a16:creationId xmlns:a16="http://schemas.microsoft.com/office/drawing/2014/main" id="{AD6DDA60-0EEC-6C30-5549-03BB4CB40C04}"/>
+              </a:ext>
+            </a:extLst>
+          </p:cNvPr>
+          <p:cNvPicPr>
+            <a:picLocks noChangeAspect="1" noChangeArrowheads="1"/>
+          </p:cNvPicPr>
+          <p:nvPr/>
+        </p:nvPicPr>
+        <p:blipFill>
+          <a:blip r:embed="rId3">
+            <a:extLst>
+              <a:ext uri="{28A0092B-C50C-407E-A947-70E740481C1C}">
+                <a14:useLocalDpi xmlns:a14="http://schemas.microsoft.com/office/drawing/2010/main" val="0"/>
+              </a:ext>
+            </a:extLst>
+          </a:blip>
+          <a:srcRect/>
+          <a:stretch>
+            <a:fillRect/>
+          </a:stretch>
+        </p:blipFill>
+        <p:spPr bwMode="auto">
+          <a:xfrm>
+            <a:off x="1796912" y="4271926"/>
+            <a:ext cx="2952750" cy="1552575"/>
+          </a:xfrm>
+          <a:prstGeom prst="rect">
+            <a:avLst/>
+          </a:prstGeom>
+          <a:noFill/>
+          <a:extLst>
+            <a:ext uri="{909E8E84-426E-40DD-AFC4-6F175D3DCCD1}">
+              <a14:hiddenFill xmlns:a14="http://schemas.microsoft.com/office/drawing/2010/main">
+                <a:solidFill>
+                  <a:srgbClr val="FFFFFF"/>
+                </a:solidFill>
+              </a14:hiddenFill>
+            </a:ext>
+          </a:extLst>
+        </p:spPr>
+      </p:pic>
     </p:spTree>
     <p:extLst>
       <p:ext uri="{BB962C8B-B14F-4D97-AF65-F5344CB8AC3E}">
@@ -5188,45 +5654,332 @@
           <a:p>
             <a:r>
               <a:rPr lang="es-BO" b="1" dirty="0"/>
-              <a:t>3.	ORGANIZACION</a:t>
-            </a:r>
-          </a:p>
-        </p:txBody>
-      </p:sp>
-      <p:sp>
-        <p:nvSpPr>
-          <p:cNvPr id="3" name="Marcador de contenido 2">
+              <a:t>La Misión</a:t>
+            </a:r>
+          </a:p>
+        </p:txBody>
+      </p:sp>
+      <p:sp>
+        <p:nvSpPr>
+          <p:cNvPr id="5" name="CuadroTexto 4">
             <a:extLst>
               <a:ext uri="{FF2B5EF4-FFF2-40B4-BE49-F238E27FC236}">
-                <a16:creationId xmlns:a16="http://schemas.microsoft.com/office/drawing/2014/main" id="{A03F4793-332F-447C-FEBA-8C99D67BE98B}"/>
+                <a16:creationId xmlns:a16="http://schemas.microsoft.com/office/drawing/2014/main" id="{17580752-A3EE-38EA-BD26-0F253C55B7FE}"/>
               </a:ext>
             </a:extLst>
           </p:cNvPr>
-          <p:cNvSpPr>
-            <a:spLocks noGrp="1"/>
-          </p:cNvSpPr>
-          <p:nvPr>
-            <p:ph idx="1"/>
-          </p:nvPr>
+          <p:cNvSpPr txBox="1"/>
+          <p:nvPr/>
         </p:nvSpPr>
         <p:spPr>
           <a:xfrm>
-            <a:off x="994117" y="1941342"/>
-            <a:ext cx="10203766" cy="3798685"/>
-          </a:xfrm>
-        </p:spPr>
-        <p:txBody>
-          <a:bodyPr/>
+            <a:off x="7434470" y="4863548"/>
+            <a:ext cx="184731" cy="369332"/>
+          </a:xfrm>
+          <a:prstGeom prst="rect">
+            <a:avLst/>
+          </a:prstGeom>
+          <a:noFill/>
+        </p:spPr>
+        <p:txBody>
+          <a:bodyPr wrap="none" rtlCol="0">
+            <a:spAutoFit/>
+          </a:bodyPr>
           <a:lstStyle/>
           <a:p>
             <a:endParaRPr lang="es-BO" dirty="0"/>
           </a:p>
         </p:txBody>
       </p:sp>
+      <p:sp>
+        <p:nvSpPr>
+          <p:cNvPr id="10" name="Marcador de contenido 2">
+            <a:extLst>
+              <a:ext uri="{FF2B5EF4-FFF2-40B4-BE49-F238E27FC236}">
+                <a16:creationId xmlns:a16="http://schemas.microsoft.com/office/drawing/2014/main" id="{D9F98258-CE11-123E-9004-22E701E0F40D}"/>
+              </a:ext>
+            </a:extLst>
+          </p:cNvPr>
+          <p:cNvSpPr txBox="1">
+            <a:spLocks/>
+          </p:cNvSpPr>
+          <p:nvPr/>
+        </p:nvSpPr>
+        <p:spPr>
+          <a:xfrm>
+            <a:off x="5367130" y="1988745"/>
+            <a:ext cx="5830753" cy="1440255"/>
+          </a:xfrm>
+          <a:prstGeom prst="rect">
+            <a:avLst/>
+          </a:prstGeom>
+        </p:spPr>
+        <p:txBody>
+          <a:bodyPr vert="horz" lIns="91440" tIns="45720" rIns="91440" bIns="45720" rtlCol="0">
+            <a:noAutofit/>
+          </a:bodyPr>
+          <a:lstStyle>
+            <a:lvl1pPr marL="228600" indent="-228600" algn="l" defTabSz="914400" rtl="0" eaLnBrk="1" latinLnBrk="0" hangingPunct="1">
+              <a:lnSpc>
+                <a:spcPct val="100000"/>
+              </a:lnSpc>
+              <a:spcBef>
+                <a:spcPts val="1000"/>
+              </a:spcBef>
+              <a:buClr>
+                <a:schemeClr val="accent2"/>
+              </a:buClr>
+              <a:buFont typeface="Arial" panose="020B0604020202020204" pitchFamily="34" charset="0"/>
+              <a:buChar char="•"/>
+              <a:defRPr sz="1800" kern="1200">
+                <a:solidFill>
+                  <a:schemeClr val="tx1">
+                    <a:lumMod val="85000"/>
+                    <a:lumOff val="15000"/>
+                  </a:schemeClr>
+                </a:solidFill>
+                <a:latin typeface="+mn-lt"/>
+                <a:ea typeface="+mn-ea"/>
+                <a:cs typeface="+mn-cs"/>
+              </a:defRPr>
+            </a:lvl1pPr>
+            <a:lvl2pPr marL="457200" indent="-228600" algn="l" defTabSz="914400" rtl="0" eaLnBrk="1" latinLnBrk="0" hangingPunct="1">
+              <a:lnSpc>
+                <a:spcPct val="100000"/>
+              </a:lnSpc>
+              <a:spcBef>
+                <a:spcPts val="1000"/>
+              </a:spcBef>
+              <a:buClr>
+                <a:schemeClr val="accent2"/>
+              </a:buClr>
+              <a:buFont typeface="Arial" panose="020B0604020202020204" pitchFamily="34" charset="0"/>
+              <a:buChar char="•"/>
+              <a:defRPr sz="1600" kern="1200">
+                <a:solidFill>
+                  <a:schemeClr val="tx1">
+                    <a:lumMod val="85000"/>
+                    <a:lumOff val="15000"/>
+                  </a:schemeClr>
+                </a:solidFill>
+                <a:latin typeface="+mn-lt"/>
+                <a:ea typeface="+mn-ea"/>
+                <a:cs typeface="+mn-cs"/>
+              </a:defRPr>
+            </a:lvl2pPr>
+            <a:lvl3pPr marL="685800" indent="-228600" algn="l" defTabSz="914400" rtl="0" eaLnBrk="1" latinLnBrk="0" hangingPunct="1">
+              <a:lnSpc>
+                <a:spcPct val="100000"/>
+              </a:lnSpc>
+              <a:spcBef>
+                <a:spcPts val="1000"/>
+              </a:spcBef>
+              <a:buClr>
+                <a:schemeClr val="accent2"/>
+              </a:buClr>
+              <a:buFont typeface="Arial" panose="020B0604020202020204" pitchFamily="34" charset="0"/>
+              <a:buChar char="•"/>
+              <a:defRPr sz="1600" kern="1200">
+                <a:solidFill>
+                  <a:schemeClr val="tx1">
+                    <a:lumMod val="85000"/>
+                    <a:lumOff val="15000"/>
+                  </a:schemeClr>
+                </a:solidFill>
+                <a:latin typeface="+mn-lt"/>
+                <a:ea typeface="+mn-ea"/>
+                <a:cs typeface="+mn-cs"/>
+              </a:defRPr>
+            </a:lvl3pPr>
+            <a:lvl4pPr marL="914400" indent="-228600" algn="l" defTabSz="914400" rtl="0" eaLnBrk="1" latinLnBrk="0" hangingPunct="1">
+              <a:lnSpc>
+                <a:spcPct val="100000"/>
+              </a:lnSpc>
+              <a:spcBef>
+                <a:spcPts val="1000"/>
+              </a:spcBef>
+              <a:buClr>
+                <a:schemeClr val="accent2"/>
+              </a:buClr>
+              <a:buFont typeface="Arial" panose="020B0604020202020204" pitchFamily="34" charset="0"/>
+              <a:buChar char="•"/>
+              <a:defRPr sz="1600" kern="1200">
+                <a:solidFill>
+                  <a:schemeClr val="tx1">
+                    <a:lumMod val="85000"/>
+                    <a:lumOff val="15000"/>
+                  </a:schemeClr>
+                </a:solidFill>
+                <a:latin typeface="+mn-lt"/>
+                <a:ea typeface="+mn-ea"/>
+                <a:cs typeface="+mn-cs"/>
+              </a:defRPr>
+            </a:lvl4pPr>
+            <a:lvl5pPr marL="1143000" indent="-228600" algn="l" defTabSz="914400" rtl="0" eaLnBrk="1" latinLnBrk="0" hangingPunct="1">
+              <a:lnSpc>
+                <a:spcPct val="100000"/>
+              </a:lnSpc>
+              <a:spcBef>
+                <a:spcPts val="1000"/>
+              </a:spcBef>
+              <a:buClr>
+                <a:schemeClr val="accent2"/>
+              </a:buClr>
+              <a:buFont typeface="Arial" panose="020B0604020202020204" pitchFamily="34" charset="0"/>
+              <a:buChar char="•"/>
+              <a:defRPr sz="1600" kern="1200">
+                <a:solidFill>
+                  <a:schemeClr val="tx1">
+                    <a:lumMod val="85000"/>
+                    <a:lumOff val="15000"/>
+                  </a:schemeClr>
+                </a:solidFill>
+                <a:latin typeface="+mn-lt"/>
+                <a:ea typeface="+mn-ea"/>
+                <a:cs typeface="+mn-cs"/>
+              </a:defRPr>
+            </a:lvl5pPr>
+            <a:lvl6pPr marL="1312863" indent="-228600" algn="l" defTabSz="914400" rtl="0" eaLnBrk="1" latinLnBrk="0" hangingPunct="1">
+              <a:lnSpc>
+                <a:spcPct val="100000"/>
+              </a:lnSpc>
+              <a:spcBef>
+                <a:spcPts val="1000"/>
+              </a:spcBef>
+              <a:buClr>
+                <a:schemeClr val="accent2"/>
+              </a:buClr>
+              <a:buFont typeface="Arial" panose="020B0604020202020204" pitchFamily="34" charset="0"/>
+              <a:buChar char="•"/>
+              <a:defRPr sz="1600" kern="1200">
+                <a:solidFill>
+                  <a:schemeClr val="tx1"/>
+                </a:solidFill>
+                <a:latin typeface="+mn-lt"/>
+                <a:ea typeface="+mn-ea"/>
+                <a:cs typeface="+mn-cs"/>
+              </a:defRPr>
+            </a:lvl6pPr>
+            <a:lvl7pPr marL="1484313" indent="-228600" algn="l" defTabSz="914400" rtl="0" eaLnBrk="1" latinLnBrk="0" hangingPunct="1">
+              <a:lnSpc>
+                <a:spcPct val="100000"/>
+              </a:lnSpc>
+              <a:spcBef>
+                <a:spcPts val="1000"/>
+              </a:spcBef>
+              <a:buClr>
+                <a:schemeClr val="accent2"/>
+              </a:buClr>
+              <a:buFont typeface="Arial" panose="020B0604020202020204" pitchFamily="34" charset="0"/>
+              <a:buChar char="•"/>
+              <a:defRPr sz="1600" kern="1200">
+                <a:solidFill>
+                  <a:schemeClr val="tx1"/>
+                </a:solidFill>
+                <a:latin typeface="+mn-lt"/>
+                <a:ea typeface="+mn-ea"/>
+                <a:cs typeface="+mn-cs"/>
+              </a:defRPr>
+            </a:lvl7pPr>
+            <a:lvl8pPr marL="1657350" indent="-228600" algn="l" defTabSz="914400" rtl="0" eaLnBrk="1" latinLnBrk="0" hangingPunct="1">
+              <a:lnSpc>
+                <a:spcPct val="100000"/>
+              </a:lnSpc>
+              <a:spcBef>
+                <a:spcPts val="1000"/>
+              </a:spcBef>
+              <a:buClr>
+                <a:schemeClr val="accent2"/>
+              </a:buClr>
+              <a:buFont typeface="Arial" panose="020B0604020202020204" pitchFamily="34" charset="0"/>
+              <a:buChar char="•"/>
+              <a:defRPr sz="1600" kern="1200" baseline="0">
+                <a:solidFill>
+                  <a:schemeClr val="tx1"/>
+                </a:solidFill>
+                <a:latin typeface="+mn-lt"/>
+                <a:ea typeface="+mn-ea"/>
+                <a:cs typeface="+mn-cs"/>
+              </a:defRPr>
+            </a:lvl8pPr>
+            <a:lvl9pPr marL="1882775" indent="-228600" algn="l" defTabSz="914400" rtl="0" eaLnBrk="1" latinLnBrk="0" hangingPunct="1">
+              <a:lnSpc>
+                <a:spcPct val="100000"/>
+              </a:lnSpc>
+              <a:spcBef>
+                <a:spcPts val="1000"/>
+              </a:spcBef>
+              <a:buClr>
+                <a:schemeClr val="accent2"/>
+              </a:buClr>
+              <a:buFont typeface="Arial" panose="020B0604020202020204" pitchFamily="34" charset="0"/>
+              <a:buChar char="•"/>
+              <a:defRPr sz="1600" kern="1200" baseline="0">
+                <a:solidFill>
+                  <a:schemeClr val="tx1"/>
+                </a:solidFill>
+                <a:latin typeface="+mn-lt"/>
+                <a:ea typeface="+mn-ea"/>
+                <a:cs typeface="+mn-cs"/>
+              </a:defRPr>
+            </a:lvl9pPr>
+          </a:lstStyle>
+          <a:p>
+            <a:pPr marL="0" indent="0">
+              <a:buFont typeface="Arial" panose="020B0604020202020204" pitchFamily="34" charset="0"/>
+              <a:buNone/>
+            </a:pPr>
+            <a:r>
+              <a:rPr lang="es-BO" i="1" dirty="0"/>
+              <a:t>“Es producir y comercializar helados, yogurt, bebidas, leche y derivados lácteos; de alta calidad que gocen de la preferencia de nuestros clientes.</a:t>
+            </a:r>
+          </a:p>
+          <a:p>
+            <a:pPr marL="0" indent="0">
+              <a:buFont typeface="Arial" panose="020B0604020202020204" pitchFamily="34" charset="0"/>
+              <a:buNone/>
+            </a:pPr>
+            <a:r>
+              <a:rPr lang="es-BO" i="1" dirty="0"/>
+              <a:t>Crecer de forma sostenida racional, para ser una empresa líder en Bolivia en la fabricación de alimentos, que responda las necesidades de nuestros consumidores, dentro y fuera de nuestras fronteras y que respete al medio ambiente.”</a:t>
+            </a:r>
+          </a:p>
+        </p:txBody>
+      </p:sp>
+      <p:pic>
+        <p:nvPicPr>
+          <p:cNvPr id="16" name="Imagen 15">
+            <a:extLst>
+              <a:ext uri="{FF2B5EF4-FFF2-40B4-BE49-F238E27FC236}">
+                <a16:creationId xmlns:a16="http://schemas.microsoft.com/office/drawing/2014/main" id="{88E273C9-537A-F295-F533-654C830D5D7A}"/>
+              </a:ext>
+            </a:extLst>
+          </p:cNvPr>
+          <p:cNvPicPr>
+            <a:picLocks noChangeAspect="1"/>
+          </p:cNvPicPr>
+          <p:nvPr/>
+        </p:nvPicPr>
+        <p:blipFill>
+          <a:blip r:embed="rId2"/>
+          <a:stretch>
+            <a:fillRect/>
+          </a:stretch>
+        </p:blipFill>
+        <p:spPr>
+          <a:xfrm>
+            <a:off x="994117" y="2024858"/>
+            <a:ext cx="3958486" cy="2036832"/>
+          </a:xfrm>
+          <a:prstGeom prst="rect">
+            <a:avLst/>
+          </a:prstGeom>
+        </p:spPr>
+      </p:pic>
     </p:spTree>
     <p:extLst>
       <p:ext uri="{BB962C8B-B14F-4D97-AF65-F5344CB8AC3E}">
-        <p14:creationId xmlns:p14="http://schemas.microsoft.com/office/powerpoint/2010/main" val="3600898960"/>
+        <p14:creationId xmlns:p14="http://schemas.microsoft.com/office/powerpoint/2010/main" val="4024162123"/>
       </p:ext>
     </p:extLst>
   </p:cSld>
@@ -5281,7 +6034,7 @@
           <a:p>
             <a:r>
               <a:rPr lang="es-BO" b="1" dirty="0"/>
-              <a:t>4.	LIDERAZGO</a:t>
+              <a:t>3.	ORGANIZACION</a:t>
             </a:r>
           </a:p>
         </p:txBody>
@@ -5319,7 +6072,7 @@
     </p:spTree>
     <p:extLst>
       <p:ext uri="{BB962C8B-B14F-4D97-AF65-F5344CB8AC3E}">
-        <p14:creationId xmlns:p14="http://schemas.microsoft.com/office/powerpoint/2010/main" val="2951684488"/>
+        <p14:creationId xmlns:p14="http://schemas.microsoft.com/office/powerpoint/2010/main" val="3600898960"/>
       </p:ext>
     </p:extLst>
   </p:cSld>

</xml_diff>

<commit_message>
Parte de motivacion en liderazgo añadida
</commit_message>
<xml_diff>
--- a/Presentacion - Exposicion.pptx
+++ b/Presentacion - Exposicion.pptx
@@ -15,8 +15,14 @@
     <p:sldId id="267" r:id="rId9"/>
     <p:sldId id="261" r:id="rId10"/>
     <p:sldId id="263" r:id="rId11"/>
-    <p:sldId id="260" r:id="rId12"/>
-    <p:sldId id="259" r:id="rId13"/>
+    <p:sldId id="268" r:id="rId12"/>
+    <p:sldId id="269" r:id="rId13"/>
+    <p:sldId id="271" r:id="rId14"/>
+    <p:sldId id="270" r:id="rId15"/>
+    <p:sldId id="272" r:id="rId16"/>
+    <p:sldId id="273" r:id="rId17"/>
+    <p:sldId id="260" r:id="rId18"/>
+    <p:sldId id="259" r:id="rId19"/>
   </p:sldIdLst>
   <p:sldSz cx="12192000" cy="6858000"/>
   <p:notesSz cx="6858000" cy="9144000"/>
@@ -286,7 +292,7 @@
           <a:p>
             <a:fld id="{1160EA64-D806-43AC-9DF2-F8C432F32B4C}" type="datetimeFigureOut">
               <a:rPr lang="en-US" dirty="0"/>
-              <a:t>6/22/2023</a:t>
+              <a:t>6/26/2023</a:t>
             </a:fld>
             <a:endParaRPr lang="en-US" dirty="0"/>
           </a:p>
@@ -452,7 +458,7 @@
           <a:p>
             <a:fld id="{E9F9C37B-1D36-470B-8223-D6C91242EC14}" type="datetimeFigureOut">
               <a:rPr lang="en-US" dirty="0"/>
-              <a:t>6/22/2023</a:t>
+              <a:t>6/26/2023</a:t>
             </a:fld>
             <a:endParaRPr lang="en-US" dirty="0"/>
           </a:p>
@@ -627,7 +633,7 @@
           <a:p>
             <a:fld id="{67C6F52A-A82B-47A2-A83A-8C4C91F2D59F}" type="datetimeFigureOut">
               <a:rPr lang="en-US" dirty="0"/>
-              <a:t>6/22/2023</a:t>
+              <a:t>6/26/2023</a:t>
             </a:fld>
             <a:endParaRPr lang="en-US" dirty="0"/>
           </a:p>
@@ -792,7 +798,7 @@
           <a:p>
             <a:fld id="{F070A7B3-6521-4DCA-87E5-044747A908C1}" type="datetimeFigureOut">
               <a:rPr lang="en-US" dirty="0"/>
-              <a:t>6/22/2023</a:t>
+              <a:t>6/26/2023</a:t>
             </a:fld>
             <a:endParaRPr lang="en-US" dirty="0"/>
           </a:p>
@@ -1056,7 +1062,7 @@
           <a:p>
             <a:fld id="{1160EA64-D806-43AC-9DF2-F8C432F32B4C}" type="datetimeFigureOut">
               <a:rPr lang="en-US" dirty="0"/>
-              <a:t>6/22/2023</a:t>
+              <a:t>6/26/2023</a:t>
             </a:fld>
             <a:endParaRPr lang="en-US" dirty="0"/>
           </a:p>
@@ -1284,7 +1290,7 @@
           <a:p>
             <a:fld id="{AB134690-1557-4C89-A502-4959FE7FAD70}" type="datetimeFigureOut">
               <a:rPr lang="en-US" dirty="0"/>
-              <a:t>6/22/2023</a:t>
+              <a:t>6/26/2023</a:t>
             </a:fld>
             <a:endParaRPr lang="en-US" dirty="0"/>
           </a:p>
@@ -1638,7 +1644,7 @@
           <a:p>
             <a:fld id="{4F7D4976-E339-4826-83B7-FBD03F55ECF8}" type="datetimeFigureOut">
               <a:rPr lang="en-US" dirty="0"/>
-              <a:t>6/22/2023</a:t>
+              <a:t>6/26/2023</a:t>
             </a:fld>
             <a:endParaRPr lang="en-US" dirty="0"/>
           </a:p>
@@ -1774,7 +1780,7 @@
           <a:p>
             <a:fld id="{E1037C31-9E7A-4F99-8774-A0E530DE1A42}" type="datetimeFigureOut">
               <a:rPr lang="en-US" dirty="0"/>
-              <a:t>6/22/2023</a:t>
+              <a:t>6/26/2023</a:t>
             </a:fld>
             <a:endParaRPr lang="en-US" dirty="0"/>
           </a:p>
@@ -1864,7 +1870,7 @@
           <a:p>
             <a:fld id="{C278504F-A551-4DE0-9316-4DCD1D8CC752}" type="datetimeFigureOut">
               <a:rPr lang="en-US" dirty="0"/>
-              <a:t>6/22/2023</a:t>
+              <a:t>6/26/2023</a:t>
             </a:fld>
             <a:endParaRPr lang="en-US" dirty="0"/>
           </a:p>
@@ -2216,7 +2222,7 @@
           <a:p>
             <a:fld id="{D1BE4249-C0D0-4B06-8692-E8BB871AF643}" type="datetimeFigureOut">
               <a:rPr lang="en-US" dirty="0"/>
-              <a:t>6/22/2023</a:t>
+              <a:t>6/26/2023</a:t>
             </a:fld>
             <a:endParaRPr lang="en-US" dirty="0"/>
           </a:p>
@@ -2568,7 +2574,7 @@
           <a:p>
             <a:fld id="{042B0DB6-F5C7-45FB-8CF3-31B45F9C2DAC}" type="datetimeFigureOut">
               <a:rPr lang="en-US" dirty="0"/>
-              <a:t>6/22/2023</a:t>
+              <a:t>6/26/2023</a:t>
             </a:fld>
             <a:endParaRPr lang="en-US" dirty="0"/>
           </a:p>
@@ -2805,7 +2811,7 @@
           <a:p>
             <a:fld id="{1160EA64-D806-43AC-9DF2-F8C432F32B4C}" type="datetimeFigureOut">
               <a:rPr lang="en-US" dirty="0"/>
-              <a:t>6/22/2023</a:t>
+              <a:t>6/26/2023</a:t>
             </a:fld>
             <a:endParaRPr lang="en-US" dirty="0"/>
           </a:p>
@@ -3534,6 +3540,1174 @@
           </a:xfrm>
         </p:spPr>
         <p:txBody>
+          <a:bodyPr>
+            <a:normAutofit fontScale="90000"/>
+          </a:bodyPr>
+          <a:lstStyle/>
+          <a:p>
+            <a:r>
+              <a:rPr lang="es-BO" b="1" dirty="0"/>
+              <a:t>4.	LIDERAZGO c)	Motivar y recompensar a los empleados</a:t>
+            </a:r>
+          </a:p>
+        </p:txBody>
+      </p:sp>
+      <p:sp>
+        <p:nvSpPr>
+          <p:cNvPr id="3" name="Marcador de contenido 2">
+            <a:extLst>
+              <a:ext uri="{FF2B5EF4-FFF2-40B4-BE49-F238E27FC236}">
+                <a16:creationId xmlns:a16="http://schemas.microsoft.com/office/drawing/2014/main" id="{A03F4793-332F-447C-FEBA-8C99D67BE98B}"/>
+              </a:ext>
+            </a:extLst>
+          </p:cNvPr>
+          <p:cNvSpPr>
+            <a:spLocks noGrp="1"/>
+          </p:cNvSpPr>
+          <p:nvPr>
+            <p:ph idx="1"/>
+          </p:nvPr>
+        </p:nvSpPr>
+        <p:spPr>
+          <a:xfrm>
+            <a:off x="911846" y="2180494"/>
+            <a:ext cx="4773637" cy="1364566"/>
+          </a:xfrm>
+        </p:spPr>
+        <p:txBody>
+          <a:bodyPr/>
+          <a:lstStyle/>
+          <a:p>
+            <a:r>
+              <a:rPr lang="es-AR" sz="1800" i="1" dirty="0">
+                <a:effectLst/>
+                <a:latin typeface="Calibri" panose="020F0502020204030204" pitchFamily="34" charset="0"/>
+                <a:ea typeface="Calibri" panose="020F0502020204030204" pitchFamily="34" charset="0"/>
+                <a:cs typeface="Arial" panose="020B0604020202020204" pitchFamily="34" charset="0"/>
+              </a:rPr>
+              <a:t>La motivación es fundamental en el entorno empresarial, ya que afecta directamente el desempeño, la productividad y la satisfacción de los empleados. </a:t>
+            </a:r>
+            <a:endParaRPr lang="es-BO" dirty="0"/>
+          </a:p>
+        </p:txBody>
+      </p:sp>
+      <p:sp>
+        <p:nvSpPr>
+          <p:cNvPr id="4" name="CuadroTexto 3">
+            <a:extLst>
+              <a:ext uri="{FF2B5EF4-FFF2-40B4-BE49-F238E27FC236}">
+                <a16:creationId xmlns:a16="http://schemas.microsoft.com/office/drawing/2014/main" id="{5CA396EC-CDD8-A424-C378-96A2CD8F32D3}"/>
+              </a:ext>
+            </a:extLst>
+          </p:cNvPr>
+          <p:cNvSpPr txBox="1"/>
+          <p:nvPr/>
+        </p:nvSpPr>
+        <p:spPr>
+          <a:xfrm>
+            <a:off x="6330462" y="4451814"/>
+            <a:ext cx="4656406" cy="1754326"/>
+          </a:xfrm>
+          <a:prstGeom prst="rect">
+            <a:avLst/>
+          </a:prstGeom>
+          <a:noFill/>
+        </p:spPr>
+        <p:txBody>
+          <a:bodyPr wrap="square" rtlCol="0">
+            <a:spAutoFit/>
+          </a:bodyPr>
+          <a:lstStyle/>
+          <a:p>
+            <a:pPr marL="285750" indent="-285750">
+              <a:buFont typeface="Arial" panose="020B0604020202020204" pitchFamily="34" charset="0"/>
+              <a:buChar char="•"/>
+            </a:pPr>
+            <a:r>
+              <a:rPr lang="es-BO" i="1" dirty="0"/>
+              <a:t>Los líderes desempeñan un papel crucial en la motivación de los empleados. Su capacidad para comprender y satisfacer las necesidades y expectativas de los miembros del equipo puede influir significativamente en su nivel de motivación. </a:t>
+            </a:r>
+            <a:endParaRPr lang="es-ES" i="1" dirty="0"/>
+          </a:p>
+        </p:txBody>
+      </p:sp>
+      <p:pic>
+        <p:nvPicPr>
+          <p:cNvPr id="1026" name="Picture 2" descr="Motivación laboral: claves y factores de la productividad empresarial -  NeoMercados.com">
+            <a:extLst>
+              <a:ext uri="{FF2B5EF4-FFF2-40B4-BE49-F238E27FC236}">
+                <a16:creationId xmlns:a16="http://schemas.microsoft.com/office/drawing/2014/main" id="{BE2015BA-1B4E-D336-825E-BDBF90E42258}"/>
+              </a:ext>
+            </a:extLst>
+          </p:cNvPr>
+          <p:cNvPicPr>
+            <a:picLocks noChangeAspect="1" noChangeArrowheads="1"/>
+          </p:cNvPicPr>
+          <p:nvPr/>
+        </p:nvPicPr>
+        <p:blipFill>
+          <a:blip r:embed="rId2">
+            <a:extLst>
+              <a:ext uri="{28A0092B-C50C-407E-A947-70E740481C1C}">
+                <a14:useLocalDpi xmlns:a14="http://schemas.microsoft.com/office/drawing/2010/main" val="0"/>
+              </a:ext>
+            </a:extLst>
+          </a:blip>
+          <a:srcRect/>
+          <a:stretch>
+            <a:fillRect/>
+          </a:stretch>
+        </p:blipFill>
+        <p:spPr bwMode="auto">
+          <a:xfrm>
+            <a:off x="6836377" y="2048612"/>
+            <a:ext cx="3521612" cy="2343991"/>
+          </a:xfrm>
+          <a:prstGeom prst="rect">
+            <a:avLst/>
+          </a:prstGeom>
+          <a:noFill/>
+          <a:extLst>
+            <a:ext uri="{909E8E84-426E-40DD-AFC4-6F175D3DCCD1}">
+              <a14:hiddenFill xmlns:a14="http://schemas.microsoft.com/office/drawing/2010/main">
+                <a:solidFill>
+                  <a:srgbClr val="FFFFFF"/>
+                </a:solidFill>
+              </a14:hiddenFill>
+            </a:ext>
+          </a:extLst>
+        </p:spPr>
+      </p:pic>
+      <p:pic>
+        <p:nvPicPr>
+          <p:cNvPr id="1028" name="Picture 4" descr="Motivación empresarial: ¿cómo mantenerla en tu personal?">
+            <a:extLst>
+              <a:ext uri="{FF2B5EF4-FFF2-40B4-BE49-F238E27FC236}">
+                <a16:creationId xmlns:a16="http://schemas.microsoft.com/office/drawing/2014/main" id="{4C1A32E2-A18C-23EB-CF9B-B16A94B2BCC1}"/>
+              </a:ext>
+            </a:extLst>
+          </p:cNvPr>
+          <p:cNvPicPr>
+            <a:picLocks noChangeAspect="1" noChangeArrowheads="1"/>
+          </p:cNvPicPr>
+          <p:nvPr/>
+        </p:nvPicPr>
+        <p:blipFill>
+          <a:blip r:embed="rId3">
+            <a:extLst>
+              <a:ext uri="{28A0092B-C50C-407E-A947-70E740481C1C}">
+                <a14:useLocalDpi xmlns:a14="http://schemas.microsoft.com/office/drawing/2010/main" val="0"/>
+              </a:ext>
+            </a:extLst>
+          </a:blip>
+          <a:srcRect/>
+          <a:stretch>
+            <a:fillRect/>
+          </a:stretch>
+        </p:blipFill>
+        <p:spPr bwMode="auto">
+          <a:xfrm>
+            <a:off x="1097332" y="3686779"/>
+            <a:ext cx="4258292" cy="2011045"/>
+          </a:xfrm>
+          <a:prstGeom prst="rect">
+            <a:avLst/>
+          </a:prstGeom>
+          <a:noFill/>
+          <a:extLst>
+            <a:ext uri="{909E8E84-426E-40DD-AFC4-6F175D3DCCD1}">
+              <a14:hiddenFill xmlns:a14="http://schemas.microsoft.com/office/drawing/2010/main">
+                <a:solidFill>
+                  <a:srgbClr val="FFFFFF"/>
+                </a:solidFill>
+              </a14:hiddenFill>
+            </a:ext>
+          </a:extLst>
+        </p:spPr>
+      </p:pic>
+    </p:spTree>
+    <p:extLst>
+      <p:ext uri="{BB962C8B-B14F-4D97-AF65-F5344CB8AC3E}">
+        <p14:creationId xmlns:p14="http://schemas.microsoft.com/office/powerpoint/2010/main" val="4004118298"/>
+      </p:ext>
+    </p:extLst>
+  </p:cSld>
+  <p:clrMapOvr>
+    <a:masterClrMapping/>
+  </p:clrMapOvr>
+</p:sld>
+</file>
+
+<file path=ppt/slides/slide12.xml><?xml version="1.0" encoding="utf-8"?>
+<p:sld xmlns:a="http://schemas.openxmlformats.org/drawingml/2006/main" xmlns:r="http://schemas.openxmlformats.org/officeDocument/2006/relationships" xmlns:p="http://schemas.openxmlformats.org/presentationml/2006/main">
+  <p:cSld>
+    <p:spTree>
+      <p:nvGrpSpPr>
+        <p:cNvPr id="1" name=""/>
+        <p:cNvGrpSpPr/>
+        <p:nvPr/>
+      </p:nvGrpSpPr>
+      <p:grpSpPr>
+        <a:xfrm>
+          <a:off x="0" y="0"/>
+          <a:ext cx="0" cy="0"/>
+          <a:chOff x="0" y="0"/>
+          <a:chExt cx="0" cy="0"/>
+        </a:xfrm>
+      </p:grpSpPr>
+      <p:sp>
+        <p:nvSpPr>
+          <p:cNvPr id="2" name="Título 1">
+            <a:extLst>
+              <a:ext uri="{FF2B5EF4-FFF2-40B4-BE49-F238E27FC236}">
+                <a16:creationId xmlns:a16="http://schemas.microsoft.com/office/drawing/2014/main" id="{E28CA087-FA30-60BE-45DB-5FAAAEE20665}"/>
+              </a:ext>
+            </a:extLst>
+          </p:cNvPr>
+          <p:cNvSpPr>
+            <a:spLocks noGrp="1"/>
+          </p:cNvSpPr>
+          <p:nvPr>
+            <p:ph type="title"/>
+          </p:nvPr>
+        </p:nvSpPr>
+        <p:spPr>
+          <a:xfrm>
+            <a:off x="994117" y="964692"/>
+            <a:ext cx="10203766" cy="793770"/>
+          </a:xfrm>
+        </p:spPr>
+        <p:txBody>
+          <a:bodyPr>
+            <a:normAutofit fontScale="90000"/>
+          </a:bodyPr>
+          <a:lstStyle/>
+          <a:p>
+            <a:r>
+              <a:rPr lang="es-BO" b="1" dirty="0"/>
+              <a:t>¿como podemos aprovechar el diseño del trabajo para motivar?</a:t>
+            </a:r>
+          </a:p>
+        </p:txBody>
+      </p:sp>
+      <p:sp>
+        <p:nvSpPr>
+          <p:cNvPr id="7" name="CuadroTexto 6">
+            <a:extLst>
+              <a:ext uri="{FF2B5EF4-FFF2-40B4-BE49-F238E27FC236}">
+                <a16:creationId xmlns:a16="http://schemas.microsoft.com/office/drawing/2014/main" id="{9754003E-35C5-D223-5F22-3C71D7660B60}"/>
+              </a:ext>
+            </a:extLst>
+          </p:cNvPr>
+          <p:cNvSpPr txBox="1"/>
+          <p:nvPr/>
+        </p:nvSpPr>
+        <p:spPr>
+          <a:xfrm>
+            <a:off x="740898" y="1913205"/>
+            <a:ext cx="11075963" cy="4524315"/>
+          </a:xfrm>
+          <a:prstGeom prst="rect">
+            <a:avLst/>
+          </a:prstGeom>
+          <a:noFill/>
+        </p:spPr>
+        <p:txBody>
+          <a:bodyPr wrap="square" rtlCol="0">
+            <a:spAutoFit/>
+          </a:bodyPr>
+          <a:lstStyle/>
+          <a:p>
+            <a:r>
+              <a:rPr lang="es-BO" dirty="0"/>
+              <a:t>Cualquier trabajo puede describirse en términos de las siguientes cinco dimensiones:</a:t>
+            </a:r>
+            <a:br>
+              <a:rPr lang="es-BO" dirty="0"/>
+            </a:br>
+            <a:endParaRPr lang="es-BO" dirty="0"/>
+          </a:p>
+          <a:p>
+            <a:r>
+              <a:rPr lang="es-BO" dirty="0"/>
+              <a:t>1. Variedad de habilidades. Grado al cual el trabajo requiere una variedad de habilidades de manera que el trabajador pueda utilizar muchas habilidades y talentos diferentes.</a:t>
+            </a:r>
+          </a:p>
+          <a:p>
+            <a:endParaRPr lang="es-BO" dirty="0"/>
+          </a:p>
+          <a:p>
+            <a:r>
+              <a:rPr lang="es-BO" dirty="0"/>
+              <a:t>2. Identidad de la tarea. Grado al que la tarea tiene como finalidad terminar una pieza de trabajo completa e identificable.</a:t>
+            </a:r>
+          </a:p>
+          <a:p>
+            <a:endParaRPr lang="es-BO" dirty="0"/>
+          </a:p>
+          <a:p>
+            <a:r>
+              <a:rPr lang="es-BO" dirty="0"/>
+              <a:t>3. Importancia de la tarea. Grado al que la tarea afecta la vida o el trabajo de otras personas.</a:t>
+            </a:r>
+          </a:p>
+          <a:p>
+            <a:endParaRPr lang="es-BO" dirty="0"/>
+          </a:p>
+          <a:p>
+            <a:r>
+              <a:rPr lang="es-BO" dirty="0"/>
+              <a:t>4. Autonomía. Grado al que el trabajo ofrece libertad, independencia y discrecionalidad a la persona para planearlo y determinar los procedimientos que se deben emplear para llevarlo a cabo.</a:t>
+            </a:r>
+          </a:p>
+          <a:p>
+            <a:endParaRPr lang="es-BO" dirty="0"/>
+          </a:p>
+          <a:p>
+            <a:r>
+              <a:rPr lang="es-BO" dirty="0"/>
+              <a:t>5. Retroalimentación. Grado al cual el desempeño de las actividades requeridas para realizar el trabajo genera para la persona información directa y clara sobre la eficacia de su desempeño.</a:t>
+            </a:r>
+          </a:p>
+          <a:p>
+            <a:endParaRPr lang="es-ES" dirty="0"/>
+          </a:p>
+        </p:txBody>
+      </p:sp>
+    </p:spTree>
+    <p:extLst>
+      <p:ext uri="{BB962C8B-B14F-4D97-AF65-F5344CB8AC3E}">
+        <p14:creationId xmlns:p14="http://schemas.microsoft.com/office/powerpoint/2010/main" val="1987734335"/>
+      </p:ext>
+    </p:extLst>
+  </p:cSld>
+  <p:clrMapOvr>
+    <a:masterClrMapping/>
+  </p:clrMapOvr>
+</p:sld>
+</file>
+
+<file path=ppt/slides/slide13.xml><?xml version="1.0" encoding="utf-8"?>
+<p:sld xmlns:a="http://schemas.openxmlformats.org/drawingml/2006/main" xmlns:r="http://schemas.openxmlformats.org/officeDocument/2006/relationships" xmlns:p="http://schemas.openxmlformats.org/presentationml/2006/main">
+  <p:cSld>
+    <p:spTree>
+      <p:nvGrpSpPr>
+        <p:cNvPr id="1" name=""/>
+        <p:cNvGrpSpPr/>
+        <p:nvPr/>
+      </p:nvGrpSpPr>
+      <p:grpSpPr>
+        <a:xfrm>
+          <a:off x="0" y="0"/>
+          <a:ext cx="0" cy="0"/>
+          <a:chOff x="0" y="0"/>
+          <a:chExt cx="0" cy="0"/>
+        </a:xfrm>
+      </p:grpSpPr>
+      <p:sp>
+        <p:nvSpPr>
+          <p:cNvPr id="2" name="Título 1">
+            <a:extLst>
+              <a:ext uri="{FF2B5EF4-FFF2-40B4-BE49-F238E27FC236}">
+                <a16:creationId xmlns:a16="http://schemas.microsoft.com/office/drawing/2014/main" id="{E28CA087-FA30-60BE-45DB-5FAAAEE20665}"/>
+              </a:ext>
+            </a:extLst>
+          </p:cNvPr>
+          <p:cNvSpPr>
+            <a:spLocks noGrp="1"/>
+          </p:cNvSpPr>
+          <p:nvPr>
+            <p:ph type="title"/>
+          </p:nvPr>
+        </p:nvSpPr>
+        <p:spPr>
+          <a:xfrm>
+            <a:off x="994117" y="964692"/>
+            <a:ext cx="10203766" cy="793770"/>
+          </a:xfrm>
+        </p:spPr>
+        <p:txBody>
+          <a:bodyPr>
+            <a:normAutofit fontScale="90000"/>
+          </a:bodyPr>
+          <a:lstStyle/>
+          <a:p>
+            <a:r>
+              <a:rPr lang="es-BO" b="1" dirty="0"/>
+              <a:t>¿como podemos aprovechar el diseño del trabajo para motivar?</a:t>
+            </a:r>
+          </a:p>
+        </p:txBody>
+      </p:sp>
+      <p:sp>
+        <p:nvSpPr>
+          <p:cNvPr id="7" name="CuadroTexto 6">
+            <a:extLst>
+              <a:ext uri="{FF2B5EF4-FFF2-40B4-BE49-F238E27FC236}">
+                <a16:creationId xmlns:a16="http://schemas.microsoft.com/office/drawing/2014/main" id="{9754003E-35C5-D223-5F22-3C71D7660B60}"/>
+              </a:ext>
+            </a:extLst>
+          </p:cNvPr>
+          <p:cNvSpPr txBox="1"/>
+          <p:nvPr/>
+        </p:nvSpPr>
+        <p:spPr>
+          <a:xfrm>
+            <a:off x="885133" y="2078540"/>
+            <a:ext cx="11075963" cy="1200329"/>
+          </a:xfrm>
+          <a:prstGeom prst="rect">
+            <a:avLst/>
+          </a:prstGeom>
+          <a:noFill/>
+        </p:spPr>
+        <p:txBody>
+          <a:bodyPr wrap="square" rtlCol="0">
+            <a:spAutoFit/>
+          </a:bodyPr>
+          <a:lstStyle/>
+          <a:p>
+            <a:r>
+              <a:rPr lang="es-BO" dirty="0"/>
+              <a:t>Aprovechando este diseño de trabajo e implementarlo con fin motivacional podemos aplicarlo de la siguiente manera:</a:t>
+            </a:r>
+            <a:br>
+              <a:rPr lang="es-BO" dirty="0"/>
+            </a:br>
+            <a:br>
+              <a:rPr lang="es-BO" dirty="0"/>
+            </a:br>
+            <a:endParaRPr lang="es-BO" dirty="0"/>
+          </a:p>
+          <a:p>
+            <a:endParaRPr lang="es-ES" dirty="0"/>
+          </a:p>
+        </p:txBody>
+      </p:sp>
+      <p:sp>
+        <p:nvSpPr>
+          <p:cNvPr id="3" name="CuadroTexto 2">
+            <a:extLst>
+              <a:ext uri="{FF2B5EF4-FFF2-40B4-BE49-F238E27FC236}">
+                <a16:creationId xmlns:a16="http://schemas.microsoft.com/office/drawing/2014/main" id="{78C952BA-3E12-7593-0A63-145A07F0C910}"/>
+              </a:ext>
+            </a:extLst>
+          </p:cNvPr>
+          <p:cNvSpPr txBox="1"/>
+          <p:nvPr/>
+        </p:nvSpPr>
+        <p:spPr>
+          <a:xfrm>
+            <a:off x="885133" y="2628122"/>
+            <a:ext cx="4453784" cy="3416320"/>
+          </a:xfrm>
+          <a:prstGeom prst="rect">
+            <a:avLst/>
+          </a:prstGeom>
+          <a:noFill/>
+        </p:spPr>
+        <p:txBody>
+          <a:bodyPr wrap="square" rtlCol="0">
+            <a:spAutoFit/>
+          </a:bodyPr>
+          <a:lstStyle/>
+          <a:p>
+            <a:r>
+              <a:rPr lang="es-BO" b="1" dirty="0"/>
+              <a:t>1. Implementar rotación de tareas</a:t>
+            </a:r>
+            <a:r>
+              <a:rPr lang="es-BO" dirty="0"/>
+              <a:t>: Siguiendo el modelo de características del trabajo, </a:t>
+            </a:r>
+            <a:r>
+              <a:rPr lang="es-BO" dirty="0" err="1"/>
+              <a:t>Delizia</a:t>
+            </a:r>
+            <a:r>
+              <a:rPr lang="es-BO" dirty="0"/>
+              <a:t> puede diseñar los puestos de trabajo de manera que los empleados tengan la oportunidad de realizar una variedad de tareas. En lugar de asignar a cada empleado una tarea específica de forma permanente, se puede establecer un sistema de rotación de tareas que permita a los empleados adquirir nuevas habilidades y experimentar diferentes aspectos del proceso de fabricación de helados. </a:t>
+            </a:r>
+            <a:endParaRPr lang="es-ES" dirty="0"/>
+          </a:p>
+        </p:txBody>
+      </p:sp>
+      <p:pic>
+        <p:nvPicPr>
+          <p:cNvPr id="2050" name="Picture 2" descr="PROCESO DE FABRICACIÓN DEL HELADO - HeladoArtesanal.com">
+            <a:extLst>
+              <a:ext uri="{FF2B5EF4-FFF2-40B4-BE49-F238E27FC236}">
+                <a16:creationId xmlns:a16="http://schemas.microsoft.com/office/drawing/2014/main" id="{A69798A7-478E-2D93-1216-1F6019F994C6}"/>
+              </a:ext>
+            </a:extLst>
+          </p:cNvPr>
+          <p:cNvPicPr>
+            <a:picLocks noChangeAspect="1" noChangeArrowheads="1"/>
+          </p:cNvPicPr>
+          <p:nvPr/>
+        </p:nvPicPr>
+        <p:blipFill>
+          <a:blip r:embed="rId2">
+            <a:extLst>
+              <a:ext uri="{28A0092B-C50C-407E-A947-70E740481C1C}">
+                <a14:useLocalDpi xmlns:a14="http://schemas.microsoft.com/office/drawing/2010/main" val="0"/>
+              </a:ext>
+            </a:extLst>
+          </a:blip>
+          <a:srcRect/>
+          <a:stretch>
+            <a:fillRect/>
+          </a:stretch>
+        </p:blipFill>
+        <p:spPr bwMode="auto">
+          <a:xfrm>
+            <a:off x="6096000" y="3113534"/>
+            <a:ext cx="4323350" cy="2179689"/>
+          </a:xfrm>
+          <a:prstGeom prst="rect">
+            <a:avLst/>
+          </a:prstGeom>
+          <a:noFill/>
+          <a:extLst>
+            <a:ext uri="{909E8E84-426E-40DD-AFC4-6F175D3DCCD1}">
+              <a14:hiddenFill xmlns:a14="http://schemas.microsoft.com/office/drawing/2010/main">
+                <a:solidFill>
+                  <a:srgbClr val="FFFFFF"/>
+                </a:solidFill>
+              </a14:hiddenFill>
+            </a:ext>
+          </a:extLst>
+        </p:spPr>
+      </p:pic>
+    </p:spTree>
+    <p:extLst>
+      <p:ext uri="{BB962C8B-B14F-4D97-AF65-F5344CB8AC3E}">
+        <p14:creationId xmlns:p14="http://schemas.microsoft.com/office/powerpoint/2010/main" val="3958070904"/>
+      </p:ext>
+    </p:extLst>
+  </p:cSld>
+  <p:clrMapOvr>
+    <a:masterClrMapping/>
+  </p:clrMapOvr>
+</p:sld>
+</file>
+
+<file path=ppt/slides/slide14.xml><?xml version="1.0" encoding="utf-8"?>
+<p:sld xmlns:a="http://schemas.openxmlformats.org/drawingml/2006/main" xmlns:r="http://schemas.openxmlformats.org/officeDocument/2006/relationships" xmlns:p="http://schemas.openxmlformats.org/presentationml/2006/main">
+  <p:cSld>
+    <p:spTree>
+      <p:nvGrpSpPr>
+        <p:cNvPr id="1" name=""/>
+        <p:cNvGrpSpPr/>
+        <p:nvPr/>
+      </p:nvGrpSpPr>
+      <p:grpSpPr>
+        <a:xfrm>
+          <a:off x="0" y="0"/>
+          <a:ext cx="0" cy="0"/>
+          <a:chOff x="0" y="0"/>
+          <a:chExt cx="0" cy="0"/>
+        </a:xfrm>
+      </p:grpSpPr>
+      <p:sp>
+        <p:nvSpPr>
+          <p:cNvPr id="2" name="Título 1">
+            <a:extLst>
+              <a:ext uri="{FF2B5EF4-FFF2-40B4-BE49-F238E27FC236}">
+                <a16:creationId xmlns:a16="http://schemas.microsoft.com/office/drawing/2014/main" id="{E28CA087-FA30-60BE-45DB-5FAAAEE20665}"/>
+              </a:ext>
+            </a:extLst>
+          </p:cNvPr>
+          <p:cNvSpPr>
+            <a:spLocks noGrp="1"/>
+          </p:cNvSpPr>
+          <p:nvPr>
+            <p:ph type="title"/>
+          </p:nvPr>
+        </p:nvSpPr>
+        <p:spPr>
+          <a:xfrm>
+            <a:off x="994117" y="964692"/>
+            <a:ext cx="10203766" cy="793770"/>
+          </a:xfrm>
+        </p:spPr>
+        <p:txBody>
+          <a:bodyPr>
+            <a:normAutofit fontScale="90000"/>
+          </a:bodyPr>
+          <a:lstStyle/>
+          <a:p>
+            <a:r>
+              <a:rPr lang="es-BO" b="1" dirty="0"/>
+              <a:t>¿como podemos aprovechar el diseño del trabajo para motivar?</a:t>
+            </a:r>
+          </a:p>
+        </p:txBody>
+      </p:sp>
+      <p:sp>
+        <p:nvSpPr>
+          <p:cNvPr id="7" name="CuadroTexto 6">
+            <a:extLst>
+              <a:ext uri="{FF2B5EF4-FFF2-40B4-BE49-F238E27FC236}">
+                <a16:creationId xmlns:a16="http://schemas.microsoft.com/office/drawing/2014/main" id="{9754003E-35C5-D223-5F22-3C71D7660B60}"/>
+              </a:ext>
+            </a:extLst>
+          </p:cNvPr>
+          <p:cNvSpPr txBox="1"/>
+          <p:nvPr/>
+        </p:nvSpPr>
+        <p:spPr>
+          <a:xfrm>
+            <a:off x="6452382" y="2037591"/>
+            <a:ext cx="3282462" cy="4524315"/>
+          </a:xfrm>
+          <a:prstGeom prst="rect">
+            <a:avLst/>
+          </a:prstGeom>
+          <a:noFill/>
+        </p:spPr>
+        <p:txBody>
+          <a:bodyPr wrap="square" rtlCol="0">
+            <a:spAutoFit/>
+          </a:bodyPr>
+          <a:lstStyle/>
+          <a:p>
+            <a:r>
+              <a:rPr lang="es-AR" sz="1800" b="1" dirty="0">
+                <a:effectLst/>
+                <a:latin typeface="Calibri" panose="020F0502020204030204" pitchFamily="34" charset="0"/>
+                <a:ea typeface="Calibri" panose="020F0502020204030204" pitchFamily="34" charset="0"/>
+                <a:cs typeface="Arial" panose="020B0604020202020204" pitchFamily="34" charset="0"/>
+              </a:rPr>
+              <a:t>2. Fomentar la autonomía</a:t>
+            </a:r>
+            <a:r>
+              <a:rPr lang="es-AR" sz="1800" dirty="0">
+                <a:effectLst/>
+                <a:latin typeface="Calibri" panose="020F0502020204030204" pitchFamily="34" charset="0"/>
+                <a:ea typeface="Calibri" panose="020F0502020204030204" pitchFamily="34" charset="0"/>
+                <a:cs typeface="Arial" panose="020B0604020202020204" pitchFamily="34" charset="0"/>
+              </a:rPr>
+              <a:t>: Otro aspecto importante del diseño del trabajo es la autonomía. </a:t>
+            </a:r>
+            <a:r>
+              <a:rPr lang="es-AR" sz="1800" dirty="0" err="1">
+                <a:effectLst/>
+                <a:latin typeface="Calibri" panose="020F0502020204030204" pitchFamily="34" charset="0"/>
+                <a:ea typeface="Calibri" panose="020F0502020204030204" pitchFamily="34" charset="0"/>
+                <a:cs typeface="Arial" panose="020B0604020202020204" pitchFamily="34" charset="0"/>
+              </a:rPr>
+              <a:t>Delizia</a:t>
+            </a:r>
+            <a:r>
+              <a:rPr lang="es-AR" sz="1800" dirty="0">
+                <a:effectLst/>
+                <a:latin typeface="Calibri" panose="020F0502020204030204" pitchFamily="34" charset="0"/>
+                <a:ea typeface="Calibri" panose="020F0502020204030204" pitchFamily="34" charset="0"/>
+                <a:cs typeface="Arial" panose="020B0604020202020204" pitchFamily="34" charset="0"/>
+              </a:rPr>
+              <a:t> puede otorgar a sus empleados un mayor grado de libertad e independencia en la planificación y ejecución de sus tareas diarias, especialmente en el área de marketing y ventas donde se puede otorgar libertades para promover el surgimiento de ideas creativas para nuevos productos.</a:t>
+            </a:r>
+            <a:br>
+              <a:rPr lang="es-BO" dirty="0"/>
+            </a:br>
+            <a:br>
+              <a:rPr lang="es-BO" dirty="0"/>
+            </a:br>
+            <a:endParaRPr lang="es-BO" dirty="0"/>
+          </a:p>
+          <a:p>
+            <a:endParaRPr lang="es-ES" dirty="0"/>
+          </a:p>
+        </p:txBody>
+      </p:sp>
+      <p:pic>
+        <p:nvPicPr>
+          <p:cNvPr id="2052" name="Picture 4" descr="Colección De Dibujos De Helado Vector Dibujado Mano Linda. Conos Y Helados  De Diferentes Sabores Hechas En El Estilo De Dibujo. Ilustraciones Svg,  Vectoriales, Clip Art Vectorizado Libre De Derechos. Image 38006136.">
+            <a:extLst>
+              <a:ext uri="{FF2B5EF4-FFF2-40B4-BE49-F238E27FC236}">
+                <a16:creationId xmlns:a16="http://schemas.microsoft.com/office/drawing/2014/main" id="{EB583C3C-09E9-929B-6621-A8032C8577CA}"/>
+              </a:ext>
+            </a:extLst>
+          </p:cNvPr>
+          <p:cNvPicPr>
+            <a:picLocks noChangeAspect="1" noChangeArrowheads="1"/>
+          </p:cNvPicPr>
+          <p:nvPr/>
+        </p:nvPicPr>
+        <p:blipFill>
+          <a:blip r:embed="rId2">
+            <a:extLst>
+              <a:ext uri="{28A0092B-C50C-407E-A947-70E740481C1C}">
+                <a14:useLocalDpi xmlns:a14="http://schemas.microsoft.com/office/drawing/2010/main" val="0"/>
+              </a:ext>
+            </a:extLst>
+          </a:blip>
+          <a:srcRect/>
+          <a:stretch>
+            <a:fillRect/>
+          </a:stretch>
+        </p:blipFill>
+        <p:spPr bwMode="auto">
+          <a:xfrm>
+            <a:off x="1780736" y="2037591"/>
+            <a:ext cx="3749040" cy="3749040"/>
+          </a:xfrm>
+          <a:prstGeom prst="rect">
+            <a:avLst/>
+          </a:prstGeom>
+          <a:noFill/>
+          <a:extLst>
+            <a:ext uri="{909E8E84-426E-40DD-AFC4-6F175D3DCCD1}">
+              <a14:hiddenFill xmlns:a14="http://schemas.microsoft.com/office/drawing/2010/main">
+                <a:solidFill>
+                  <a:srgbClr val="FFFFFF"/>
+                </a:solidFill>
+              </a14:hiddenFill>
+            </a:ext>
+          </a:extLst>
+        </p:spPr>
+      </p:pic>
+    </p:spTree>
+    <p:extLst>
+      <p:ext uri="{BB962C8B-B14F-4D97-AF65-F5344CB8AC3E}">
+        <p14:creationId xmlns:p14="http://schemas.microsoft.com/office/powerpoint/2010/main" val="1216260591"/>
+      </p:ext>
+    </p:extLst>
+  </p:cSld>
+  <p:clrMapOvr>
+    <a:masterClrMapping/>
+  </p:clrMapOvr>
+</p:sld>
+</file>
+
+<file path=ppt/slides/slide15.xml><?xml version="1.0" encoding="utf-8"?>
+<p:sld xmlns:a="http://schemas.openxmlformats.org/drawingml/2006/main" xmlns:r="http://schemas.openxmlformats.org/officeDocument/2006/relationships" xmlns:p="http://schemas.openxmlformats.org/presentationml/2006/main">
+  <p:cSld>
+    <p:spTree>
+      <p:nvGrpSpPr>
+        <p:cNvPr id="1" name=""/>
+        <p:cNvGrpSpPr/>
+        <p:nvPr/>
+      </p:nvGrpSpPr>
+      <p:grpSpPr>
+        <a:xfrm>
+          <a:off x="0" y="0"/>
+          <a:ext cx="0" cy="0"/>
+          <a:chOff x="0" y="0"/>
+          <a:chExt cx="0" cy="0"/>
+        </a:xfrm>
+      </p:grpSpPr>
+      <p:sp>
+        <p:nvSpPr>
+          <p:cNvPr id="2" name="Título 1">
+            <a:extLst>
+              <a:ext uri="{FF2B5EF4-FFF2-40B4-BE49-F238E27FC236}">
+                <a16:creationId xmlns:a16="http://schemas.microsoft.com/office/drawing/2014/main" id="{E28CA087-FA30-60BE-45DB-5FAAAEE20665}"/>
+              </a:ext>
+            </a:extLst>
+          </p:cNvPr>
+          <p:cNvSpPr>
+            <a:spLocks noGrp="1"/>
+          </p:cNvSpPr>
+          <p:nvPr>
+            <p:ph type="title"/>
+          </p:nvPr>
+        </p:nvSpPr>
+        <p:spPr>
+          <a:xfrm>
+            <a:off x="994117" y="964692"/>
+            <a:ext cx="10203766" cy="793770"/>
+          </a:xfrm>
+        </p:spPr>
+        <p:txBody>
+          <a:bodyPr>
+            <a:normAutofit fontScale="90000"/>
+          </a:bodyPr>
+          <a:lstStyle/>
+          <a:p>
+            <a:r>
+              <a:rPr lang="es-BO" b="1" dirty="0"/>
+              <a:t>¿como podemos aprovechar el diseño del trabajo para motivar?</a:t>
+            </a:r>
+          </a:p>
+        </p:txBody>
+      </p:sp>
+      <p:sp>
+        <p:nvSpPr>
+          <p:cNvPr id="7" name="CuadroTexto 6">
+            <a:extLst>
+              <a:ext uri="{FF2B5EF4-FFF2-40B4-BE49-F238E27FC236}">
+                <a16:creationId xmlns:a16="http://schemas.microsoft.com/office/drawing/2014/main" id="{9754003E-35C5-D223-5F22-3C71D7660B60}"/>
+              </a:ext>
+            </a:extLst>
+          </p:cNvPr>
+          <p:cNvSpPr txBox="1"/>
+          <p:nvPr/>
+        </p:nvSpPr>
+        <p:spPr>
+          <a:xfrm>
+            <a:off x="1092592" y="2121997"/>
+            <a:ext cx="5913120" cy="4616648"/>
+          </a:xfrm>
+          <a:prstGeom prst="rect">
+            <a:avLst/>
+          </a:prstGeom>
+          <a:noFill/>
+        </p:spPr>
+        <p:txBody>
+          <a:bodyPr wrap="square" rtlCol="0">
+            <a:spAutoFit/>
+          </a:bodyPr>
+          <a:lstStyle/>
+          <a:p>
+            <a:r>
+              <a:rPr lang="es-BO" sz="2000" b="1" dirty="0">
+                <a:effectLst/>
+                <a:latin typeface="Calibri" panose="020F0502020204030204" pitchFamily="34" charset="0"/>
+                <a:ea typeface="Calibri" panose="020F0502020204030204" pitchFamily="34" charset="0"/>
+                <a:cs typeface="Arial" panose="020B0604020202020204" pitchFamily="34" charset="0"/>
+              </a:rPr>
+              <a:t>3. Fomentar un ambiente de trabajo positivo</a:t>
+            </a:r>
+            <a:r>
+              <a:rPr lang="es-BO" sz="2000" dirty="0">
+                <a:effectLst/>
+                <a:latin typeface="Calibri" panose="020F0502020204030204" pitchFamily="34" charset="0"/>
+                <a:ea typeface="Calibri" panose="020F0502020204030204" pitchFamily="34" charset="0"/>
+                <a:cs typeface="Arial" panose="020B0604020202020204" pitchFamily="34" charset="0"/>
+              </a:rPr>
+              <a:t>: Además de las prácticas de diseño del trabajo, la motivación también se ve influenciada por el entorno laboral. </a:t>
+            </a:r>
+            <a:r>
+              <a:rPr lang="es-BO" sz="2000" dirty="0" err="1">
+                <a:effectLst/>
+                <a:latin typeface="Calibri" panose="020F0502020204030204" pitchFamily="34" charset="0"/>
+                <a:ea typeface="Calibri" panose="020F0502020204030204" pitchFamily="34" charset="0"/>
+                <a:cs typeface="Arial" panose="020B0604020202020204" pitchFamily="34" charset="0"/>
+              </a:rPr>
+              <a:t>Delizia</a:t>
+            </a:r>
+            <a:r>
+              <a:rPr lang="es-BO" sz="2000" dirty="0">
+                <a:effectLst/>
+                <a:latin typeface="Calibri" panose="020F0502020204030204" pitchFamily="34" charset="0"/>
+                <a:ea typeface="Calibri" panose="020F0502020204030204" pitchFamily="34" charset="0"/>
+                <a:cs typeface="Arial" panose="020B0604020202020204" pitchFamily="34" charset="0"/>
+              </a:rPr>
+              <a:t> puede crear un ambiente de trabajo positivo y estimulante, donde se promueva el trabajo en equipo, la colaboración y el reconocimiento mutuo. Esto se puede lograr a través de actividades de construcción de equipos, celebración de logros y creación de espacios de trabajo cómodos y agradables. Un ambiente positivo fomenta la motivación intrínseca y fortalece el compromiso de los empleados con la empresa.</a:t>
+            </a:r>
+            <a:r>
+              <a:rPr lang="es-AR" sz="2000" dirty="0">
+                <a:effectLst/>
+                <a:latin typeface="Calibri" panose="020F0502020204030204" pitchFamily="34" charset="0"/>
+                <a:ea typeface="Calibri" panose="020F0502020204030204" pitchFamily="34" charset="0"/>
+                <a:cs typeface="Arial" panose="020B0604020202020204" pitchFamily="34" charset="0"/>
+              </a:rPr>
+              <a:t>.</a:t>
+            </a:r>
+            <a:br>
+              <a:rPr lang="es-BO" dirty="0"/>
+            </a:br>
+            <a:br>
+              <a:rPr lang="es-BO" dirty="0"/>
+            </a:br>
+            <a:endParaRPr lang="es-BO" dirty="0"/>
+          </a:p>
+          <a:p>
+            <a:endParaRPr lang="es-ES" dirty="0"/>
+          </a:p>
+        </p:txBody>
+      </p:sp>
+      <p:pic>
+        <p:nvPicPr>
+          <p:cNvPr id="3074" name="Picture 2" descr="Creating A Positive Workplace Culture - A Little Kindness Goes A Long Way |  HuffPost Contributor">
+            <a:extLst>
+              <a:ext uri="{FF2B5EF4-FFF2-40B4-BE49-F238E27FC236}">
+                <a16:creationId xmlns:a16="http://schemas.microsoft.com/office/drawing/2014/main" id="{7B2013D5-DA9D-56AF-0DD4-4F5F846CFD41}"/>
+              </a:ext>
+            </a:extLst>
+          </p:cNvPr>
+          <p:cNvPicPr>
+            <a:picLocks noChangeAspect="1" noChangeArrowheads="1"/>
+          </p:cNvPicPr>
+          <p:nvPr/>
+        </p:nvPicPr>
+        <p:blipFill>
+          <a:blip r:embed="rId2">
+            <a:extLst>
+              <a:ext uri="{28A0092B-C50C-407E-A947-70E740481C1C}">
+                <a14:useLocalDpi xmlns:a14="http://schemas.microsoft.com/office/drawing/2010/main" val="0"/>
+              </a:ext>
+            </a:extLst>
+          </a:blip>
+          <a:srcRect/>
+          <a:stretch>
+            <a:fillRect/>
+          </a:stretch>
+        </p:blipFill>
+        <p:spPr bwMode="auto">
+          <a:xfrm>
+            <a:off x="7162874" y="2121998"/>
+            <a:ext cx="4354655" cy="2977542"/>
+          </a:xfrm>
+          <a:prstGeom prst="rect">
+            <a:avLst/>
+          </a:prstGeom>
+          <a:noFill/>
+          <a:extLst>
+            <a:ext uri="{909E8E84-426E-40DD-AFC4-6F175D3DCCD1}">
+              <a14:hiddenFill xmlns:a14="http://schemas.microsoft.com/office/drawing/2010/main">
+                <a:solidFill>
+                  <a:srgbClr val="FFFFFF"/>
+                </a:solidFill>
+              </a14:hiddenFill>
+            </a:ext>
+          </a:extLst>
+        </p:spPr>
+      </p:pic>
+    </p:spTree>
+    <p:extLst>
+      <p:ext uri="{BB962C8B-B14F-4D97-AF65-F5344CB8AC3E}">
+        <p14:creationId xmlns:p14="http://schemas.microsoft.com/office/powerpoint/2010/main" val="1504539169"/>
+      </p:ext>
+    </p:extLst>
+  </p:cSld>
+  <p:clrMapOvr>
+    <a:masterClrMapping/>
+  </p:clrMapOvr>
+</p:sld>
+</file>
+
+<file path=ppt/slides/slide16.xml><?xml version="1.0" encoding="utf-8"?>
+<p:sld xmlns:a="http://schemas.openxmlformats.org/drawingml/2006/main" xmlns:r="http://schemas.openxmlformats.org/officeDocument/2006/relationships" xmlns:p="http://schemas.openxmlformats.org/presentationml/2006/main">
+  <p:cSld>
+    <p:spTree>
+      <p:nvGrpSpPr>
+        <p:cNvPr id="1" name=""/>
+        <p:cNvGrpSpPr/>
+        <p:nvPr/>
+      </p:nvGrpSpPr>
+      <p:grpSpPr>
+        <a:xfrm>
+          <a:off x="0" y="0"/>
+          <a:ext cx="0" cy="0"/>
+          <a:chOff x="0" y="0"/>
+          <a:chExt cx="0" cy="0"/>
+        </a:xfrm>
+      </p:grpSpPr>
+      <p:sp>
+        <p:nvSpPr>
+          <p:cNvPr id="2" name="Título 1">
+            <a:extLst>
+              <a:ext uri="{FF2B5EF4-FFF2-40B4-BE49-F238E27FC236}">
+                <a16:creationId xmlns:a16="http://schemas.microsoft.com/office/drawing/2014/main" id="{E28CA087-FA30-60BE-45DB-5FAAAEE20665}"/>
+              </a:ext>
+            </a:extLst>
+          </p:cNvPr>
+          <p:cNvSpPr>
+            <a:spLocks noGrp="1"/>
+          </p:cNvSpPr>
+          <p:nvPr>
+            <p:ph type="title"/>
+          </p:nvPr>
+        </p:nvSpPr>
+        <p:spPr>
+          <a:xfrm>
+            <a:off x="994117" y="964692"/>
+            <a:ext cx="10203766" cy="793770"/>
+          </a:xfrm>
+        </p:spPr>
+        <p:txBody>
+          <a:bodyPr>
+            <a:normAutofit fontScale="90000"/>
+          </a:bodyPr>
+          <a:lstStyle/>
+          <a:p>
+            <a:r>
+              <a:rPr lang="es-BO" b="1" dirty="0"/>
+              <a:t>¿como podemos aprovechar el diseño del trabajo para motivar?</a:t>
+            </a:r>
+          </a:p>
+        </p:txBody>
+      </p:sp>
+      <p:sp>
+        <p:nvSpPr>
+          <p:cNvPr id="7" name="CuadroTexto 6">
+            <a:extLst>
+              <a:ext uri="{FF2B5EF4-FFF2-40B4-BE49-F238E27FC236}">
+                <a16:creationId xmlns:a16="http://schemas.microsoft.com/office/drawing/2014/main" id="{9754003E-35C5-D223-5F22-3C71D7660B60}"/>
+              </a:ext>
+            </a:extLst>
+          </p:cNvPr>
+          <p:cNvSpPr txBox="1"/>
+          <p:nvPr/>
+        </p:nvSpPr>
+        <p:spPr>
+          <a:xfrm>
+            <a:off x="6096000" y="2199989"/>
+            <a:ext cx="4787703" cy="3693319"/>
+          </a:xfrm>
+          <a:prstGeom prst="rect">
+            <a:avLst/>
+          </a:prstGeom>
+          <a:noFill/>
+        </p:spPr>
+        <p:txBody>
+          <a:bodyPr wrap="square" rtlCol="0">
+            <a:spAutoFit/>
+          </a:bodyPr>
+          <a:lstStyle/>
+          <a:p>
+            <a:r>
+              <a:rPr lang="es-BO" sz="2000" b="1" dirty="0">
+                <a:effectLst/>
+                <a:latin typeface="Calibri" panose="020F0502020204030204" pitchFamily="34" charset="0"/>
+                <a:ea typeface="Calibri" panose="020F0502020204030204" pitchFamily="34" charset="0"/>
+                <a:cs typeface="Arial" panose="020B0604020202020204" pitchFamily="34" charset="0"/>
+              </a:rPr>
+              <a:t>4. Proporcionar retroalimentación constante:</a:t>
+            </a:r>
+            <a:r>
+              <a:rPr lang="es-BO" sz="2000" dirty="0">
+                <a:effectLst/>
+                <a:latin typeface="Calibri" panose="020F0502020204030204" pitchFamily="34" charset="0"/>
+                <a:ea typeface="Calibri" panose="020F0502020204030204" pitchFamily="34" charset="0"/>
+                <a:cs typeface="Arial" panose="020B0604020202020204" pitchFamily="34" charset="0"/>
+              </a:rPr>
+              <a:t> La retroalimentación es una dimensión clave en el diseño del trabajo y tiene un impacto significativo en la motivación de los empleados. </a:t>
+            </a:r>
+            <a:r>
+              <a:rPr lang="es-BO" sz="2000" dirty="0" err="1">
+                <a:effectLst/>
+                <a:latin typeface="Calibri" panose="020F0502020204030204" pitchFamily="34" charset="0"/>
+                <a:ea typeface="Calibri" panose="020F0502020204030204" pitchFamily="34" charset="0"/>
+                <a:cs typeface="Arial" panose="020B0604020202020204" pitchFamily="34" charset="0"/>
+              </a:rPr>
+              <a:t>Delizia</a:t>
+            </a:r>
+            <a:r>
+              <a:rPr lang="es-BO" sz="2000" dirty="0">
+                <a:effectLst/>
+                <a:latin typeface="Calibri" panose="020F0502020204030204" pitchFamily="34" charset="0"/>
+                <a:ea typeface="Calibri" panose="020F0502020204030204" pitchFamily="34" charset="0"/>
+                <a:cs typeface="Arial" panose="020B0604020202020204" pitchFamily="34" charset="0"/>
+              </a:rPr>
+              <a:t> puede implementar un sistema de retroalimentación constante y constructiva, donde se reconozcan los logros y se brinde orientación para mejorar el desempeño. </a:t>
+            </a:r>
+            <a:br>
+              <a:rPr lang="es-BO" dirty="0"/>
+            </a:br>
+            <a:br>
+              <a:rPr lang="es-BO" dirty="0"/>
+            </a:br>
+            <a:endParaRPr lang="es-BO" dirty="0"/>
+          </a:p>
+          <a:p>
+            <a:endParaRPr lang="es-ES" dirty="0"/>
+          </a:p>
+        </p:txBody>
+      </p:sp>
+      <p:pic>
+        <p:nvPicPr>
+          <p:cNvPr id="4098" name="Picture 2" descr="Positive Feedback in Practice Management (Why and How to Focus on This) -  Power Diary Blog">
+            <a:extLst>
+              <a:ext uri="{FF2B5EF4-FFF2-40B4-BE49-F238E27FC236}">
+                <a16:creationId xmlns:a16="http://schemas.microsoft.com/office/drawing/2014/main" id="{7A738A7C-8E08-8FB1-2B11-F9A9B0CB3577}"/>
+              </a:ext>
+            </a:extLst>
+          </p:cNvPr>
+          <p:cNvPicPr>
+            <a:picLocks noChangeAspect="1" noChangeArrowheads="1"/>
+          </p:cNvPicPr>
+          <p:nvPr/>
+        </p:nvPicPr>
+        <p:blipFill>
+          <a:blip r:embed="rId2">
+            <a:extLst>
+              <a:ext uri="{28A0092B-C50C-407E-A947-70E740481C1C}">
+                <a14:useLocalDpi xmlns:a14="http://schemas.microsoft.com/office/drawing/2010/main" val="0"/>
+              </a:ext>
+            </a:extLst>
+          </a:blip>
+          <a:srcRect/>
+          <a:stretch>
+            <a:fillRect/>
+          </a:stretch>
+        </p:blipFill>
+        <p:spPr bwMode="auto">
+          <a:xfrm>
+            <a:off x="881575" y="2367475"/>
+            <a:ext cx="4876800" cy="2552700"/>
+          </a:xfrm>
+          <a:prstGeom prst="rect">
+            <a:avLst/>
+          </a:prstGeom>
+          <a:noFill/>
+          <a:extLst>
+            <a:ext uri="{909E8E84-426E-40DD-AFC4-6F175D3DCCD1}">
+              <a14:hiddenFill xmlns:a14="http://schemas.microsoft.com/office/drawing/2010/main">
+                <a:solidFill>
+                  <a:srgbClr val="FFFFFF"/>
+                </a:solidFill>
+              </a14:hiddenFill>
+            </a:ext>
+          </a:extLst>
+        </p:spPr>
+      </p:pic>
+    </p:spTree>
+    <p:extLst>
+      <p:ext uri="{BB962C8B-B14F-4D97-AF65-F5344CB8AC3E}">
+        <p14:creationId xmlns:p14="http://schemas.microsoft.com/office/powerpoint/2010/main" val="3430685095"/>
+      </p:ext>
+    </p:extLst>
+  </p:cSld>
+  <p:clrMapOvr>
+    <a:masterClrMapping/>
+  </p:clrMapOvr>
+</p:sld>
+</file>
+
+<file path=ppt/slides/slide17.xml><?xml version="1.0" encoding="utf-8"?>
+<p:sld xmlns:a="http://schemas.openxmlformats.org/drawingml/2006/main" xmlns:r="http://schemas.openxmlformats.org/officeDocument/2006/relationships" xmlns:p="http://schemas.openxmlformats.org/presentationml/2006/main">
+  <p:cSld>
+    <p:spTree>
+      <p:nvGrpSpPr>
+        <p:cNvPr id="1" name=""/>
+        <p:cNvGrpSpPr/>
+        <p:nvPr/>
+      </p:nvGrpSpPr>
+      <p:grpSpPr>
+        <a:xfrm>
+          <a:off x="0" y="0"/>
+          <a:ext cx="0" cy="0"/>
+          <a:chOff x="0" y="0"/>
+          <a:chExt cx="0" cy="0"/>
+        </a:xfrm>
+      </p:grpSpPr>
+      <p:sp>
+        <p:nvSpPr>
+          <p:cNvPr id="2" name="Título 1">
+            <a:extLst>
+              <a:ext uri="{FF2B5EF4-FFF2-40B4-BE49-F238E27FC236}">
+                <a16:creationId xmlns:a16="http://schemas.microsoft.com/office/drawing/2014/main" id="{E28CA087-FA30-60BE-45DB-5FAAAEE20665}"/>
+              </a:ext>
+            </a:extLst>
+          </p:cNvPr>
+          <p:cNvSpPr>
+            <a:spLocks noGrp="1"/>
+          </p:cNvSpPr>
+          <p:nvPr>
+            <p:ph type="title"/>
+          </p:nvPr>
+        </p:nvSpPr>
+        <p:spPr>
+          <a:xfrm>
+            <a:off x="994117" y="964692"/>
+            <a:ext cx="10203766" cy="793770"/>
+          </a:xfrm>
+        </p:spPr>
+        <p:txBody>
           <a:bodyPr/>
           <a:lstStyle/>
           <a:p>
@@ -3587,7 +4761,7 @@
 </p:sld>
 </file>
 
-<file path=ppt/slides/slide12.xml><?xml version="1.0" encoding="utf-8"?>
+<file path=ppt/slides/slide18.xml><?xml version="1.0" encoding="utf-8"?>
 <p:sld xmlns:a="http://schemas.openxmlformats.org/drawingml/2006/main" xmlns:r="http://schemas.openxmlformats.org/officeDocument/2006/relationships" xmlns:p="http://schemas.openxmlformats.org/presentationml/2006/main">
   <p:cSld>
     <p:spTree>

</xml_diff>

<commit_message>
Anadir parte de fundamentos de comportamiento individual y grupos de la administracion
</commit_message>
<xml_diff>
--- a/Presentacion - Exposicion.pptx
+++ b/Presentacion - Exposicion.pptx
@@ -15,14 +15,16 @@
     <p:sldId id="267" r:id="rId9"/>
     <p:sldId id="261" r:id="rId10"/>
     <p:sldId id="263" r:id="rId11"/>
-    <p:sldId id="268" r:id="rId12"/>
-    <p:sldId id="269" r:id="rId13"/>
-    <p:sldId id="271" r:id="rId14"/>
-    <p:sldId id="270" r:id="rId15"/>
-    <p:sldId id="272" r:id="rId16"/>
-    <p:sldId id="273" r:id="rId17"/>
-    <p:sldId id="260" r:id="rId18"/>
-    <p:sldId id="259" r:id="rId19"/>
+    <p:sldId id="275" r:id="rId12"/>
+    <p:sldId id="276" r:id="rId13"/>
+    <p:sldId id="268" r:id="rId14"/>
+    <p:sldId id="269" r:id="rId15"/>
+    <p:sldId id="274" r:id="rId16"/>
+    <p:sldId id="271" r:id="rId17"/>
+    <p:sldId id="270" r:id="rId18"/>
+    <p:sldId id="272" r:id="rId19"/>
+    <p:sldId id="260" r:id="rId20"/>
+    <p:sldId id="259" r:id="rId21"/>
   </p:sldIdLst>
   <p:sldSz cx="12192000" cy="6858000"/>
   <p:notesSz cx="6858000" cy="9144000"/>
@@ -292,7 +294,7 @@
           <a:p>
             <a:fld id="{1160EA64-D806-43AC-9DF2-F8C432F32B4C}" type="datetimeFigureOut">
               <a:rPr lang="en-US" dirty="0"/>
-              <a:t>6/26/2023</a:t>
+              <a:t>6/27/2023</a:t>
             </a:fld>
             <a:endParaRPr lang="en-US" dirty="0"/>
           </a:p>
@@ -458,7 +460,7 @@
           <a:p>
             <a:fld id="{E9F9C37B-1D36-470B-8223-D6C91242EC14}" type="datetimeFigureOut">
               <a:rPr lang="en-US" dirty="0"/>
-              <a:t>6/26/2023</a:t>
+              <a:t>6/27/2023</a:t>
             </a:fld>
             <a:endParaRPr lang="en-US" dirty="0"/>
           </a:p>
@@ -633,7 +635,7 @@
           <a:p>
             <a:fld id="{67C6F52A-A82B-47A2-A83A-8C4C91F2D59F}" type="datetimeFigureOut">
               <a:rPr lang="en-US" dirty="0"/>
-              <a:t>6/26/2023</a:t>
+              <a:t>6/27/2023</a:t>
             </a:fld>
             <a:endParaRPr lang="en-US" dirty="0"/>
           </a:p>
@@ -798,7 +800,7 @@
           <a:p>
             <a:fld id="{F070A7B3-6521-4DCA-87E5-044747A908C1}" type="datetimeFigureOut">
               <a:rPr lang="en-US" dirty="0"/>
-              <a:t>6/26/2023</a:t>
+              <a:t>6/27/2023</a:t>
             </a:fld>
             <a:endParaRPr lang="en-US" dirty="0"/>
           </a:p>
@@ -1062,7 +1064,7 @@
           <a:p>
             <a:fld id="{1160EA64-D806-43AC-9DF2-F8C432F32B4C}" type="datetimeFigureOut">
               <a:rPr lang="en-US" dirty="0"/>
-              <a:t>6/26/2023</a:t>
+              <a:t>6/27/2023</a:t>
             </a:fld>
             <a:endParaRPr lang="en-US" dirty="0"/>
           </a:p>
@@ -1290,7 +1292,7 @@
           <a:p>
             <a:fld id="{AB134690-1557-4C89-A502-4959FE7FAD70}" type="datetimeFigureOut">
               <a:rPr lang="en-US" dirty="0"/>
-              <a:t>6/26/2023</a:t>
+              <a:t>6/27/2023</a:t>
             </a:fld>
             <a:endParaRPr lang="en-US" dirty="0"/>
           </a:p>
@@ -1644,7 +1646,7 @@
           <a:p>
             <a:fld id="{4F7D4976-E339-4826-83B7-FBD03F55ECF8}" type="datetimeFigureOut">
               <a:rPr lang="en-US" dirty="0"/>
-              <a:t>6/26/2023</a:t>
+              <a:t>6/27/2023</a:t>
             </a:fld>
             <a:endParaRPr lang="en-US" dirty="0"/>
           </a:p>
@@ -1780,7 +1782,7 @@
           <a:p>
             <a:fld id="{E1037C31-9E7A-4F99-8774-A0E530DE1A42}" type="datetimeFigureOut">
               <a:rPr lang="en-US" dirty="0"/>
-              <a:t>6/26/2023</a:t>
+              <a:t>6/27/2023</a:t>
             </a:fld>
             <a:endParaRPr lang="en-US" dirty="0"/>
           </a:p>
@@ -1870,7 +1872,7 @@
           <a:p>
             <a:fld id="{C278504F-A551-4DE0-9316-4DCD1D8CC752}" type="datetimeFigureOut">
               <a:rPr lang="en-US" dirty="0"/>
-              <a:t>6/26/2023</a:t>
+              <a:t>6/27/2023</a:t>
             </a:fld>
             <a:endParaRPr lang="en-US" dirty="0"/>
           </a:p>
@@ -2222,7 +2224,7 @@
           <a:p>
             <a:fld id="{D1BE4249-C0D0-4B06-8692-E8BB871AF643}" type="datetimeFigureOut">
               <a:rPr lang="en-US" dirty="0"/>
-              <a:t>6/26/2023</a:t>
+              <a:t>6/27/2023</a:t>
             </a:fld>
             <a:endParaRPr lang="en-US" dirty="0"/>
           </a:p>
@@ -2574,7 +2576,7 @@
           <a:p>
             <a:fld id="{042B0DB6-F5C7-45FB-8CF3-31B45F9C2DAC}" type="datetimeFigureOut">
               <a:rPr lang="en-US" dirty="0"/>
-              <a:t>6/26/2023</a:t>
+              <a:t>6/27/2023</a:t>
             </a:fld>
             <a:endParaRPr lang="en-US" dirty="0"/>
           </a:p>
@@ -2811,7 +2813,7 @@
           <a:p>
             <a:fld id="{1160EA64-D806-43AC-9DF2-F8C432F32B4C}" type="datetimeFigureOut">
               <a:rPr lang="en-US" dirty="0"/>
-              <a:t>6/26/2023</a:t>
+              <a:t>6/27/2023</a:t>
             </a:fld>
             <a:endParaRPr lang="en-US" dirty="0"/>
           </a:p>
@@ -3547,7 +3549,7 @@
           <a:p>
             <a:r>
               <a:rPr lang="es-BO" b="1" dirty="0"/>
-              <a:t>4.	LIDERAZGO c)	Motivar y recompensar a los empleados</a:t>
+              <a:t>4.	LIDERAZGO, Fundamentos de comportamiento individual</a:t>
             </a:r>
           </a:p>
         </p:txBody>
@@ -3570,73 +3572,59 @@
         </p:nvSpPr>
         <p:spPr>
           <a:xfrm>
-            <a:off x="911846" y="2180494"/>
-            <a:ext cx="4773637" cy="1364566"/>
-          </a:xfrm>
-        </p:spPr>
-        <p:txBody>
-          <a:bodyPr/>
-          <a:lstStyle/>
-          <a:p>
-            <a:r>
-              <a:rPr lang="es-AR" sz="1800" i="1" dirty="0">
-                <a:effectLst/>
-                <a:latin typeface="Calibri" panose="020F0502020204030204" pitchFamily="34" charset="0"/>
-                <a:ea typeface="Calibri" panose="020F0502020204030204" pitchFamily="34" charset="0"/>
-                <a:cs typeface="Arial" panose="020B0604020202020204" pitchFamily="34" charset="0"/>
-              </a:rPr>
-              <a:t>La motivación es fundamental en el entorno empresarial, ya que afecta directamente el desempeño, la productividad y la satisfacción de los empleados. </a:t>
-            </a:r>
-            <a:endParaRPr lang="es-BO" dirty="0"/>
-          </a:p>
-        </p:txBody>
-      </p:sp>
-      <p:sp>
-        <p:nvSpPr>
-          <p:cNvPr id="4" name="CuadroTexto 3">
-            <a:extLst>
-              <a:ext uri="{FF2B5EF4-FFF2-40B4-BE49-F238E27FC236}">
-                <a16:creationId xmlns:a16="http://schemas.microsoft.com/office/drawing/2014/main" id="{5CA396EC-CDD8-A424-C378-96A2CD8F32D3}"/>
-              </a:ext>
-            </a:extLst>
-          </p:cNvPr>
-          <p:cNvSpPr txBox="1"/>
-          <p:nvPr/>
-        </p:nvSpPr>
-        <p:spPr>
-          <a:xfrm>
-            <a:off x="6330462" y="4451814"/>
-            <a:ext cx="4656406" cy="1754326"/>
-          </a:xfrm>
-          <a:prstGeom prst="rect">
-            <a:avLst/>
-          </a:prstGeom>
-          <a:noFill/>
-        </p:spPr>
-        <p:txBody>
-          <a:bodyPr wrap="square" rtlCol="0">
-            <a:spAutoFit/>
+            <a:off x="994117" y="1941342"/>
+            <a:ext cx="6712969" cy="3798685"/>
+          </a:xfrm>
+        </p:spPr>
+        <p:txBody>
+          <a:bodyPr>
+            <a:normAutofit/>
           </a:bodyPr>
           <a:lstStyle/>
           <a:p>
-            <a:pPr marL="285750" indent="-285750">
-              <a:buFont typeface="Arial" panose="020B0604020202020204" pitchFamily="34" charset="0"/>
-              <a:buChar char="•"/>
+            <a:pPr marL="0" indent="0">
+              <a:buNone/>
             </a:pPr>
             <a:r>
-              <a:rPr lang="es-BO" i="1" dirty="0"/>
-              <a:t>Los líderes desempeñan un papel crucial en la motivación de los empleados. Su capacidad para comprender y satisfacer las necesidades y expectativas de los miembros del equipo puede influir significativamente en su nivel de motivación. </a:t>
-            </a:r>
-            <a:endParaRPr lang="es-ES" i="1" dirty="0"/>
+              <a:rPr lang="es-BO" dirty="0"/>
+              <a:t>La empresa actualmente utiliza 6 pasos para aplicar los fundamentos del comportamiento individual.</a:t>
+            </a:r>
+          </a:p>
+          <a:p>
+            <a:pPr marL="0" indent="0">
+              <a:buNone/>
+            </a:pPr>
+            <a:r>
+              <a:rPr lang="es-BO" dirty="0"/>
+              <a:t>1- Motivación: Asegurándose de conocer las necesidades y deseos de sus empleados y creando un ambiente de trabajo que fomente la motivación intrínseca. </a:t>
+            </a:r>
+          </a:p>
+          <a:p>
+            <a:pPr marL="0" indent="0">
+              <a:buNone/>
+            </a:pPr>
+            <a:r>
+              <a:rPr lang="es-BO" dirty="0"/>
+              <a:t>2- Comunicación efectiva: Establece canales de comunicación abiertos y transparentes. Fomenta la comunicación bidireccional para que sus empleados se sientan escuchados y puedan expresar sus ideas, preocupaciones y sugerencias.</a:t>
+            </a:r>
+          </a:p>
+          <a:p>
+            <a:pPr marL="0" indent="0">
+              <a:buNone/>
+            </a:pPr>
+            <a:r>
+              <a:rPr lang="es-BO" dirty="0"/>
+              <a:t>3- Liderazgo positivo: Teniendo lideres inspiradores y motivadores. Proporcionando una visión clara y alinea los objetivos y valores de la empresa con los de sus empleados. </a:t>
+            </a:r>
           </a:p>
         </p:txBody>
       </p:sp>
       <p:pic>
         <p:nvPicPr>
-          <p:cNvPr id="1026" name="Picture 2" descr="Motivación laboral: claves y factores de la productividad empresarial -  NeoMercados.com">
+          <p:cNvPr id="1026" name="Picture 2" descr="Leadership team Vectors &amp; Illustrations for Free Download | Freepik">
             <a:extLst>
               <a:ext uri="{FF2B5EF4-FFF2-40B4-BE49-F238E27FC236}">
-                <a16:creationId xmlns:a16="http://schemas.microsoft.com/office/drawing/2014/main" id="{BE2015BA-1B4E-D336-825E-BDBF90E42258}"/>
+                <a16:creationId xmlns:a16="http://schemas.microsoft.com/office/drawing/2014/main" id="{61417C46-B0A8-C945-8447-2319D1A7B00E}"/>
               </a:ext>
             </a:extLst>
           </p:cNvPr>
@@ -3660,8 +3648,8 @@
         </p:blipFill>
         <p:spPr bwMode="auto">
           <a:xfrm>
-            <a:off x="6836377" y="2048612"/>
-            <a:ext cx="3521612" cy="2343991"/>
+            <a:off x="7707086" y="1941341"/>
+            <a:ext cx="4371281" cy="3798685"/>
           </a:xfrm>
           <a:prstGeom prst="rect">
             <a:avLst/>
@@ -3678,57 +3666,10 @@
           </a:extLst>
         </p:spPr>
       </p:pic>
-      <p:pic>
-        <p:nvPicPr>
-          <p:cNvPr id="1028" name="Picture 4" descr="Motivación empresarial: ¿cómo mantenerla en tu personal?">
-            <a:extLst>
-              <a:ext uri="{FF2B5EF4-FFF2-40B4-BE49-F238E27FC236}">
-                <a16:creationId xmlns:a16="http://schemas.microsoft.com/office/drawing/2014/main" id="{4C1A32E2-A18C-23EB-CF9B-B16A94B2BCC1}"/>
-              </a:ext>
-            </a:extLst>
-          </p:cNvPr>
-          <p:cNvPicPr>
-            <a:picLocks noChangeAspect="1" noChangeArrowheads="1"/>
-          </p:cNvPicPr>
-          <p:nvPr/>
-        </p:nvPicPr>
-        <p:blipFill>
-          <a:blip r:embed="rId3">
-            <a:extLst>
-              <a:ext uri="{28A0092B-C50C-407E-A947-70E740481C1C}">
-                <a14:useLocalDpi xmlns:a14="http://schemas.microsoft.com/office/drawing/2010/main" val="0"/>
-              </a:ext>
-            </a:extLst>
-          </a:blip>
-          <a:srcRect/>
-          <a:stretch>
-            <a:fillRect/>
-          </a:stretch>
-        </p:blipFill>
-        <p:spPr bwMode="auto">
-          <a:xfrm>
-            <a:off x="1097332" y="3686779"/>
-            <a:ext cx="4258292" cy="2011045"/>
-          </a:xfrm>
-          <a:prstGeom prst="rect">
-            <a:avLst/>
-          </a:prstGeom>
-          <a:noFill/>
-          <a:extLst>
-            <a:ext uri="{909E8E84-426E-40DD-AFC4-6F175D3DCCD1}">
-              <a14:hiddenFill xmlns:a14="http://schemas.microsoft.com/office/drawing/2010/main">
-                <a:solidFill>
-                  <a:srgbClr val="FFFFFF"/>
-                </a:solidFill>
-              </a14:hiddenFill>
-            </a:ext>
-          </a:extLst>
-        </p:spPr>
-      </p:pic>
     </p:spTree>
     <p:extLst>
       <p:ext uri="{BB962C8B-B14F-4D97-AF65-F5344CB8AC3E}">
-        <p14:creationId xmlns:p14="http://schemas.microsoft.com/office/powerpoint/2010/main" val="4004118298"/>
+        <p14:creationId xmlns:p14="http://schemas.microsoft.com/office/powerpoint/2010/main" val="4136457123"/>
       </p:ext>
     </p:extLst>
   </p:cSld>
@@ -3785,32 +3726,135 @@
           <a:p>
             <a:r>
               <a:rPr lang="es-BO" b="1" dirty="0"/>
-              <a:t>¿como podemos aprovechar el diseño del trabajo para motivar?</a:t>
-            </a:r>
-          </a:p>
-        </p:txBody>
-      </p:sp>
-      <p:sp>
-        <p:nvSpPr>
-          <p:cNvPr id="7" name="CuadroTexto 6">
+              <a:t>4.	LIDERAZGO, Fundamentos de comportamiento individual</a:t>
+            </a:r>
+          </a:p>
+        </p:txBody>
+      </p:sp>
+      <p:sp>
+        <p:nvSpPr>
+          <p:cNvPr id="3" name="Marcador de contenido 2">
             <a:extLst>
               <a:ext uri="{FF2B5EF4-FFF2-40B4-BE49-F238E27FC236}">
-                <a16:creationId xmlns:a16="http://schemas.microsoft.com/office/drawing/2014/main" id="{9754003E-35C5-D223-5F22-3C71D7660B60}"/>
+                <a16:creationId xmlns:a16="http://schemas.microsoft.com/office/drawing/2014/main" id="{A03F4793-332F-447C-FEBA-8C99D67BE98B}"/>
               </a:ext>
             </a:extLst>
           </p:cNvPr>
-          <p:cNvSpPr txBox="1"/>
+          <p:cNvSpPr>
+            <a:spLocks noGrp="1"/>
+          </p:cNvSpPr>
+          <p:nvPr>
+            <p:ph idx="1"/>
+          </p:nvPr>
+        </p:nvSpPr>
+        <p:spPr>
+          <a:xfrm>
+            <a:off x="5721177" y="2094623"/>
+            <a:ext cx="5476705" cy="3798685"/>
+          </a:xfrm>
+        </p:spPr>
+        <p:txBody>
+          <a:bodyPr>
+            <a:normAutofit/>
+          </a:bodyPr>
+          <a:lstStyle/>
+          <a:p>
+            <a:pPr marL="0" indent="0">
+              <a:buNone/>
+            </a:pPr>
+            <a:r>
+              <a:rPr lang="es-BO" dirty="0"/>
+              <a:t>4- Capacitación: Realiza Inversión en la capacitación de sus empleados. Proporcionando oportunidades de aprendizaje y crecimiento profesional.</a:t>
+            </a:r>
+          </a:p>
+          <a:p>
+            <a:pPr marL="0" indent="0">
+              <a:buNone/>
+            </a:pPr>
+            <a:r>
+              <a:rPr lang="es-BO" dirty="0"/>
+              <a:t>5- Reconocimiento y recompensas: Reconoce y recompensa los logros y contribuciones de sus empleados. Celebra los éxitos individuales y de equipo, realizando reconocimientos que valoran el esfuerzo y el desempeño excepcional.</a:t>
+            </a:r>
+          </a:p>
+          <a:p>
+            <a:pPr marL="0" indent="0">
+              <a:buNone/>
+            </a:pPr>
+            <a:r>
+              <a:rPr lang="es-BO" dirty="0"/>
+              <a:t>6- Fomento de un ambiente de trabajo positivo: Creando un ambiente de trabajo positivo y saludable. Promoviendo la colaboración, el respeto mutuo y la diversidad.</a:t>
+            </a:r>
+          </a:p>
+        </p:txBody>
+      </p:sp>
+      <p:pic>
+        <p:nvPicPr>
+          <p:cNvPr id="5" name="Picture 2" descr="PROCESO DE FABRICACIÓN DEL HELADO - HeladoArtesanal.com">
+            <a:extLst>
+              <a:ext uri="{FF2B5EF4-FFF2-40B4-BE49-F238E27FC236}">
+                <a16:creationId xmlns:a16="http://schemas.microsoft.com/office/drawing/2014/main" id="{1C3EA31B-8FC2-F442-B4E0-95A0D2B28259}"/>
+              </a:ext>
+            </a:extLst>
+          </p:cNvPr>
+          <p:cNvPicPr>
+            <a:picLocks noChangeAspect="1" noChangeArrowheads="1"/>
+          </p:cNvPicPr>
           <p:nvPr/>
-        </p:nvSpPr>
-        <p:spPr>
-          <a:xfrm>
-            <a:off x="740898" y="1913205"/>
-            <a:ext cx="11075963" cy="4524315"/>
+        </p:nvPicPr>
+        <p:blipFill>
+          <a:blip r:embed="rId2">
+            <a:extLst>
+              <a:ext uri="{28A0092B-C50C-407E-A947-70E740481C1C}">
+                <a14:useLocalDpi xmlns:a14="http://schemas.microsoft.com/office/drawing/2010/main" val="0"/>
+              </a:ext>
+            </a:extLst>
+          </a:blip>
+          <a:srcRect/>
+          <a:stretch>
+            <a:fillRect/>
+          </a:stretch>
+        </p:blipFill>
+        <p:spPr bwMode="auto">
+          <a:xfrm>
+            <a:off x="994117" y="2094623"/>
+            <a:ext cx="4323350" cy="2179689"/>
           </a:xfrm>
           <a:prstGeom prst="rect">
             <a:avLst/>
           </a:prstGeom>
           <a:noFill/>
+          <a:extLst>
+            <a:ext uri="{909E8E84-426E-40DD-AFC4-6F175D3DCCD1}">
+              <a14:hiddenFill xmlns:a14="http://schemas.microsoft.com/office/drawing/2010/main">
+                <a:solidFill>
+                  <a:srgbClr val="FFFFFF"/>
+                </a:solidFill>
+              </a14:hiddenFill>
+            </a:ext>
+          </a:extLst>
+        </p:spPr>
+      </p:pic>
+      <p:sp>
+        <p:nvSpPr>
+          <p:cNvPr id="4" name="CuadroTexto 3">
+            <a:extLst>
+              <a:ext uri="{FF2B5EF4-FFF2-40B4-BE49-F238E27FC236}">
+                <a16:creationId xmlns:a16="http://schemas.microsoft.com/office/drawing/2014/main" id="{74DAB2F0-CD20-A450-052C-15F7F6BE7011}"/>
+              </a:ext>
+            </a:extLst>
+          </p:cNvPr>
+          <p:cNvSpPr txBox="1"/>
+          <p:nvPr/>
+        </p:nvSpPr>
+        <p:spPr>
+          <a:xfrm>
+            <a:off x="994117" y="5906303"/>
+            <a:ext cx="10374099" cy="646331"/>
+          </a:xfrm>
+          <a:prstGeom prst="rect">
+            <a:avLst/>
+          </a:prstGeom>
+          <a:noFill/>
         </p:spPr>
         <p:txBody>
           <a:bodyPr wrap="square" rtlCol="0">
@@ -3818,66 +3862,19 @@
           </a:bodyPr>
           <a:lstStyle/>
           <a:p>
-            <a:r>
-              <a:rPr lang="es-BO" dirty="0"/>
-              <a:t>Cualquier trabajo puede describirse en términos de las siguientes cinco dimensiones:</a:t>
-            </a:r>
-            <a:br>
-              <a:rPr lang="es-BO" dirty="0"/>
-            </a:br>
-            <a:endParaRPr lang="es-BO" dirty="0"/>
-          </a:p>
-          <a:p>
-            <a:r>
-              <a:rPr lang="es-BO" dirty="0"/>
-              <a:t>1. Variedad de habilidades. Grado al cual el trabajo requiere una variedad de habilidades de manera que el trabajador pueda utilizar muchas habilidades y talentos diferentes.</a:t>
-            </a:r>
-          </a:p>
-          <a:p>
-            <a:endParaRPr lang="es-BO" dirty="0"/>
-          </a:p>
-          <a:p>
-            <a:r>
-              <a:rPr lang="es-BO" dirty="0"/>
-              <a:t>2. Identidad de la tarea. Grado al que la tarea tiene como finalidad terminar una pieza de trabajo completa e identificable.</a:t>
-            </a:r>
-          </a:p>
-          <a:p>
-            <a:endParaRPr lang="es-BO" dirty="0"/>
-          </a:p>
-          <a:p>
-            <a:r>
-              <a:rPr lang="es-BO" dirty="0"/>
-              <a:t>3. Importancia de la tarea. Grado al que la tarea afecta la vida o el trabajo de otras personas.</a:t>
-            </a:r>
-          </a:p>
-          <a:p>
-            <a:endParaRPr lang="es-BO" dirty="0"/>
-          </a:p>
-          <a:p>
-            <a:r>
-              <a:rPr lang="es-BO" dirty="0"/>
-              <a:t>4. Autonomía. Grado al que el trabajo ofrece libertad, independencia y discrecionalidad a la persona para planearlo y determinar los procedimientos que se deben emplear para llevarlo a cabo.</a:t>
-            </a:r>
-          </a:p>
-          <a:p>
-            <a:endParaRPr lang="es-BO" dirty="0"/>
-          </a:p>
-          <a:p>
-            <a:r>
-              <a:rPr lang="es-BO" dirty="0"/>
-              <a:t>5. Retroalimentación. Grado al cual el desempeño de las actividades requeridas para realizar el trabajo genera para la persona información directa y clara sobre la eficacia de su desempeño.</a:t>
-            </a:r>
-          </a:p>
-          <a:p>
-            <a:endParaRPr lang="es-ES" dirty="0"/>
+            <a:pPr algn="ctr"/>
+            <a:r>
+              <a:rPr lang="es-BO" i="1" dirty="0"/>
+              <a:t>Comprendiendo que el comportamiento individual es decisivo para una administración eficiente, puesto que el desempeño individual es la base del rendimiento organizacional. </a:t>
+            </a:r>
+            <a:endParaRPr lang="es-ES" i="1" dirty="0"/>
           </a:p>
         </p:txBody>
       </p:sp>
     </p:spTree>
     <p:extLst>
       <p:ext uri="{BB962C8B-B14F-4D97-AF65-F5344CB8AC3E}">
-        <p14:creationId xmlns:p14="http://schemas.microsoft.com/office/powerpoint/2010/main" val="1987734335"/>
+        <p14:creationId xmlns:p14="http://schemas.microsoft.com/office/powerpoint/2010/main" val="4052977555"/>
       </p:ext>
     </p:extLst>
   </p:cSld>
@@ -3934,17 +3931,77 @@
           <a:p>
             <a:r>
               <a:rPr lang="es-BO" b="1" dirty="0"/>
-              <a:t>¿como podemos aprovechar el diseño del trabajo para motivar?</a:t>
-            </a:r>
-          </a:p>
-        </p:txBody>
-      </p:sp>
-      <p:sp>
-        <p:nvSpPr>
-          <p:cNvPr id="7" name="CuadroTexto 6">
+              <a:t>4.	LIDERAZGO c)	Motivar y recompensar a los empleados</a:t>
+            </a:r>
+          </a:p>
+        </p:txBody>
+      </p:sp>
+      <p:sp>
+        <p:nvSpPr>
+          <p:cNvPr id="3" name="Marcador de contenido 2">
             <a:extLst>
               <a:ext uri="{FF2B5EF4-FFF2-40B4-BE49-F238E27FC236}">
-                <a16:creationId xmlns:a16="http://schemas.microsoft.com/office/drawing/2014/main" id="{9754003E-35C5-D223-5F22-3C71D7660B60}"/>
+                <a16:creationId xmlns:a16="http://schemas.microsoft.com/office/drawing/2014/main" id="{A03F4793-332F-447C-FEBA-8C99D67BE98B}"/>
+              </a:ext>
+            </a:extLst>
+          </p:cNvPr>
+          <p:cNvSpPr>
+            <a:spLocks noGrp="1"/>
+          </p:cNvSpPr>
+          <p:nvPr>
+            <p:ph idx="1"/>
+          </p:nvPr>
+        </p:nvSpPr>
+        <p:spPr>
+          <a:xfrm>
+            <a:off x="911846" y="2180494"/>
+            <a:ext cx="4773637" cy="1364566"/>
+          </a:xfrm>
+        </p:spPr>
+        <p:txBody>
+          <a:bodyPr/>
+          <a:lstStyle/>
+          <a:p>
+            <a:pPr marL="0" indent="0">
+              <a:buNone/>
+            </a:pPr>
+            <a:r>
+              <a:rPr lang="es-BO" sz="1800" i="1" dirty="0">
+                <a:effectLst/>
+                <a:latin typeface="Calibri" panose="020F0502020204030204" pitchFamily="34" charset="0"/>
+                <a:ea typeface="Calibri" panose="020F0502020204030204" pitchFamily="34" charset="0"/>
+                <a:cs typeface="Arial" panose="020B0604020202020204" pitchFamily="34" charset="0"/>
+              </a:rPr>
+              <a:t>La motivación de empleados se define como el entusiasmo, el nivel de energía, el </a:t>
+            </a:r>
+            <a:r>
+              <a:rPr lang="es-BO" sz="1800" i="1" dirty="0" err="1">
+                <a:effectLst/>
+                <a:latin typeface="Calibri" panose="020F0502020204030204" pitchFamily="34" charset="0"/>
+                <a:ea typeface="Calibri" panose="020F0502020204030204" pitchFamily="34" charset="0"/>
+                <a:cs typeface="Arial" panose="020B0604020202020204" pitchFamily="34" charset="0"/>
+              </a:rPr>
+              <a:t>compromisoy</a:t>
+            </a:r>
+            <a:r>
+              <a:rPr lang="es-BO" sz="1800" i="1" dirty="0">
+                <a:effectLst/>
+                <a:latin typeface="Calibri" panose="020F0502020204030204" pitchFamily="34" charset="0"/>
+                <a:ea typeface="Calibri" panose="020F0502020204030204" pitchFamily="34" charset="0"/>
+                <a:cs typeface="Arial" panose="020B0604020202020204" pitchFamily="34" charset="0"/>
+              </a:rPr>
+              <a:t> la cantidad de creatividad que un empleado aporta diariamente a la organización.</a:t>
+            </a:r>
+            <a:endParaRPr lang="es-BO" dirty="0"/>
+          </a:p>
+        </p:txBody>
+      </p:sp>
+      <p:sp>
+        <p:nvSpPr>
+          <p:cNvPr id="4" name="CuadroTexto 3">
+            <a:extLst>
+              <a:ext uri="{FF2B5EF4-FFF2-40B4-BE49-F238E27FC236}">
+                <a16:creationId xmlns:a16="http://schemas.microsoft.com/office/drawing/2014/main" id="{5CA396EC-CDD8-A424-C378-96A2CD8F32D3}"/>
               </a:ext>
             </a:extLst>
           </p:cNvPr>
@@ -3953,8 +4010,8 @@
         </p:nvSpPr>
         <p:spPr>
           <a:xfrm>
-            <a:off x="885133" y="2078540"/>
-            <a:ext cx="11075963" cy="1200329"/>
+            <a:off x="6330462" y="4451814"/>
+            <a:ext cx="4656406" cy="1200329"/>
           </a:xfrm>
           <a:prstGeom prst="rect">
             <a:avLst/>
@@ -3968,76 +4025,19 @@
           <a:lstStyle/>
           <a:p>
             <a:r>
-              <a:rPr lang="es-BO" dirty="0"/>
-              <a:t>Aprovechando este diseño de trabajo e implementarlo con fin motivacional podemos aplicarlo de la siguiente manera:</a:t>
-            </a:r>
-            <a:br>
-              <a:rPr lang="es-BO" dirty="0"/>
-            </a:br>
-            <a:br>
-              <a:rPr lang="es-BO" dirty="0"/>
-            </a:br>
-            <a:endParaRPr lang="es-BO" dirty="0"/>
-          </a:p>
-          <a:p>
-            <a:endParaRPr lang="es-ES" dirty="0"/>
-          </a:p>
-        </p:txBody>
-      </p:sp>
-      <p:sp>
-        <p:nvSpPr>
-          <p:cNvPr id="3" name="CuadroTexto 2">
-            <a:extLst>
-              <a:ext uri="{FF2B5EF4-FFF2-40B4-BE49-F238E27FC236}">
-                <a16:creationId xmlns:a16="http://schemas.microsoft.com/office/drawing/2014/main" id="{78C952BA-3E12-7593-0A63-145A07F0C910}"/>
-              </a:ext>
-            </a:extLst>
-          </p:cNvPr>
-          <p:cNvSpPr txBox="1"/>
-          <p:nvPr/>
-        </p:nvSpPr>
-        <p:spPr>
-          <a:xfrm>
-            <a:off x="885133" y="2628122"/>
-            <a:ext cx="4453784" cy="3416320"/>
-          </a:xfrm>
-          <a:prstGeom prst="rect">
-            <a:avLst/>
-          </a:prstGeom>
-          <a:noFill/>
-        </p:spPr>
-        <p:txBody>
-          <a:bodyPr wrap="square" rtlCol="0">
-            <a:spAutoFit/>
-          </a:bodyPr>
-          <a:lstStyle/>
-          <a:p>
-            <a:r>
-              <a:rPr lang="es-BO" b="1" dirty="0"/>
-              <a:t>1. Implementar rotación de tareas</a:t>
-            </a:r>
-            <a:r>
-              <a:rPr lang="es-BO" dirty="0"/>
-              <a:t>: Siguiendo el modelo de características del trabajo, </a:t>
-            </a:r>
-            <a:r>
-              <a:rPr lang="es-BO" dirty="0" err="1"/>
-              <a:t>Delizia</a:t>
-            </a:r>
-            <a:r>
-              <a:rPr lang="es-BO" dirty="0"/>
-              <a:t> puede diseñar los puestos de trabajo de manera que los empleados tengan la oportunidad de realizar una variedad de tareas. En lugar de asignar a cada empleado una tarea específica de forma permanente, se puede establecer un sistema de rotación de tareas que permita a los empleados adquirir nuevas habilidades y experimentar diferentes aspectos del proceso de fabricación de helados. </a:t>
-            </a:r>
-            <a:endParaRPr lang="es-ES" dirty="0"/>
+              <a:rPr lang="es-BO" i="1" dirty="0"/>
+              <a:t>La motivación juega un papel muy importante en la vida de un ser humano. Ya sea para mejorarnos a nosotros mismos o para mejorar el desempeño de nuestra organización. </a:t>
+            </a:r>
+            <a:endParaRPr lang="es-ES" i="1" dirty="0"/>
           </a:p>
         </p:txBody>
       </p:sp>
       <p:pic>
         <p:nvPicPr>
-          <p:cNvPr id="2050" name="Picture 2" descr="PROCESO DE FABRICACIÓN DEL HELADO - HeladoArtesanal.com">
+          <p:cNvPr id="1026" name="Picture 2" descr="Motivación laboral: claves y factores de la productividad empresarial -  NeoMercados.com">
             <a:extLst>
               <a:ext uri="{FF2B5EF4-FFF2-40B4-BE49-F238E27FC236}">
-                <a16:creationId xmlns:a16="http://schemas.microsoft.com/office/drawing/2014/main" id="{A69798A7-478E-2D93-1216-1F6019F994C6}"/>
+                <a16:creationId xmlns:a16="http://schemas.microsoft.com/office/drawing/2014/main" id="{BE2015BA-1B4E-D336-825E-BDBF90E42258}"/>
               </a:ext>
             </a:extLst>
           </p:cNvPr>
@@ -4061,8 +4061,8 @@
         </p:blipFill>
         <p:spPr bwMode="auto">
           <a:xfrm>
-            <a:off x="6096000" y="3113534"/>
-            <a:ext cx="4323350" cy="2179689"/>
+            <a:off x="6836377" y="2048612"/>
+            <a:ext cx="3521612" cy="2343991"/>
           </a:xfrm>
           <a:prstGeom prst="rect">
             <a:avLst/>
@@ -4079,10 +4079,57 @@
           </a:extLst>
         </p:spPr>
       </p:pic>
+      <p:pic>
+        <p:nvPicPr>
+          <p:cNvPr id="1028" name="Picture 4" descr="Motivación empresarial: ¿cómo mantenerla en tu personal?">
+            <a:extLst>
+              <a:ext uri="{FF2B5EF4-FFF2-40B4-BE49-F238E27FC236}">
+                <a16:creationId xmlns:a16="http://schemas.microsoft.com/office/drawing/2014/main" id="{4C1A32E2-A18C-23EB-CF9B-B16A94B2BCC1}"/>
+              </a:ext>
+            </a:extLst>
+          </p:cNvPr>
+          <p:cNvPicPr>
+            <a:picLocks noChangeAspect="1" noChangeArrowheads="1"/>
+          </p:cNvPicPr>
+          <p:nvPr/>
+        </p:nvPicPr>
+        <p:blipFill>
+          <a:blip r:embed="rId3">
+            <a:extLst>
+              <a:ext uri="{28A0092B-C50C-407E-A947-70E740481C1C}">
+                <a14:useLocalDpi xmlns:a14="http://schemas.microsoft.com/office/drawing/2010/main" val="0"/>
+              </a:ext>
+            </a:extLst>
+          </a:blip>
+          <a:srcRect/>
+          <a:stretch>
+            <a:fillRect/>
+          </a:stretch>
+        </p:blipFill>
+        <p:spPr bwMode="auto">
+          <a:xfrm>
+            <a:off x="1097332" y="3686779"/>
+            <a:ext cx="4258292" cy="2011045"/>
+          </a:xfrm>
+          <a:prstGeom prst="rect">
+            <a:avLst/>
+          </a:prstGeom>
+          <a:noFill/>
+          <a:extLst>
+            <a:ext uri="{909E8E84-426E-40DD-AFC4-6F175D3DCCD1}">
+              <a14:hiddenFill xmlns:a14="http://schemas.microsoft.com/office/drawing/2010/main">
+                <a:solidFill>
+                  <a:srgbClr val="FFFFFF"/>
+                </a:solidFill>
+              </a14:hiddenFill>
+            </a:ext>
+          </a:extLst>
+        </p:spPr>
+      </p:pic>
     </p:spTree>
     <p:extLst>
       <p:ext uri="{BB962C8B-B14F-4D97-AF65-F5344CB8AC3E}">
-        <p14:creationId xmlns:p14="http://schemas.microsoft.com/office/powerpoint/2010/main" val="3958070904"/>
+        <p14:creationId xmlns:p14="http://schemas.microsoft.com/office/powerpoint/2010/main" val="4004118298"/>
       </p:ext>
     </p:extLst>
   </p:cSld>
@@ -4139,7 +4186,7 @@
           <a:p>
             <a:r>
               <a:rPr lang="es-BO" b="1" dirty="0"/>
-              <a:t>¿como podemos aprovechar el diseño del trabajo para motivar?</a:t>
+              <a:t>¿Cuál es la importancia de motivar a los empleados?</a:t>
             </a:r>
           </a:p>
         </p:txBody>
@@ -4158,8 +4205,8 @@
         </p:nvSpPr>
         <p:spPr>
           <a:xfrm>
-            <a:off x="6452382" y="2037591"/>
-            <a:ext cx="3282462" cy="4524315"/>
+            <a:off x="740898" y="1829812"/>
+            <a:ext cx="11075963" cy="1754326"/>
           </a:xfrm>
           <a:prstGeom prst="rect">
             <a:avLst/>
@@ -4173,105 +4220,170 @@
           <a:lstStyle/>
           <a:p>
             <a:r>
-              <a:rPr lang="es-AR" sz="1800" b="1" dirty="0">
-                <a:effectLst/>
-                <a:latin typeface="Calibri" panose="020F0502020204030204" pitchFamily="34" charset="0"/>
-                <a:ea typeface="Calibri" panose="020F0502020204030204" pitchFamily="34" charset="0"/>
-                <a:cs typeface="Arial" panose="020B0604020202020204" pitchFamily="34" charset="0"/>
-              </a:rPr>
-              <a:t>2. Fomentar la autonomía</a:t>
-            </a:r>
-            <a:r>
-              <a:rPr lang="es-AR" sz="1800" dirty="0">
-                <a:effectLst/>
-                <a:latin typeface="Calibri" panose="020F0502020204030204" pitchFamily="34" charset="0"/>
-                <a:ea typeface="Calibri" panose="020F0502020204030204" pitchFamily="34" charset="0"/>
-                <a:cs typeface="Arial" panose="020B0604020202020204" pitchFamily="34" charset="0"/>
-              </a:rPr>
-              <a:t>: Otro aspecto importante del diseño del trabajo es la autonomía. </a:t>
-            </a:r>
-            <a:r>
-              <a:rPr lang="es-AR" sz="1800" dirty="0" err="1">
-                <a:effectLst/>
-                <a:latin typeface="Calibri" panose="020F0502020204030204" pitchFamily="34" charset="0"/>
-                <a:ea typeface="Calibri" panose="020F0502020204030204" pitchFamily="34" charset="0"/>
-                <a:cs typeface="Arial" panose="020B0604020202020204" pitchFamily="34" charset="0"/>
-              </a:rPr>
-              <a:t>Delizia</a:t>
-            </a:r>
-            <a:r>
-              <a:rPr lang="es-AR" sz="1800" dirty="0">
-                <a:effectLst/>
-                <a:latin typeface="Calibri" panose="020F0502020204030204" pitchFamily="34" charset="0"/>
-                <a:ea typeface="Calibri" panose="020F0502020204030204" pitchFamily="34" charset="0"/>
-                <a:cs typeface="Arial" panose="020B0604020202020204" pitchFamily="34" charset="0"/>
-              </a:rPr>
-              <a:t> puede otorgar a sus empleados un mayor grado de libertad e independencia en la planificación y ejecución de sus tareas diarias, especialmente en el área de marketing y ventas donde se puede otorgar libertades para promover el surgimiento de ideas creativas para nuevos productos.</a:t>
-            </a:r>
-            <a:br>
               <a:rPr lang="es-BO" dirty="0"/>
-            </a:br>
-            <a:br>
+              <a:t>La motivación juega un papel muy importante en la vida de un ser humano. Ya sea para mejorarnos a nosotros mismos o para mejorar el desempeño de nuestra organización. Los empleados motivados no necesitan que se les diga cómo hacer las cosas, toman iniciativas, están ansiosos por asumir responsabilidades adicionales, son innovadores y emprendedores.</a:t>
+            </a:r>
+          </a:p>
+          <a:p>
+            <a:endParaRPr lang="es-BO" dirty="0"/>
+          </a:p>
+          <a:p>
+            <a:r>
               <a:rPr lang="es-BO" dirty="0"/>
-            </a:br>
-            <a:endParaRPr lang="es-BO" dirty="0"/>
-          </a:p>
-          <a:p>
+              <a:t>Para motivar y recompensar a los empleados , se pueden seguir las siguientes estrategias : </a:t>
+            </a:r>
             <a:endParaRPr lang="es-ES" dirty="0"/>
           </a:p>
         </p:txBody>
       </p:sp>
-      <p:pic>
-        <p:nvPicPr>
-          <p:cNvPr id="2052" name="Picture 4" descr="Colección De Dibujos De Helado Vector Dibujado Mano Linda. Conos Y Helados  De Diferentes Sabores Hechas En El Estilo De Dibujo. Ilustraciones Svg,  Vectoriales, Clip Art Vectorizado Libre De Derechos. Image 38006136.">
+      <p:sp>
+        <p:nvSpPr>
+          <p:cNvPr id="3" name="CuadroTexto 2">
             <a:extLst>
               <a:ext uri="{FF2B5EF4-FFF2-40B4-BE49-F238E27FC236}">
-                <a16:creationId xmlns:a16="http://schemas.microsoft.com/office/drawing/2014/main" id="{EB583C3C-09E9-929B-6621-A8032C8577CA}"/>
+                <a16:creationId xmlns:a16="http://schemas.microsoft.com/office/drawing/2014/main" id="{8D2447AD-C916-7250-E795-3A2BA4F7EC9C}"/>
               </a:ext>
             </a:extLst>
           </p:cNvPr>
-          <p:cNvPicPr>
-            <a:picLocks noChangeAspect="1" noChangeArrowheads="1"/>
-          </p:cNvPicPr>
+          <p:cNvSpPr txBox="1"/>
           <p:nvPr/>
-        </p:nvPicPr>
-        <p:blipFill>
-          <a:blip r:embed="rId2">
-            <a:extLst>
-              <a:ext uri="{28A0092B-C50C-407E-A947-70E740481C1C}">
-                <a14:useLocalDpi xmlns:a14="http://schemas.microsoft.com/office/drawing/2010/main" val="0"/>
-              </a:ext>
-            </a:extLst>
-          </a:blip>
-          <a:srcRect/>
-          <a:stretch>
-            <a:fillRect/>
-          </a:stretch>
-        </p:blipFill>
-        <p:spPr bwMode="auto">
-          <a:xfrm>
-            <a:off x="1780736" y="2037591"/>
-            <a:ext cx="3749040" cy="3749040"/>
+        </p:nvSpPr>
+        <p:spPr>
+          <a:xfrm>
+            <a:off x="698695" y="3655489"/>
+            <a:ext cx="5166030" cy="2585323"/>
           </a:xfrm>
           <a:prstGeom prst="rect">
             <a:avLst/>
           </a:prstGeom>
           <a:noFill/>
-          <a:extLst>
-            <a:ext uri="{909E8E84-426E-40DD-AFC4-6F175D3DCCD1}">
-              <a14:hiddenFill xmlns:a14="http://schemas.microsoft.com/office/drawing/2010/main">
-                <a:solidFill>
-                  <a:srgbClr val="FFFFFF"/>
-                </a:solidFill>
-              </a14:hiddenFill>
-            </a:ext>
-          </a:extLst>
-        </p:spPr>
-      </p:pic>
+        </p:spPr>
+        <p:txBody>
+          <a:bodyPr wrap="none" rtlCol="0">
+            <a:spAutoFit/>
+          </a:bodyPr>
+          <a:lstStyle/>
+          <a:p>
+            <a:r>
+              <a:rPr lang="es-BO" dirty="0"/>
+              <a:t>•Premiar y reconocer a los empleados.</a:t>
+            </a:r>
+          </a:p>
+          <a:p>
+            <a:endParaRPr lang="es-BO" dirty="0"/>
+          </a:p>
+          <a:p>
+            <a:r>
+              <a:rPr lang="es-BO" dirty="0"/>
+              <a:t>•Mantener una comunicación constante y fluida.</a:t>
+            </a:r>
+          </a:p>
+          <a:p>
+            <a:endParaRPr lang="es-BO" dirty="0"/>
+          </a:p>
+          <a:p>
+            <a:r>
+              <a:rPr lang="es-BO" dirty="0"/>
+              <a:t>•Ofrecer formación y aprendizaje constante.</a:t>
+            </a:r>
+          </a:p>
+          <a:p>
+            <a:endParaRPr lang="es-BO" dirty="0"/>
+          </a:p>
+          <a:p>
+            <a:r>
+              <a:rPr lang="es-BO" dirty="0"/>
+              <a:t>•Proporcionar flexibilidad laboral.</a:t>
+            </a:r>
+          </a:p>
+          <a:p>
+            <a:endParaRPr lang="es-BO" dirty="0"/>
+          </a:p>
+          <a:p>
+            <a:r>
+              <a:rPr lang="es-BO" dirty="0"/>
+              <a:t>•Dar a los empleados objetivos que puedan controlar</a:t>
+            </a:r>
+            <a:endParaRPr lang="es-ES" dirty="0"/>
+          </a:p>
+        </p:txBody>
+      </p:sp>
+      <p:sp>
+        <p:nvSpPr>
+          <p:cNvPr id="5" name="CuadroTexto 4">
+            <a:extLst>
+              <a:ext uri="{FF2B5EF4-FFF2-40B4-BE49-F238E27FC236}">
+                <a16:creationId xmlns:a16="http://schemas.microsoft.com/office/drawing/2014/main" id="{9E4265F5-35D0-150D-3628-9268DFC9F634}"/>
+              </a:ext>
+            </a:extLst>
+          </p:cNvPr>
+          <p:cNvSpPr txBox="1"/>
+          <p:nvPr/>
+        </p:nvSpPr>
+        <p:spPr>
+          <a:xfrm>
+            <a:off x="5953820" y="3655488"/>
+            <a:ext cx="4681355" cy="3139321"/>
+          </a:xfrm>
+          <a:prstGeom prst="rect">
+            <a:avLst/>
+          </a:prstGeom>
+          <a:noFill/>
+        </p:spPr>
+        <p:txBody>
+          <a:bodyPr wrap="square" rtlCol="0">
+            <a:spAutoFit/>
+          </a:bodyPr>
+          <a:lstStyle/>
+          <a:p>
+            <a:r>
+              <a:rPr lang="es-BO" dirty="0"/>
+              <a:t>•Reforzar la comunicación de los directivos.</a:t>
+            </a:r>
+          </a:p>
+          <a:p>
+            <a:endParaRPr lang="es-BO" dirty="0"/>
+          </a:p>
+          <a:p>
+            <a:r>
+              <a:rPr lang="es-BO" dirty="0"/>
+              <a:t>•Diseñar un lugar de trabajo acogedor.</a:t>
+            </a:r>
+          </a:p>
+          <a:p>
+            <a:endParaRPr lang="es-BO" dirty="0"/>
+          </a:p>
+          <a:p>
+            <a:r>
+              <a:rPr lang="es-BO" dirty="0"/>
+              <a:t>•Reconocer y recompensar a los empleados.</a:t>
+            </a:r>
+          </a:p>
+          <a:p>
+            <a:endParaRPr lang="es-BO" dirty="0"/>
+          </a:p>
+          <a:p>
+            <a:r>
+              <a:rPr lang="es-BO" dirty="0"/>
+              <a:t>•Promover el crecimiento personal e implicar a los trabajadores en la toma de decisiones.</a:t>
+            </a:r>
+          </a:p>
+          <a:p>
+            <a:endParaRPr lang="es-BO" dirty="0"/>
+          </a:p>
+          <a:p>
+            <a:r>
+              <a:rPr lang="es-BO" dirty="0"/>
+              <a:t>•Ofrecer recompensas adicionales para motivar a los empleados a ir más allá de sus límites.</a:t>
+            </a:r>
+            <a:endParaRPr lang="es-ES" dirty="0"/>
+          </a:p>
+        </p:txBody>
+      </p:sp>
     </p:spTree>
     <p:extLst>
       <p:ext uri="{BB962C8B-B14F-4D97-AF65-F5344CB8AC3E}">
-        <p14:creationId xmlns:p14="http://schemas.microsoft.com/office/powerpoint/2010/main" val="1216260591"/>
+        <p14:creationId xmlns:p14="http://schemas.microsoft.com/office/powerpoint/2010/main" val="1987734335"/>
       </p:ext>
     </p:extLst>
   </p:cSld>
@@ -4322,14 +4434,15 @@
         </p:spPr>
         <p:txBody>
           <a:bodyPr>
-            <a:normAutofit fontScale="90000"/>
+            <a:normAutofit/>
           </a:bodyPr>
           <a:lstStyle/>
           <a:p>
             <a:r>
-              <a:rPr lang="es-BO" b="1" dirty="0"/>
-              <a:t>¿como podemos aprovechar el diseño del trabajo para motivar?</a:t>
-            </a:r>
+              <a:rPr lang="es-ES" b="1" dirty="0"/>
+              <a:t>Recompensar</a:t>
+            </a:r>
+            <a:endParaRPr lang="es-BO" b="1" dirty="0"/>
           </a:p>
         </p:txBody>
       </p:sp>
@@ -4347,8 +4460,8 @@
         </p:nvSpPr>
         <p:spPr>
           <a:xfrm>
-            <a:off x="1092592" y="2121997"/>
-            <a:ext cx="5913120" cy="4616648"/>
+            <a:off x="740898" y="1829812"/>
+            <a:ext cx="11075963" cy="1200329"/>
           </a:xfrm>
           <a:prstGeom prst="rect">
             <a:avLst/>
@@ -4362,69 +4475,94 @@
           <a:lstStyle/>
           <a:p>
             <a:r>
-              <a:rPr lang="es-BO" sz="2000" b="1" dirty="0">
-                <a:effectLst/>
-                <a:latin typeface="Calibri" panose="020F0502020204030204" pitchFamily="34" charset="0"/>
-                <a:ea typeface="Calibri" panose="020F0502020204030204" pitchFamily="34" charset="0"/>
-                <a:cs typeface="Arial" panose="020B0604020202020204" pitchFamily="34" charset="0"/>
-              </a:rPr>
-              <a:t>3. Fomentar un ambiente de trabajo positivo</a:t>
-            </a:r>
-            <a:r>
-              <a:rPr lang="es-BO" sz="2000" dirty="0">
-                <a:effectLst/>
-                <a:latin typeface="Calibri" panose="020F0502020204030204" pitchFamily="34" charset="0"/>
-                <a:ea typeface="Calibri" panose="020F0502020204030204" pitchFamily="34" charset="0"/>
-                <a:cs typeface="Arial" panose="020B0604020202020204" pitchFamily="34" charset="0"/>
-              </a:rPr>
-              <a:t>: Además de las prácticas de diseño del trabajo, la motivación también se ve influenciada por el entorno laboral. </a:t>
-            </a:r>
-            <a:r>
-              <a:rPr lang="es-BO" sz="2000" dirty="0" err="1">
-                <a:effectLst/>
-                <a:latin typeface="Calibri" panose="020F0502020204030204" pitchFamily="34" charset="0"/>
-                <a:ea typeface="Calibri" panose="020F0502020204030204" pitchFamily="34" charset="0"/>
-                <a:cs typeface="Arial" panose="020B0604020202020204" pitchFamily="34" charset="0"/>
-              </a:rPr>
-              <a:t>Delizia</a:t>
-            </a:r>
-            <a:r>
-              <a:rPr lang="es-BO" sz="2000" dirty="0">
-                <a:effectLst/>
-                <a:latin typeface="Calibri" panose="020F0502020204030204" pitchFamily="34" charset="0"/>
-                <a:ea typeface="Calibri" panose="020F0502020204030204" pitchFamily="34" charset="0"/>
-                <a:cs typeface="Arial" panose="020B0604020202020204" pitchFamily="34" charset="0"/>
-              </a:rPr>
-              <a:t> puede crear un ambiente de trabajo positivo y estimulante, donde se promueva el trabajo en equipo, la colaboración y el reconocimiento mutuo. Esto se puede lograr a través de actividades de construcción de equipos, celebración de logros y creación de espacios de trabajo cómodos y agradables. Un ambiente positivo fomenta la motivación intrínseca y fortalece el compromiso de los empleados con la empresa.</a:t>
-            </a:r>
-            <a:r>
-              <a:rPr lang="es-AR" sz="2000" dirty="0">
-                <a:effectLst/>
-                <a:latin typeface="Calibri" panose="020F0502020204030204" pitchFamily="34" charset="0"/>
-                <a:ea typeface="Calibri" panose="020F0502020204030204" pitchFamily="34" charset="0"/>
-                <a:cs typeface="Arial" panose="020B0604020202020204" pitchFamily="34" charset="0"/>
-              </a:rPr>
-              <a:t>.</a:t>
-            </a:r>
-            <a:br>
               <a:rPr lang="es-BO" dirty="0"/>
-            </a:br>
-            <a:br>
+              <a:t>En el ámbito empresarial de hoy en día, las recompensas y los reconocimientos han llegado a ser más importante que nunca ya que los gerentes disponen de menos manera de influir en sus empleados o de moldear su comportamiento. En tiempo de estrechez económica, las recompensas y el reconocimiento proporcionan una manera eficaz de estimular a los empleados para que logren más altos niveles de desempeño.</a:t>
+            </a:r>
+            <a:endParaRPr lang="es-ES" dirty="0"/>
+          </a:p>
+        </p:txBody>
+      </p:sp>
+      <p:sp>
+        <p:nvSpPr>
+          <p:cNvPr id="3" name="CuadroTexto 2">
+            <a:extLst>
+              <a:ext uri="{FF2B5EF4-FFF2-40B4-BE49-F238E27FC236}">
+                <a16:creationId xmlns:a16="http://schemas.microsoft.com/office/drawing/2014/main" id="{8D2447AD-C916-7250-E795-3A2BA4F7EC9C}"/>
+              </a:ext>
+            </a:extLst>
+          </p:cNvPr>
+          <p:cNvSpPr txBox="1"/>
+          <p:nvPr/>
+        </p:nvSpPr>
+        <p:spPr>
+          <a:xfrm>
+            <a:off x="740898" y="3101491"/>
+            <a:ext cx="6672776" cy="3139321"/>
+          </a:xfrm>
+          <a:prstGeom prst="rect">
+            <a:avLst/>
+          </a:prstGeom>
+          <a:noFill/>
+        </p:spPr>
+        <p:txBody>
+          <a:bodyPr wrap="square" rtlCol="0">
+            <a:spAutoFit/>
+          </a:bodyPr>
+          <a:lstStyle/>
+          <a:p>
+            <a:r>
               <a:rPr lang="es-BO" dirty="0"/>
-            </a:br>
+              <a:t>Los sistemas de recompensas mejoran cuatro aspectos de la eficacia organizacional:</a:t>
+            </a:r>
+          </a:p>
+          <a:p>
+            <a:r>
+              <a:rPr lang="es-BO" dirty="0"/>
+              <a:t>•Motivan al personal a unirse a la organización.</a:t>
+            </a:r>
+          </a:p>
+          <a:p>
             <a:endParaRPr lang="es-BO" dirty="0"/>
           </a:p>
           <a:p>
+            <a:r>
+              <a:rPr lang="es-BO" dirty="0"/>
+              <a:t>•Influyen sobre los trabajadores para que acudan a su trabajo.</a:t>
+            </a:r>
+          </a:p>
+          <a:p>
+            <a:endParaRPr lang="es-BO" dirty="0"/>
+          </a:p>
+          <a:p>
+            <a:r>
+              <a:rPr lang="es-BO" dirty="0"/>
+              <a:t>•Los motivan para actuar de manera eficaz.</a:t>
+            </a:r>
+          </a:p>
+          <a:p>
+            <a:endParaRPr lang="es-BO" dirty="0"/>
+          </a:p>
+          <a:p>
+            <a:r>
+              <a:rPr lang="es-BO" dirty="0"/>
+              <a:t>•Refuerzan la estructura de la organización para especificar la posición de sus diferentes</a:t>
+            </a:r>
+          </a:p>
+          <a:p>
+            <a:r>
+              <a:rPr lang="es-BO" dirty="0"/>
+              <a:t>miembros.</a:t>
+            </a:r>
             <a:endParaRPr lang="es-ES" dirty="0"/>
           </a:p>
         </p:txBody>
       </p:sp>
       <p:pic>
         <p:nvPicPr>
-          <p:cNvPr id="3074" name="Picture 2" descr="Creating A Positive Workplace Culture - A Little Kindness Goes A Long Way |  HuffPost Contributor">
+          <p:cNvPr id="6" name="Picture 2" descr="Positive Feedback in Practice Management (Why and How to Focus on This) -  Power Diary Blog">
             <a:extLst>
               <a:ext uri="{FF2B5EF4-FFF2-40B4-BE49-F238E27FC236}">
-                <a16:creationId xmlns:a16="http://schemas.microsoft.com/office/drawing/2014/main" id="{7B2013D5-DA9D-56AF-0DD4-4F5F846CFD41}"/>
+                <a16:creationId xmlns:a16="http://schemas.microsoft.com/office/drawing/2014/main" id="{28837289-D6C0-F1C1-4BF2-6BB79816A4AB}"/>
               </a:ext>
             </a:extLst>
           </p:cNvPr>
@@ -4448,8 +4586,8 @@
         </p:blipFill>
         <p:spPr bwMode="auto">
           <a:xfrm>
-            <a:off x="7162874" y="2121998"/>
-            <a:ext cx="4354655" cy="2977542"/>
+            <a:off x="6747802" y="3688112"/>
+            <a:ext cx="4876800" cy="2552700"/>
           </a:xfrm>
           <a:prstGeom prst="rect">
             <a:avLst/>
@@ -4469,7 +4607,7 @@
     </p:spTree>
     <p:extLst>
       <p:ext uri="{BB962C8B-B14F-4D97-AF65-F5344CB8AC3E}">
-        <p14:creationId xmlns:p14="http://schemas.microsoft.com/office/powerpoint/2010/main" val="1504539169"/>
+        <p14:creationId xmlns:p14="http://schemas.microsoft.com/office/powerpoint/2010/main" val="1852265742"/>
       </p:ext>
     </p:extLst>
   </p:cSld>
@@ -4520,145 +4658,18 @@
         </p:spPr>
         <p:txBody>
           <a:bodyPr>
-            <a:normAutofit fontScale="90000"/>
+            <a:normAutofit/>
           </a:bodyPr>
           <a:lstStyle/>
           <a:p>
-            <a:r>
-              <a:rPr lang="es-BO" b="1" dirty="0"/>
-              <a:t>¿como podemos aprovechar el diseño del trabajo para motivar?</a:t>
-            </a:r>
-          </a:p>
-        </p:txBody>
-      </p:sp>
-      <p:sp>
-        <p:nvSpPr>
-          <p:cNvPr id="7" name="CuadroTexto 6">
-            <a:extLst>
-              <a:ext uri="{FF2B5EF4-FFF2-40B4-BE49-F238E27FC236}">
-                <a16:creationId xmlns:a16="http://schemas.microsoft.com/office/drawing/2014/main" id="{9754003E-35C5-D223-5F22-3C71D7660B60}"/>
-              </a:ext>
-            </a:extLst>
-          </p:cNvPr>
-          <p:cNvSpPr txBox="1"/>
-          <p:nvPr/>
-        </p:nvSpPr>
-        <p:spPr>
-          <a:xfrm>
-            <a:off x="6096000" y="2199989"/>
-            <a:ext cx="4787703" cy="3693319"/>
-          </a:xfrm>
-          <a:prstGeom prst="rect">
-            <a:avLst/>
-          </a:prstGeom>
-          <a:noFill/>
-        </p:spPr>
-        <p:txBody>
-          <a:bodyPr wrap="square" rtlCol="0">
-            <a:spAutoFit/>
-          </a:bodyPr>
-          <a:lstStyle/>
-          <a:p>
-            <a:r>
-              <a:rPr lang="es-BO" sz="2000" b="1" dirty="0">
-                <a:effectLst/>
-                <a:latin typeface="Calibri" panose="020F0502020204030204" pitchFamily="34" charset="0"/>
-                <a:ea typeface="Calibri" panose="020F0502020204030204" pitchFamily="34" charset="0"/>
-                <a:cs typeface="Arial" panose="020B0604020202020204" pitchFamily="34" charset="0"/>
-              </a:rPr>
-              <a:t>4. Proporcionar retroalimentación constante:</a:t>
-            </a:r>
-            <a:r>
-              <a:rPr lang="es-BO" sz="2000" dirty="0">
-                <a:effectLst/>
-                <a:latin typeface="Calibri" panose="020F0502020204030204" pitchFamily="34" charset="0"/>
-                <a:ea typeface="Calibri" panose="020F0502020204030204" pitchFamily="34" charset="0"/>
-                <a:cs typeface="Arial" panose="020B0604020202020204" pitchFamily="34" charset="0"/>
-              </a:rPr>
-              <a:t> La retroalimentación es una dimensión clave en el diseño del trabajo y tiene un impacto significativo en la motivación de los empleados. </a:t>
-            </a:r>
-            <a:r>
-              <a:rPr lang="es-BO" sz="2000" dirty="0" err="1">
-                <a:effectLst/>
-                <a:latin typeface="Calibri" panose="020F0502020204030204" pitchFamily="34" charset="0"/>
-                <a:ea typeface="Calibri" panose="020F0502020204030204" pitchFamily="34" charset="0"/>
-                <a:cs typeface="Arial" panose="020B0604020202020204" pitchFamily="34" charset="0"/>
-              </a:rPr>
-              <a:t>Delizia</a:t>
-            </a:r>
-            <a:r>
-              <a:rPr lang="es-BO" sz="2000" dirty="0">
-                <a:effectLst/>
-                <a:latin typeface="Calibri" panose="020F0502020204030204" pitchFamily="34" charset="0"/>
-                <a:ea typeface="Calibri" panose="020F0502020204030204" pitchFamily="34" charset="0"/>
-                <a:cs typeface="Arial" panose="020B0604020202020204" pitchFamily="34" charset="0"/>
-              </a:rPr>
-              <a:t> puede implementar un sistema de retroalimentación constante y constructiva, donde se reconozcan los logros y se brinde orientación para mejorar el desempeño. </a:t>
-            </a:r>
-            <a:br>
-              <a:rPr lang="es-BO" dirty="0"/>
-            </a:br>
-            <a:br>
-              <a:rPr lang="es-BO" dirty="0"/>
-            </a:br>
-            <a:endParaRPr lang="es-BO" dirty="0"/>
-          </a:p>
-          <a:p>
-            <a:endParaRPr lang="es-ES" dirty="0"/>
-          </a:p>
-        </p:txBody>
-      </p:sp>
-      <p:pic>
-        <p:nvPicPr>
-          <p:cNvPr id="4098" name="Picture 2" descr="Positive Feedback in Practice Management (Why and How to Focus on This) -  Power Diary Blog">
-            <a:extLst>
-              <a:ext uri="{FF2B5EF4-FFF2-40B4-BE49-F238E27FC236}">
-                <a16:creationId xmlns:a16="http://schemas.microsoft.com/office/drawing/2014/main" id="{7A738A7C-8E08-8FB1-2B11-F9A9B0CB3577}"/>
-              </a:ext>
-            </a:extLst>
-          </p:cNvPr>
-          <p:cNvPicPr>
-            <a:picLocks noChangeAspect="1" noChangeArrowheads="1"/>
-          </p:cNvPicPr>
-          <p:nvPr/>
-        </p:nvPicPr>
-        <p:blipFill>
-          <a:blip r:embed="rId2">
-            <a:extLst>
-              <a:ext uri="{28A0092B-C50C-407E-A947-70E740481C1C}">
-                <a14:useLocalDpi xmlns:a14="http://schemas.microsoft.com/office/drawing/2010/main" val="0"/>
-              </a:ext>
-            </a:extLst>
-          </a:blip>
-          <a:srcRect/>
-          <a:stretch>
-            <a:fillRect/>
-          </a:stretch>
-        </p:blipFill>
-        <p:spPr bwMode="auto">
-          <a:xfrm>
-            <a:off x="881575" y="2367475"/>
-            <a:ext cx="4876800" cy="2552700"/>
-          </a:xfrm>
-          <a:prstGeom prst="rect">
-            <a:avLst/>
-          </a:prstGeom>
-          <a:noFill/>
-          <a:extLst>
-            <a:ext uri="{909E8E84-426E-40DD-AFC4-6F175D3DCCD1}">
-              <a14:hiddenFill xmlns:a14="http://schemas.microsoft.com/office/drawing/2010/main">
-                <a:solidFill>
-                  <a:srgbClr val="FFFFFF"/>
-                </a:solidFill>
-              </a14:hiddenFill>
-            </a:ext>
-          </a:extLst>
-        </p:spPr>
-      </p:pic>
+            <a:endParaRPr lang="es-BO" b="1" dirty="0"/>
+          </a:p>
+        </p:txBody>
+      </p:sp>
     </p:spTree>
     <p:extLst>
       <p:ext uri="{BB962C8B-B14F-4D97-AF65-F5344CB8AC3E}">
-        <p14:creationId xmlns:p14="http://schemas.microsoft.com/office/powerpoint/2010/main" val="3430685095"/>
+        <p14:creationId xmlns:p14="http://schemas.microsoft.com/office/powerpoint/2010/main" val="3958070904"/>
       </p:ext>
     </p:extLst>
   </p:cSld>
@@ -4708,50 +4719,107 @@
           </a:xfrm>
         </p:spPr>
         <p:txBody>
-          <a:bodyPr/>
-          <a:lstStyle/>
-          <a:p>
-            <a:r>
-              <a:rPr lang="es-BO" b="1" dirty="0"/>
-              <a:t>5.	CONTROL</a:t>
-            </a:r>
-          </a:p>
-        </p:txBody>
-      </p:sp>
-      <p:sp>
-        <p:nvSpPr>
-          <p:cNvPr id="3" name="Marcador de contenido 2">
+          <a:bodyPr>
+            <a:normAutofit/>
+          </a:bodyPr>
+          <a:lstStyle/>
+          <a:p>
+            <a:endParaRPr lang="es-BO" b="1" dirty="0"/>
+          </a:p>
+        </p:txBody>
+      </p:sp>
+      <p:sp>
+        <p:nvSpPr>
+          <p:cNvPr id="7" name="CuadroTexto 6">
             <a:extLst>
               <a:ext uri="{FF2B5EF4-FFF2-40B4-BE49-F238E27FC236}">
-                <a16:creationId xmlns:a16="http://schemas.microsoft.com/office/drawing/2014/main" id="{A03F4793-332F-447C-FEBA-8C99D67BE98B}"/>
+                <a16:creationId xmlns:a16="http://schemas.microsoft.com/office/drawing/2014/main" id="{9754003E-35C5-D223-5F22-3C71D7660B60}"/>
               </a:ext>
             </a:extLst>
           </p:cNvPr>
-          <p:cNvSpPr>
-            <a:spLocks noGrp="1"/>
-          </p:cNvSpPr>
-          <p:nvPr>
-            <p:ph idx="1"/>
-          </p:nvPr>
+          <p:cNvSpPr txBox="1"/>
+          <p:nvPr/>
         </p:nvSpPr>
         <p:spPr>
           <a:xfrm>
-            <a:off x="994117" y="1941342"/>
-            <a:ext cx="10203766" cy="3798685"/>
-          </a:xfrm>
-        </p:spPr>
-        <p:txBody>
-          <a:bodyPr/>
-          <a:lstStyle/>
-          <a:p>
+            <a:off x="6452382" y="2037591"/>
+            <a:ext cx="3282462" cy="1200329"/>
+          </a:xfrm>
+          <a:prstGeom prst="rect">
+            <a:avLst/>
+          </a:prstGeom>
+          <a:noFill/>
+        </p:spPr>
+        <p:txBody>
+          <a:bodyPr wrap="square" rtlCol="0">
+            <a:spAutoFit/>
+          </a:bodyPr>
+          <a:lstStyle/>
+          <a:p>
+            <a:br>
+              <a:rPr lang="es-BO" dirty="0"/>
+            </a:br>
+            <a:br>
+              <a:rPr lang="es-BO" dirty="0"/>
+            </a:br>
             <a:endParaRPr lang="es-BO" dirty="0"/>
           </a:p>
-        </p:txBody>
-      </p:sp>
+          <a:p>
+            <a:endParaRPr lang="es-ES" dirty="0"/>
+          </a:p>
+        </p:txBody>
+      </p:sp>
+      <p:pic>
+        <p:nvPicPr>
+          <p:cNvPr id="2052" name="Picture 4" descr="Colección De Dibujos De Helado Vector Dibujado Mano Linda. Conos Y Helados  De Diferentes Sabores Hechas En El Estilo De Dibujo. Ilustraciones Svg,  Vectoriales, Clip Art Vectorizado Libre De Derechos. Image 38006136.">
+            <a:extLst>
+              <a:ext uri="{FF2B5EF4-FFF2-40B4-BE49-F238E27FC236}">
+                <a16:creationId xmlns:a16="http://schemas.microsoft.com/office/drawing/2014/main" id="{EB583C3C-09E9-929B-6621-A8032C8577CA}"/>
+              </a:ext>
+            </a:extLst>
+          </p:cNvPr>
+          <p:cNvPicPr>
+            <a:picLocks noChangeAspect="1" noChangeArrowheads="1"/>
+          </p:cNvPicPr>
+          <p:nvPr/>
+        </p:nvPicPr>
+        <p:blipFill>
+          <a:blip r:embed="rId2">
+            <a:extLst>
+              <a:ext uri="{28A0092B-C50C-407E-A947-70E740481C1C}">
+                <a14:useLocalDpi xmlns:a14="http://schemas.microsoft.com/office/drawing/2010/main" val="0"/>
+              </a:ext>
+            </a:extLst>
+          </a:blip>
+          <a:srcRect/>
+          <a:stretch>
+            <a:fillRect/>
+          </a:stretch>
+        </p:blipFill>
+        <p:spPr bwMode="auto">
+          <a:xfrm>
+            <a:off x="1780736" y="2037591"/>
+            <a:ext cx="3749040" cy="3749040"/>
+          </a:xfrm>
+          <a:prstGeom prst="rect">
+            <a:avLst/>
+          </a:prstGeom>
+          <a:noFill/>
+          <a:extLst>
+            <a:ext uri="{909E8E84-426E-40DD-AFC4-6F175D3DCCD1}">
+              <a14:hiddenFill xmlns:a14="http://schemas.microsoft.com/office/drawing/2010/main">
+                <a:solidFill>
+                  <a:srgbClr val="FFFFFF"/>
+                </a:solidFill>
+              </a14:hiddenFill>
+            </a:ext>
+          </a:extLst>
+        </p:spPr>
+      </p:pic>
     </p:spTree>
     <p:extLst>
       <p:ext uri="{BB962C8B-B14F-4D97-AF65-F5344CB8AC3E}">
-        <p14:creationId xmlns:p14="http://schemas.microsoft.com/office/powerpoint/2010/main" val="2018762944"/>
+        <p14:creationId xmlns:p14="http://schemas.microsoft.com/office/powerpoint/2010/main" val="1216260591"/>
       </p:ext>
     </p:extLst>
   </p:cSld>
@@ -4806,48 +4874,195 @@
           </a:bodyPr>
           <a:lstStyle/>
           <a:p>
-            <a:r>
-              <a:rPr lang="es-BO" b="1" dirty="0"/>
-              <a:t>6.	CONCLUSION/RECOMENDACIÓN</a:t>
-            </a:r>
+            <a:endParaRPr lang="es-BO" b="1" dirty="0"/>
+          </a:p>
+        </p:txBody>
+      </p:sp>
+      <p:sp>
+        <p:nvSpPr>
+          <p:cNvPr id="7" name="CuadroTexto 6">
+            <a:extLst>
+              <a:ext uri="{FF2B5EF4-FFF2-40B4-BE49-F238E27FC236}">
+                <a16:creationId xmlns:a16="http://schemas.microsoft.com/office/drawing/2014/main" id="{9754003E-35C5-D223-5F22-3C71D7660B60}"/>
+              </a:ext>
+            </a:extLst>
+          </p:cNvPr>
+          <p:cNvSpPr txBox="1"/>
+          <p:nvPr/>
+        </p:nvSpPr>
+        <p:spPr>
+          <a:xfrm>
+            <a:off x="1092592" y="2121997"/>
+            <a:ext cx="5913120" cy="1200329"/>
+          </a:xfrm>
+          <a:prstGeom prst="rect">
+            <a:avLst/>
+          </a:prstGeom>
+          <a:noFill/>
+        </p:spPr>
+        <p:txBody>
+          <a:bodyPr wrap="square" rtlCol="0">
+            <a:spAutoFit/>
+          </a:bodyPr>
+          <a:lstStyle/>
+          <a:p>
+            <a:br>
+              <a:rPr lang="es-BO" dirty="0"/>
+            </a:br>
+            <a:br>
+              <a:rPr lang="es-BO" dirty="0"/>
+            </a:br>
             <a:endParaRPr lang="es-BO" dirty="0"/>
           </a:p>
-        </p:txBody>
-      </p:sp>
-      <p:sp>
-        <p:nvSpPr>
-          <p:cNvPr id="3" name="Marcador de contenido 2">
+          <a:p>
+            <a:endParaRPr lang="es-ES" dirty="0"/>
+          </a:p>
+        </p:txBody>
+      </p:sp>
+      <p:pic>
+        <p:nvPicPr>
+          <p:cNvPr id="3074" name="Picture 2" descr="Creating A Positive Workplace Culture - A Little Kindness Goes A Long Way |  HuffPost Contributor">
             <a:extLst>
               <a:ext uri="{FF2B5EF4-FFF2-40B4-BE49-F238E27FC236}">
-                <a16:creationId xmlns:a16="http://schemas.microsoft.com/office/drawing/2014/main" id="{A03F4793-332F-447C-FEBA-8C99D67BE98B}"/>
+                <a16:creationId xmlns:a16="http://schemas.microsoft.com/office/drawing/2014/main" id="{7B2013D5-DA9D-56AF-0DD4-4F5F846CFD41}"/>
               </a:ext>
             </a:extLst>
           </p:cNvPr>
-          <p:cNvSpPr>
-            <a:spLocks noGrp="1"/>
-          </p:cNvSpPr>
-          <p:nvPr>
-            <p:ph idx="1"/>
-          </p:nvPr>
-        </p:nvSpPr>
-        <p:spPr>
-          <a:xfrm>
-            <a:off x="994117" y="1941342"/>
-            <a:ext cx="10203766" cy="3798685"/>
-          </a:xfrm>
-        </p:spPr>
-        <p:txBody>
-          <a:bodyPr/>
-          <a:lstStyle/>
-          <a:p>
-            <a:endParaRPr lang="es-BO" dirty="0"/>
-          </a:p>
-        </p:txBody>
-      </p:sp>
+          <p:cNvPicPr>
+            <a:picLocks noChangeAspect="1" noChangeArrowheads="1"/>
+          </p:cNvPicPr>
+          <p:nvPr/>
+        </p:nvPicPr>
+        <p:blipFill>
+          <a:blip r:embed="rId2">
+            <a:extLst>
+              <a:ext uri="{28A0092B-C50C-407E-A947-70E740481C1C}">
+                <a14:useLocalDpi xmlns:a14="http://schemas.microsoft.com/office/drawing/2010/main" val="0"/>
+              </a:ext>
+            </a:extLst>
+          </a:blip>
+          <a:srcRect/>
+          <a:stretch>
+            <a:fillRect/>
+          </a:stretch>
+        </p:blipFill>
+        <p:spPr bwMode="auto">
+          <a:xfrm>
+            <a:off x="7162874" y="2121998"/>
+            <a:ext cx="4354655" cy="2977542"/>
+          </a:xfrm>
+          <a:prstGeom prst="rect">
+            <a:avLst/>
+          </a:prstGeom>
+          <a:noFill/>
+          <a:extLst>
+            <a:ext uri="{909E8E84-426E-40DD-AFC4-6F175D3DCCD1}">
+              <a14:hiddenFill xmlns:a14="http://schemas.microsoft.com/office/drawing/2010/main">
+                <a:solidFill>
+                  <a:srgbClr val="FFFFFF"/>
+                </a:solidFill>
+              </a14:hiddenFill>
+            </a:ext>
+          </a:extLst>
+        </p:spPr>
+      </p:pic>
     </p:spTree>
     <p:extLst>
       <p:ext uri="{BB962C8B-B14F-4D97-AF65-F5344CB8AC3E}">
-        <p14:creationId xmlns:p14="http://schemas.microsoft.com/office/powerpoint/2010/main" val="2828308452"/>
+        <p14:creationId xmlns:p14="http://schemas.microsoft.com/office/powerpoint/2010/main" val="1504539169"/>
+      </p:ext>
+    </p:extLst>
+  </p:cSld>
+  <p:clrMapOvr>
+    <a:masterClrMapping/>
+  </p:clrMapOvr>
+</p:sld>
+</file>
+
+<file path=ppt/slides/slide19.xml><?xml version="1.0" encoding="utf-8"?>
+<p:sld xmlns:a="http://schemas.openxmlformats.org/drawingml/2006/main" xmlns:r="http://schemas.openxmlformats.org/officeDocument/2006/relationships" xmlns:p="http://schemas.openxmlformats.org/presentationml/2006/main">
+  <p:cSld>
+    <p:spTree>
+      <p:nvGrpSpPr>
+        <p:cNvPr id="1" name=""/>
+        <p:cNvGrpSpPr/>
+        <p:nvPr/>
+      </p:nvGrpSpPr>
+      <p:grpSpPr>
+        <a:xfrm>
+          <a:off x="0" y="0"/>
+          <a:ext cx="0" cy="0"/>
+          <a:chOff x="0" y="0"/>
+          <a:chExt cx="0" cy="0"/>
+        </a:xfrm>
+      </p:grpSpPr>
+      <p:sp>
+        <p:nvSpPr>
+          <p:cNvPr id="2" name="Título 1">
+            <a:extLst>
+              <a:ext uri="{FF2B5EF4-FFF2-40B4-BE49-F238E27FC236}">
+                <a16:creationId xmlns:a16="http://schemas.microsoft.com/office/drawing/2014/main" id="{E28CA087-FA30-60BE-45DB-5FAAAEE20665}"/>
+              </a:ext>
+            </a:extLst>
+          </p:cNvPr>
+          <p:cNvSpPr>
+            <a:spLocks noGrp="1"/>
+          </p:cNvSpPr>
+          <p:nvPr>
+            <p:ph type="title"/>
+          </p:nvPr>
+        </p:nvSpPr>
+        <p:spPr>
+          <a:xfrm>
+            <a:off x="994117" y="964692"/>
+            <a:ext cx="10203766" cy="793770"/>
+          </a:xfrm>
+        </p:spPr>
+        <p:txBody>
+          <a:bodyPr/>
+          <a:lstStyle/>
+          <a:p>
+            <a:r>
+              <a:rPr lang="es-BO" b="1" dirty="0"/>
+              <a:t>5.	CONTROL</a:t>
+            </a:r>
+          </a:p>
+        </p:txBody>
+      </p:sp>
+      <p:sp>
+        <p:nvSpPr>
+          <p:cNvPr id="3" name="Marcador de contenido 2">
+            <a:extLst>
+              <a:ext uri="{FF2B5EF4-FFF2-40B4-BE49-F238E27FC236}">
+                <a16:creationId xmlns:a16="http://schemas.microsoft.com/office/drawing/2014/main" id="{A03F4793-332F-447C-FEBA-8C99D67BE98B}"/>
+              </a:ext>
+            </a:extLst>
+          </p:cNvPr>
+          <p:cNvSpPr>
+            <a:spLocks noGrp="1"/>
+          </p:cNvSpPr>
+          <p:nvPr>
+            <p:ph idx="1"/>
+          </p:nvPr>
+        </p:nvSpPr>
+        <p:spPr>
+          <a:xfrm>
+            <a:off x="994117" y="1941342"/>
+            <a:ext cx="10203766" cy="3798685"/>
+          </a:xfrm>
+        </p:spPr>
+        <p:txBody>
+          <a:bodyPr/>
+          <a:lstStyle/>
+          <a:p>
+            <a:endParaRPr lang="es-BO" dirty="0"/>
+          </a:p>
+        </p:txBody>
+      </p:sp>
+    </p:spTree>
+    <p:extLst>
+      <p:ext uri="{BB962C8B-B14F-4D97-AF65-F5344CB8AC3E}">
+        <p14:creationId xmlns:p14="http://schemas.microsoft.com/office/powerpoint/2010/main" val="2018762944"/>
       </p:ext>
     </p:extLst>
   </p:cSld>
@@ -5126,6 +5341,102 @@
     <p:extLst>
       <p:ext uri="{BB962C8B-B14F-4D97-AF65-F5344CB8AC3E}">
         <p14:creationId xmlns:p14="http://schemas.microsoft.com/office/powerpoint/2010/main" val="2136623411"/>
+      </p:ext>
+    </p:extLst>
+  </p:cSld>
+  <p:clrMapOvr>
+    <a:masterClrMapping/>
+  </p:clrMapOvr>
+</p:sld>
+</file>
+
+<file path=ppt/slides/slide20.xml><?xml version="1.0" encoding="utf-8"?>
+<p:sld xmlns:a="http://schemas.openxmlformats.org/drawingml/2006/main" xmlns:r="http://schemas.openxmlformats.org/officeDocument/2006/relationships" xmlns:p="http://schemas.openxmlformats.org/presentationml/2006/main">
+  <p:cSld>
+    <p:spTree>
+      <p:nvGrpSpPr>
+        <p:cNvPr id="1" name=""/>
+        <p:cNvGrpSpPr/>
+        <p:nvPr/>
+      </p:nvGrpSpPr>
+      <p:grpSpPr>
+        <a:xfrm>
+          <a:off x="0" y="0"/>
+          <a:ext cx="0" cy="0"/>
+          <a:chOff x="0" y="0"/>
+          <a:chExt cx="0" cy="0"/>
+        </a:xfrm>
+      </p:grpSpPr>
+      <p:sp>
+        <p:nvSpPr>
+          <p:cNvPr id="2" name="Título 1">
+            <a:extLst>
+              <a:ext uri="{FF2B5EF4-FFF2-40B4-BE49-F238E27FC236}">
+                <a16:creationId xmlns:a16="http://schemas.microsoft.com/office/drawing/2014/main" id="{E28CA087-FA30-60BE-45DB-5FAAAEE20665}"/>
+              </a:ext>
+            </a:extLst>
+          </p:cNvPr>
+          <p:cNvSpPr>
+            <a:spLocks noGrp="1"/>
+          </p:cNvSpPr>
+          <p:nvPr>
+            <p:ph type="title"/>
+          </p:nvPr>
+        </p:nvSpPr>
+        <p:spPr>
+          <a:xfrm>
+            <a:off x="994117" y="964692"/>
+            <a:ext cx="10203766" cy="793770"/>
+          </a:xfrm>
+        </p:spPr>
+        <p:txBody>
+          <a:bodyPr>
+            <a:normAutofit/>
+          </a:bodyPr>
+          <a:lstStyle/>
+          <a:p>
+            <a:r>
+              <a:rPr lang="es-BO" b="1" dirty="0"/>
+              <a:t>6.	CONCLUSION/RECOMENDACIÓN</a:t>
+            </a:r>
+            <a:endParaRPr lang="es-BO" dirty="0"/>
+          </a:p>
+        </p:txBody>
+      </p:sp>
+      <p:sp>
+        <p:nvSpPr>
+          <p:cNvPr id="3" name="Marcador de contenido 2">
+            <a:extLst>
+              <a:ext uri="{FF2B5EF4-FFF2-40B4-BE49-F238E27FC236}">
+                <a16:creationId xmlns:a16="http://schemas.microsoft.com/office/drawing/2014/main" id="{A03F4793-332F-447C-FEBA-8C99D67BE98B}"/>
+              </a:ext>
+            </a:extLst>
+          </p:cNvPr>
+          <p:cNvSpPr>
+            <a:spLocks noGrp="1"/>
+          </p:cNvSpPr>
+          <p:nvPr>
+            <p:ph idx="1"/>
+          </p:nvPr>
+        </p:nvSpPr>
+        <p:spPr>
+          <a:xfrm>
+            <a:off x="994117" y="1941342"/>
+            <a:ext cx="10203766" cy="3798685"/>
+          </a:xfrm>
+        </p:spPr>
+        <p:txBody>
+          <a:bodyPr/>
+          <a:lstStyle/>
+          <a:p>
+            <a:endParaRPr lang="es-BO" dirty="0"/>
+          </a:p>
+        </p:txBody>
+      </p:sp>
+    </p:spTree>
+    <p:extLst>
+      <p:ext uri="{BB962C8B-B14F-4D97-AF65-F5344CB8AC3E}">
+        <p14:creationId xmlns:p14="http://schemas.microsoft.com/office/powerpoint/2010/main" val="2828308452"/>
       </p:ext>
     </p:extLst>
   </p:cSld>

</xml_diff>

<commit_message>
Seccion de liderazgo actualizada
</commit_message>
<xml_diff>
--- a/Presentacion - Exposicion.pptx
+++ b/Presentacion - Exposicion.pptx
@@ -17,14 +17,20 @@
     <p:sldId id="263" r:id="rId11"/>
     <p:sldId id="275" r:id="rId12"/>
     <p:sldId id="276" r:id="rId13"/>
-    <p:sldId id="268" r:id="rId14"/>
-    <p:sldId id="269" r:id="rId15"/>
-    <p:sldId id="274" r:id="rId16"/>
-    <p:sldId id="271" r:id="rId17"/>
-    <p:sldId id="270" r:id="rId18"/>
-    <p:sldId id="272" r:id="rId19"/>
-    <p:sldId id="260" r:id="rId20"/>
-    <p:sldId id="259" r:id="rId21"/>
+    <p:sldId id="278" r:id="rId14"/>
+    <p:sldId id="277" r:id="rId15"/>
+    <p:sldId id="279" r:id="rId16"/>
+    <p:sldId id="268" r:id="rId17"/>
+    <p:sldId id="269" r:id="rId18"/>
+    <p:sldId id="274" r:id="rId19"/>
+    <p:sldId id="271" r:id="rId20"/>
+    <p:sldId id="280" r:id="rId21"/>
+    <p:sldId id="281" r:id="rId22"/>
+    <p:sldId id="282" r:id="rId23"/>
+    <p:sldId id="270" r:id="rId24"/>
+    <p:sldId id="272" r:id="rId25"/>
+    <p:sldId id="260" r:id="rId26"/>
+    <p:sldId id="259" r:id="rId27"/>
   </p:sldIdLst>
   <p:sldSz cx="12192000" cy="6858000"/>
   <p:notesSz cx="6858000" cy="9144000"/>
@@ -294,7 +300,7 @@
           <a:p>
             <a:fld id="{1160EA64-D806-43AC-9DF2-F8C432F32B4C}" type="datetimeFigureOut">
               <a:rPr lang="en-US" dirty="0"/>
-              <a:t>6/27/2023</a:t>
+              <a:t>6/28/2023</a:t>
             </a:fld>
             <a:endParaRPr lang="en-US" dirty="0"/>
           </a:p>
@@ -460,7 +466,7 @@
           <a:p>
             <a:fld id="{E9F9C37B-1D36-470B-8223-D6C91242EC14}" type="datetimeFigureOut">
               <a:rPr lang="en-US" dirty="0"/>
-              <a:t>6/27/2023</a:t>
+              <a:t>6/28/2023</a:t>
             </a:fld>
             <a:endParaRPr lang="en-US" dirty="0"/>
           </a:p>
@@ -635,7 +641,7 @@
           <a:p>
             <a:fld id="{67C6F52A-A82B-47A2-A83A-8C4C91F2D59F}" type="datetimeFigureOut">
               <a:rPr lang="en-US" dirty="0"/>
-              <a:t>6/27/2023</a:t>
+              <a:t>6/28/2023</a:t>
             </a:fld>
             <a:endParaRPr lang="en-US" dirty="0"/>
           </a:p>
@@ -800,7 +806,7 @@
           <a:p>
             <a:fld id="{F070A7B3-6521-4DCA-87E5-044747A908C1}" type="datetimeFigureOut">
               <a:rPr lang="en-US" dirty="0"/>
-              <a:t>6/27/2023</a:t>
+              <a:t>6/28/2023</a:t>
             </a:fld>
             <a:endParaRPr lang="en-US" dirty="0"/>
           </a:p>
@@ -1064,7 +1070,7 @@
           <a:p>
             <a:fld id="{1160EA64-D806-43AC-9DF2-F8C432F32B4C}" type="datetimeFigureOut">
               <a:rPr lang="en-US" dirty="0"/>
-              <a:t>6/27/2023</a:t>
+              <a:t>6/28/2023</a:t>
             </a:fld>
             <a:endParaRPr lang="en-US" dirty="0"/>
           </a:p>
@@ -1292,7 +1298,7 @@
           <a:p>
             <a:fld id="{AB134690-1557-4C89-A502-4959FE7FAD70}" type="datetimeFigureOut">
               <a:rPr lang="en-US" dirty="0"/>
-              <a:t>6/27/2023</a:t>
+              <a:t>6/28/2023</a:t>
             </a:fld>
             <a:endParaRPr lang="en-US" dirty="0"/>
           </a:p>
@@ -1646,7 +1652,7 @@
           <a:p>
             <a:fld id="{4F7D4976-E339-4826-83B7-FBD03F55ECF8}" type="datetimeFigureOut">
               <a:rPr lang="en-US" dirty="0"/>
-              <a:t>6/27/2023</a:t>
+              <a:t>6/28/2023</a:t>
             </a:fld>
             <a:endParaRPr lang="en-US" dirty="0"/>
           </a:p>
@@ -1782,7 +1788,7 @@
           <a:p>
             <a:fld id="{E1037C31-9E7A-4F99-8774-A0E530DE1A42}" type="datetimeFigureOut">
               <a:rPr lang="en-US" dirty="0"/>
-              <a:t>6/27/2023</a:t>
+              <a:t>6/28/2023</a:t>
             </a:fld>
             <a:endParaRPr lang="en-US" dirty="0"/>
           </a:p>
@@ -1872,7 +1878,7 @@
           <a:p>
             <a:fld id="{C278504F-A551-4DE0-9316-4DCD1D8CC752}" type="datetimeFigureOut">
               <a:rPr lang="en-US" dirty="0"/>
-              <a:t>6/27/2023</a:t>
+              <a:t>6/28/2023</a:t>
             </a:fld>
             <a:endParaRPr lang="en-US" dirty="0"/>
           </a:p>
@@ -2224,7 +2230,7 @@
           <a:p>
             <a:fld id="{D1BE4249-C0D0-4B06-8692-E8BB871AF643}" type="datetimeFigureOut">
               <a:rPr lang="en-US" dirty="0"/>
-              <a:t>6/27/2023</a:t>
+              <a:t>6/28/2023</a:t>
             </a:fld>
             <a:endParaRPr lang="en-US" dirty="0"/>
           </a:p>
@@ -2576,7 +2582,7 @@
           <a:p>
             <a:fld id="{042B0DB6-F5C7-45FB-8CF3-31B45F9C2DAC}" type="datetimeFigureOut">
               <a:rPr lang="en-US" dirty="0"/>
-              <a:t>6/27/2023</a:t>
+              <a:t>6/28/2023</a:t>
             </a:fld>
             <a:endParaRPr lang="en-US" dirty="0"/>
           </a:p>
@@ -2813,7 +2819,7 @@
           <a:p>
             <a:fld id="{1160EA64-D806-43AC-9DF2-F8C432F32B4C}" type="datetimeFigureOut">
               <a:rPr lang="en-US" dirty="0"/>
-              <a:t>6/27/2023</a:t>
+              <a:t>6/28/2023</a:t>
             </a:fld>
             <a:endParaRPr lang="en-US" dirty="0"/>
           </a:p>
@@ -3931,7 +3937,7 @@
           <a:p>
             <a:r>
               <a:rPr lang="es-BO" b="1" dirty="0"/>
-              <a:t>4.	LIDERAZGO c)	Motivar y recompensar a los empleados</a:t>
+              <a:t>4. LIDERAZGO: LOS GRUPOS Y LA ADMINISTRACIÓN DE EQUIPOS DE TRABAJO</a:t>
             </a:r>
           </a:p>
         </p:txBody>
@@ -3954,90 +3960,53 @@
         </p:nvSpPr>
         <p:spPr>
           <a:xfrm>
-            <a:off x="911846" y="2180494"/>
-            <a:ext cx="4773637" cy="1364566"/>
-          </a:xfrm>
-        </p:spPr>
-        <p:txBody>
-          <a:bodyPr/>
+            <a:off x="6096000" y="2094623"/>
+            <a:ext cx="5512904" cy="2660257"/>
+          </a:xfrm>
+        </p:spPr>
+        <p:txBody>
+          <a:bodyPr>
+            <a:normAutofit/>
+          </a:bodyPr>
           <a:lstStyle/>
           <a:p>
             <a:pPr marL="0" indent="0">
               <a:buNone/>
             </a:pPr>
             <a:r>
-              <a:rPr lang="es-BO" sz="1800" i="1" dirty="0">
-                <a:effectLst/>
-                <a:latin typeface="Calibri" panose="020F0502020204030204" pitchFamily="34" charset="0"/>
-                <a:ea typeface="Calibri" panose="020F0502020204030204" pitchFamily="34" charset="0"/>
-                <a:cs typeface="Arial" panose="020B0604020202020204" pitchFamily="34" charset="0"/>
-              </a:rPr>
-              <a:t>La motivación de empleados se define como el entusiasmo, el nivel de energía, el </a:t>
-            </a:r>
-            <a:r>
-              <a:rPr lang="es-BO" sz="1800" i="1" dirty="0" err="1">
-                <a:effectLst/>
-                <a:latin typeface="Calibri" panose="020F0502020204030204" pitchFamily="34" charset="0"/>
-                <a:ea typeface="Calibri" panose="020F0502020204030204" pitchFamily="34" charset="0"/>
-                <a:cs typeface="Arial" panose="020B0604020202020204" pitchFamily="34" charset="0"/>
-              </a:rPr>
-              <a:t>compromisoy</a:t>
-            </a:r>
-            <a:r>
-              <a:rPr lang="es-BO" sz="1800" i="1" dirty="0">
-                <a:effectLst/>
-                <a:latin typeface="Calibri" panose="020F0502020204030204" pitchFamily="34" charset="0"/>
-                <a:ea typeface="Calibri" panose="020F0502020204030204" pitchFamily="34" charset="0"/>
-                <a:cs typeface="Arial" panose="020B0604020202020204" pitchFamily="34" charset="0"/>
-              </a:rPr>
-              <a:t> la cantidad de creatividad que un empleado aporta diariamente a la organización.</a:t>
-            </a:r>
+              <a:rPr lang="es-BO" sz="2000" dirty="0"/>
+              <a:t>Primeramente, tenemos que tener en cuenta la diferencia entre equipos de trabajo y grupos de trabajo.</a:t>
+            </a:r>
+          </a:p>
+          <a:p>
+            <a:pPr marL="0" indent="0">
+              <a:buNone/>
+            </a:pPr>
+            <a:r>
+              <a:rPr lang="es-BO" sz="2000" dirty="0"/>
+              <a:t>Podemos destacar que la principal diferencia entre equipos de trabajo y grupos de trabajo radica en el nivel de interdependencia, colaboración y enfoque hacia un objetivo común. </a:t>
+            </a:r>
+          </a:p>
+          <a:p>
+            <a:pPr marL="0" indent="0">
+              <a:buNone/>
+            </a:pPr>
             <a:endParaRPr lang="es-BO" dirty="0"/>
           </a:p>
-        </p:txBody>
-      </p:sp>
-      <p:sp>
-        <p:nvSpPr>
-          <p:cNvPr id="4" name="CuadroTexto 3">
-            <a:extLst>
-              <a:ext uri="{FF2B5EF4-FFF2-40B4-BE49-F238E27FC236}">
-                <a16:creationId xmlns:a16="http://schemas.microsoft.com/office/drawing/2014/main" id="{5CA396EC-CDD8-A424-C378-96A2CD8F32D3}"/>
-              </a:ext>
-            </a:extLst>
-          </p:cNvPr>
-          <p:cNvSpPr txBox="1"/>
-          <p:nvPr/>
-        </p:nvSpPr>
-        <p:spPr>
-          <a:xfrm>
-            <a:off x="6330462" y="4451814"/>
-            <a:ext cx="4656406" cy="1200329"/>
-          </a:xfrm>
-          <a:prstGeom prst="rect">
-            <a:avLst/>
-          </a:prstGeom>
-          <a:noFill/>
-        </p:spPr>
-        <p:txBody>
-          <a:bodyPr wrap="square" rtlCol="0">
-            <a:spAutoFit/>
-          </a:bodyPr>
-          <a:lstStyle/>
-          <a:p>
-            <a:r>
-              <a:rPr lang="es-BO" i="1" dirty="0"/>
-              <a:t>La motivación juega un papel muy importante en la vida de un ser humano. Ya sea para mejorarnos a nosotros mismos o para mejorar el desempeño de nuestra organización. </a:t>
-            </a:r>
-            <a:endParaRPr lang="es-ES" i="1" dirty="0"/>
+          <a:p>
+            <a:pPr marL="0" indent="0">
+              <a:buNone/>
+            </a:pPr>
+            <a:endParaRPr lang="es-BO" sz="2000" dirty="0"/>
           </a:p>
         </p:txBody>
       </p:sp>
       <p:pic>
         <p:nvPicPr>
-          <p:cNvPr id="1026" name="Picture 2" descr="Motivación laboral: claves y factores de la productividad empresarial -  NeoMercados.com">
-            <a:extLst>
-              <a:ext uri="{FF2B5EF4-FFF2-40B4-BE49-F238E27FC236}">
-                <a16:creationId xmlns:a16="http://schemas.microsoft.com/office/drawing/2014/main" id="{BE2015BA-1B4E-D336-825E-BDBF90E42258}"/>
+          <p:cNvPr id="3074" name="Picture 2" descr="Delizia_2-FILEminimizer">
+            <a:extLst>
+              <a:ext uri="{FF2B5EF4-FFF2-40B4-BE49-F238E27FC236}">
+                <a16:creationId xmlns:a16="http://schemas.microsoft.com/office/drawing/2014/main" id="{AC74C9BB-9716-9FFD-E968-38EA80D81AAD}"/>
               </a:ext>
             </a:extLst>
           </p:cNvPr>
@@ -4061,8 +4030,8 @@
         </p:blipFill>
         <p:spPr bwMode="auto">
           <a:xfrm>
-            <a:off x="6836377" y="2048612"/>
-            <a:ext cx="3521612" cy="2343991"/>
+            <a:off x="994117" y="2094623"/>
+            <a:ext cx="4876799" cy="2786062"/>
           </a:xfrm>
           <a:prstGeom prst="rect">
             <a:avLst/>
@@ -4079,57 +4048,48 @@
           </a:extLst>
         </p:spPr>
       </p:pic>
-      <p:pic>
-        <p:nvPicPr>
-          <p:cNvPr id="1028" name="Picture 4" descr="Motivación empresarial: ¿cómo mantenerla en tu personal?">
-            <a:extLst>
-              <a:ext uri="{FF2B5EF4-FFF2-40B4-BE49-F238E27FC236}">
-                <a16:creationId xmlns:a16="http://schemas.microsoft.com/office/drawing/2014/main" id="{4C1A32E2-A18C-23EB-CF9B-B16A94B2BCC1}"/>
-              </a:ext>
-            </a:extLst>
-          </p:cNvPr>
-          <p:cNvPicPr>
-            <a:picLocks noChangeAspect="1" noChangeArrowheads="1"/>
-          </p:cNvPicPr>
+      <p:sp>
+        <p:nvSpPr>
+          <p:cNvPr id="4" name="CuadroTexto 3">
+            <a:extLst>
+              <a:ext uri="{FF2B5EF4-FFF2-40B4-BE49-F238E27FC236}">
+                <a16:creationId xmlns:a16="http://schemas.microsoft.com/office/drawing/2014/main" id="{058BFADB-D84C-96EE-6267-9E61387D3516}"/>
+              </a:ext>
+            </a:extLst>
+          </p:cNvPr>
+          <p:cNvSpPr txBox="1"/>
           <p:nvPr/>
-        </p:nvPicPr>
-        <p:blipFill>
-          <a:blip r:embed="rId3">
-            <a:extLst>
-              <a:ext uri="{28A0092B-C50C-407E-A947-70E740481C1C}">
-                <a14:useLocalDpi xmlns:a14="http://schemas.microsoft.com/office/drawing/2010/main" val="0"/>
-              </a:ext>
-            </a:extLst>
-          </a:blip>
-          <a:srcRect/>
-          <a:stretch>
-            <a:fillRect/>
-          </a:stretch>
-        </p:blipFill>
-        <p:spPr bwMode="auto">
-          <a:xfrm>
-            <a:off x="1097332" y="3686779"/>
-            <a:ext cx="4258292" cy="2011045"/>
+        </p:nvSpPr>
+        <p:spPr>
+          <a:xfrm>
+            <a:off x="982957" y="5216846"/>
+            <a:ext cx="10625947" cy="1323439"/>
           </a:xfrm>
           <a:prstGeom prst="rect">
             <a:avLst/>
           </a:prstGeom>
           <a:noFill/>
-          <a:extLst>
-            <a:ext uri="{909E8E84-426E-40DD-AFC4-6F175D3DCCD1}">
-              <a14:hiddenFill xmlns:a14="http://schemas.microsoft.com/office/drawing/2010/main">
-                <a:solidFill>
-                  <a:srgbClr val="FFFFFF"/>
-                </a:solidFill>
-              </a14:hiddenFill>
-            </a:ext>
-          </a:extLst>
-        </p:spPr>
-      </p:pic>
+        </p:spPr>
+        <p:txBody>
+          <a:bodyPr wrap="square" rtlCol="0">
+            <a:spAutoFit/>
+          </a:bodyPr>
+          <a:lstStyle/>
+          <a:p>
+            <a:r>
+              <a:rPr lang="es-BO" sz="2000" dirty="0"/>
+              <a:t>Los equipos de trabajo implican una mayor interacción, colaboración y necesidad de lograr objetivos compartidos, mientras que los grupos de trabajo tienden a tener roles menos definidos y se enfocan en tareas individuales sin una necesidad fuerte de colaboración.</a:t>
+            </a:r>
+          </a:p>
+          <a:p>
+            <a:endParaRPr lang="es-ES" sz="2000" dirty="0"/>
+          </a:p>
+        </p:txBody>
+      </p:sp>
     </p:spTree>
     <p:extLst>
       <p:ext uri="{BB962C8B-B14F-4D97-AF65-F5344CB8AC3E}">
-        <p14:creationId xmlns:p14="http://schemas.microsoft.com/office/powerpoint/2010/main" val="4004118298"/>
+        <p14:creationId xmlns:p14="http://schemas.microsoft.com/office/powerpoint/2010/main" val="796738625"/>
       </p:ext>
     </p:extLst>
   </p:cSld>
@@ -4186,17 +4146,61 @@
           <a:p>
             <a:r>
               <a:rPr lang="es-BO" b="1" dirty="0"/>
-              <a:t>¿Cuál es la importancia de motivar a los empleados?</a:t>
-            </a:r>
-          </a:p>
-        </p:txBody>
-      </p:sp>
-      <p:sp>
-        <p:nvSpPr>
-          <p:cNvPr id="7" name="CuadroTexto 6">
-            <a:extLst>
-              <a:ext uri="{FF2B5EF4-FFF2-40B4-BE49-F238E27FC236}">
-                <a16:creationId xmlns:a16="http://schemas.microsoft.com/office/drawing/2014/main" id="{9754003E-35C5-D223-5F22-3C71D7660B60}"/>
+              <a:t>4. LIDERAZGO: LOS GRUPOS Y LA ADMINISTRACIÓN DE EQUIPOS DE TRABAJO</a:t>
+            </a:r>
+          </a:p>
+        </p:txBody>
+      </p:sp>
+      <p:sp>
+        <p:nvSpPr>
+          <p:cNvPr id="3" name="Marcador de contenido 2">
+            <a:extLst>
+              <a:ext uri="{FF2B5EF4-FFF2-40B4-BE49-F238E27FC236}">
+                <a16:creationId xmlns:a16="http://schemas.microsoft.com/office/drawing/2014/main" id="{A03F4793-332F-447C-FEBA-8C99D67BE98B}"/>
+              </a:ext>
+            </a:extLst>
+          </p:cNvPr>
+          <p:cNvSpPr>
+            <a:spLocks noGrp="1"/>
+          </p:cNvSpPr>
+          <p:nvPr>
+            <p:ph idx="1"/>
+          </p:nvPr>
+        </p:nvSpPr>
+        <p:spPr>
+          <a:xfrm>
+            <a:off x="702365" y="1952821"/>
+            <a:ext cx="11065106" cy="793770"/>
+          </a:xfrm>
+        </p:spPr>
+        <p:txBody>
+          <a:bodyPr>
+            <a:normAutofit/>
+          </a:bodyPr>
+          <a:lstStyle/>
+          <a:p>
+            <a:pPr marL="0" indent="0">
+              <a:buNone/>
+            </a:pPr>
+            <a:r>
+              <a:rPr lang="es-BO" dirty="0"/>
+              <a:t>Particularmente en la empresa “DELIZIA” se manejan equipos de trabajo, realizando las siguientes características.</a:t>
+            </a:r>
+          </a:p>
+          <a:p>
+            <a:pPr marL="0" indent="0">
+              <a:buNone/>
+            </a:pPr>
+            <a:endParaRPr lang="es-BO" dirty="0"/>
+          </a:p>
+        </p:txBody>
+      </p:sp>
+      <p:sp>
+        <p:nvSpPr>
+          <p:cNvPr id="8" name="CuadroTexto 7">
+            <a:extLst>
+              <a:ext uri="{FF2B5EF4-FFF2-40B4-BE49-F238E27FC236}">
+                <a16:creationId xmlns:a16="http://schemas.microsoft.com/office/drawing/2014/main" id="{D9353173-BE19-565B-583C-E06CB0F32CCD}"/>
               </a:ext>
             </a:extLst>
           </p:cNvPr>
@@ -4205,8 +4209,8 @@
         </p:nvSpPr>
         <p:spPr>
           <a:xfrm>
-            <a:off x="740898" y="1829812"/>
-            <a:ext cx="11075963" cy="1754326"/>
+            <a:off x="702365" y="2579243"/>
+            <a:ext cx="11065107" cy="3970318"/>
           </a:xfrm>
           <a:prstGeom prst="rect">
             <a:avLst/>
@@ -4220,162 +4224,54 @@
           <a:lstStyle/>
           <a:p>
             <a:r>
+              <a:rPr lang="es-BO" b="1" dirty="0"/>
+              <a:t>Definiendo roles y responsabilidades: </a:t>
+            </a:r>
+            <a:r>
               <a:rPr lang="es-BO" dirty="0"/>
-              <a:t>La motivación juega un papel muy importante en la vida de un ser humano. Ya sea para mejorarnos a nosotros mismos o para mejorar el desempeño de nuestra organización. Los empleados motivados no necesitan que se les diga cómo hacer las cosas, toman iniciativas, están ansiosos por asumir responsabilidades adicionales, son innovadores y emprendedores.</a:t>
-            </a:r>
-          </a:p>
-          <a:p>
-            <a:endParaRPr lang="es-BO" dirty="0"/>
-          </a:p>
-          <a:p>
+              <a:t>Identificando las diferentes áreas o funciones necesarias para el funcionamiento de la empresa “DELIZIA”, como producción, atención al cliente, marketing, entre otros. Asignando roles y responsabilidades claras a los miembros del equipo en función de sus habilidades y capacidades.</a:t>
+            </a:r>
+          </a:p>
+          <a:p>
+            <a:endParaRPr lang="es-BO" b="1" dirty="0"/>
+          </a:p>
+          <a:p>
+            <a:r>
+              <a:rPr lang="es-BO" b="1" dirty="0"/>
+              <a:t>Fomenta la colaboración: </a:t>
+            </a:r>
             <a:r>
               <a:rPr lang="es-BO" dirty="0"/>
-              <a:t>Para motivar y recompensar a los empleados , se pueden seguir las siguientes estrategias : </a:t>
-            </a:r>
-            <a:endParaRPr lang="es-ES" dirty="0"/>
-          </a:p>
-        </p:txBody>
-      </p:sp>
-      <p:sp>
-        <p:nvSpPr>
-          <p:cNvPr id="3" name="CuadroTexto 2">
-            <a:extLst>
-              <a:ext uri="{FF2B5EF4-FFF2-40B4-BE49-F238E27FC236}">
-                <a16:creationId xmlns:a16="http://schemas.microsoft.com/office/drawing/2014/main" id="{8D2447AD-C916-7250-E795-3A2BA4F7EC9C}"/>
-              </a:ext>
-            </a:extLst>
-          </p:cNvPr>
-          <p:cNvSpPr txBox="1"/>
-          <p:nvPr/>
-        </p:nvSpPr>
-        <p:spPr>
-          <a:xfrm>
-            <a:off x="698695" y="3655489"/>
-            <a:ext cx="5166030" cy="2585323"/>
-          </a:xfrm>
-          <a:prstGeom prst="rect">
-            <a:avLst/>
-          </a:prstGeom>
-          <a:noFill/>
-        </p:spPr>
-        <p:txBody>
-          <a:bodyPr wrap="none" rtlCol="0">
-            <a:spAutoFit/>
-          </a:bodyPr>
-          <a:lstStyle/>
-          <a:p>
+              <a:t>Estableciendo un ambiente de trabajo colaborativo donde los miembros del equipo pueden compartir ideas, conocimientos y trabajar juntos para alcanzar los objetivos de la empresa. </a:t>
+            </a:r>
+          </a:p>
+          <a:p>
+            <a:endParaRPr lang="es-BO" b="1" dirty="0"/>
+          </a:p>
+          <a:p>
+            <a:r>
+              <a:rPr lang="es-BO" b="1" dirty="0"/>
+              <a:t>Establece metas claras: </a:t>
+            </a:r>
             <a:r>
               <a:rPr lang="es-BO" dirty="0"/>
-              <a:t>•Premiar y reconocer a los empleados.</a:t>
-            </a:r>
-          </a:p>
-          <a:p>
-            <a:endParaRPr lang="es-BO" dirty="0"/>
-          </a:p>
-          <a:p>
+              <a:t>Definiendo metas y objetivos claros para el equipo de trabajo. Estas metas pueden incluir aumentar las ventas de todos los productos elaborados, mejorando la calidad del producto, expandir la presencia en el mercado, entre otros. Asegurando que el equipo de trabajo sea eficiente. </a:t>
+            </a:r>
+          </a:p>
+          <a:p>
+            <a:endParaRPr lang="es-BO" b="1" dirty="0"/>
+          </a:p>
+          <a:p>
+            <a:r>
+              <a:rPr lang="es-BO" b="1" dirty="0"/>
+              <a:t>Promoviendo la creatividad e innovación: </a:t>
+            </a:r>
             <a:r>
               <a:rPr lang="es-BO" dirty="0"/>
-              <a:t>•Mantener una comunicación constante y fluida.</a:t>
-            </a:r>
-          </a:p>
-          <a:p>
-            <a:endParaRPr lang="es-BO" dirty="0"/>
-          </a:p>
-          <a:p>
-            <a:r>
-              <a:rPr lang="es-BO" dirty="0"/>
-              <a:t>•Ofrecer formación y aprendizaje constante.</a:t>
-            </a:r>
-          </a:p>
-          <a:p>
-            <a:endParaRPr lang="es-BO" dirty="0"/>
-          </a:p>
-          <a:p>
-            <a:r>
-              <a:rPr lang="es-BO" dirty="0"/>
-              <a:t>•Proporcionar flexibilidad laboral.</a:t>
-            </a:r>
-          </a:p>
-          <a:p>
-            <a:endParaRPr lang="es-BO" dirty="0"/>
-          </a:p>
-          <a:p>
-            <a:r>
-              <a:rPr lang="es-BO" dirty="0"/>
-              <a:t>•Dar a los empleados objetivos que puedan controlar</a:t>
-            </a:r>
-            <a:endParaRPr lang="es-ES" dirty="0"/>
-          </a:p>
-        </p:txBody>
-      </p:sp>
-      <p:sp>
-        <p:nvSpPr>
-          <p:cNvPr id="5" name="CuadroTexto 4">
-            <a:extLst>
-              <a:ext uri="{FF2B5EF4-FFF2-40B4-BE49-F238E27FC236}">
-                <a16:creationId xmlns:a16="http://schemas.microsoft.com/office/drawing/2014/main" id="{9E4265F5-35D0-150D-3628-9268DFC9F634}"/>
-              </a:ext>
-            </a:extLst>
-          </p:cNvPr>
-          <p:cNvSpPr txBox="1"/>
-          <p:nvPr/>
-        </p:nvSpPr>
-        <p:spPr>
-          <a:xfrm>
-            <a:off x="5953820" y="3655488"/>
-            <a:ext cx="4681355" cy="3139321"/>
-          </a:xfrm>
-          <a:prstGeom prst="rect">
-            <a:avLst/>
-          </a:prstGeom>
-          <a:noFill/>
-        </p:spPr>
-        <p:txBody>
-          <a:bodyPr wrap="square" rtlCol="0">
-            <a:spAutoFit/>
-          </a:bodyPr>
-          <a:lstStyle/>
-          <a:p>
-            <a:r>
-              <a:rPr lang="es-BO" dirty="0"/>
-              <a:t>•Reforzar la comunicación de los directivos.</a:t>
-            </a:r>
-          </a:p>
-          <a:p>
-            <a:endParaRPr lang="es-BO" dirty="0"/>
-          </a:p>
-          <a:p>
-            <a:r>
-              <a:rPr lang="es-BO" dirty="0"/>
-              <a:t>•Diseñar un lugar de trabajo acogedor.</a:t>
-            </a:r>
-          </a:p>
-          <a:p>
-            <a:endParaRPr lang="es-BO" dirty="0"/>
-          </a:p>
-          <a:p>
-            <a:r>
-              <a:rPr lang="es-BO" dirty="0"/>
-              <a:t>•Reconocer y recompensar a los empleados.</a:t>
-            </a:r>
-          </a:p>
-          <a:p>
-            <a:endParaRPr lang="es-BO" dirty="0"/>
-          </a:p>
-          <a:p>
-            <a:r>
-              <a:rPr lang="es-BO" dirty="0"/>
-              <a:t>•Promover el crecimiento personal e implicar a los trabajadores en la toma de decisiones.</a:t>
-            </a:r>
-          </a:p>
-          <a:p>
-            <a:endParaRPr lang="es-BO" dirty="0"/>
-          </a:p>
-          <a:p>
-            <a:r>
-              <a:rPr lang="es-BO" dirty="0"/>
-              <a:t>•Ofrecer recompensas adicionales para motivar a los empleados a ir más allá de sus límites.</a:t>
-            </a:r>
+              <a:t>Hace que los miembros del equipo propongan ideas y soluciones innovadoras para mejorar y desarrollar nuevas estrategias de marketing o encontrar formas más eficientes de operar. </a:t>
+            </a:r>
+          </a:p>
+          <a:p>
             <a:endParaRPr lang="es-ES" dirty="0"/>
           </a:p>
         </p:txBody>
@@ -4383,7 +4279,7 @@
     </p:spTree>
     <p:extLst>
       <p:ext uri="{BB962C8B-B14F-4D97-AF65-F5344CB8AC3E}">
-        <p14:creationId xmlns:p14="http://schemas.microsoft.com/office/powerpoint/2010/main" val="1987734335"/>
+        <p14:creationId xmlns:p14="http://schemas.microsoft.com/office/powerpoint/2010/main" val="1869953941"/>
       </p:ext>
     </p:extLst>
   </p:cSld>
@@ -4434,24 +4330,23 @@
         </p:spPr>
         <p:txBody>
           <a:bodyPr>
-            <a:normAutofit/>
+            <a:normAutofit fontScale="90000"/>
           </a:bodyPr>
           <a:lstStyle/>
           <a:p>
             <a:r>
-              <a:rPr lang="es-ES" b="1" dirty="0"/>
-              <a:t>Recompensar</a:t>
-            </a:r>
-            <a:endParaRPr lang="es-BO" b="1" dirty="0"/>
-          </a:p>
-        </p:txBody>
-      </p:sp>
-      <p:sp>
-        <p:nvSpPr>
-          <p:cNvPr id="7" name="CuadroTexto 6">
-            <a:extLst>
-              <a:ext uri="{FF2B5EF4-FFF2-40B4-BE49-F238E27FC236}">
-                <a16:creationId xmlns:a16="http://schemas.microsoft.com/office/drawing/2014/main" id="{9754003E-35C5-D223-5F22-3C71D7660B60}"/>
+              <a:rPr lang="es-BO" b="1" dirty="0"/>
+              <a:t>4. LIDERAZGO: LOS GRUPOS Y LA ADMINISTRACIÓN DE EQUIPOS DE TRABAJO</a:t>
+            </a:r>
+          </a:p>
+        </p:txBody>
+      </p:sp>
+      <p:sp>
+        <p:nvSpPr>
+          <p:cNvPr id="8" name="CuadroTexto 7">
+            <a:extLst>
+              <a:ext uri="{FF2B5EF4-FFF2-40B4-BE49-F238E27FC236}">
+                <a16:creationId xmlns:a16="http://schemas.microsoft.com/office/drawing/2014/main" id="{D9353173-BE19-565B-583C-E06CB0F32CCD}"/>
               </a:ext>
             </a:extLst>
           </p:cNvPr>
@@ -4460,8 +4355,8 @@
         </p:nvSpPr>
         <p:spPr>
           <a:xfrm>
-            <a:off x="740898" y="1829812"/>
-            <a:ext cx="11075963" cy="1200329"/>
+            <a:off x="658296" y="2091881"/>
+            <a:ext cx="11065107" cy="4247317"/>
           </a:xfrm>
           <a:prstGeom prst="rect">
             <a:avLst/>
@@ -4475,139 +4370,64 @@
           <a:lstStyle/>
           <a:p>
             <a:r>
+              <a:rPr lang="es-BO" b="1" dirty="0"/>
+              <a:t>Capacitación y desarrollo: </a:t>
+            </a:r>
+            <a:r>
               <a:rPr lang="es-BO" dirty="0"/>
-              <a:t>En el ámbito empresarial de hoy en día, las recompensas y los reconocimientos han llegado a ser más importante que nunca ya que los gerentes disponen de menos manera de influir en sus empleados o de moldear su comportamiento. En tiempo de estrechez económica, las recompensas y el reconocimiento proporcionan una manera eficaz de estimular a los empleados para que logren más altos niveles de desempeño.</a:t>
-            </a:r>
+              <a:t>Brinda oportunidades de capacitación y desarrollo a los miembros del equipo para mejorar sus habilidades técnicas y conocimientos relacionados con las técnicas de servicio al cliente, marketing o gestión empresarial.</a:t>
+            </a:r>
+          </a:p>
+          <a:p>
+            <a:endParaRPr lang="es-BO" dirty="0"/>
+          </a:p>
+          <a:p>
+            <a:r>
+              <a:rPr lang="es-BO" b="1" dirty="0"/>
+              <a:t>Gestión de recursos: </a:t>
+            </a:r>
+            <a:r>
+              <a:rPr lang="es-BO" dirty="0"/>
+              <a:t>Realiza todos los recursos necesarios para que el equipo de trabajo pueda desempeñarse de manera efectiva. Esto incluye herramientas y equipos adecuados, así como el apoyo logístico necesario para la distribución y venta de los productos.</a:t>
+            </a:r>
+          </a:p>
+          <a:p>
+            <a:endParaRPr lang="es-BO" dirty="0"/>
+          </a:p>
+          <a:p>
+            <a:r>
+              <a:rPr lang="es-BO" b="1" dirty="0"/>
+              <a:t>Evaluación y retroalimentación: </a:t>
+            </a:r>
+            <a:r>
+              <a:rPr lang="es-BO" dirty="0"/>
+              <a:t>Realiza evaluaciones periódicas del desempeño del equipo y brinda retroalimentación constructiva. Reconociendo todos los logros de su equipo de trabajo,</a:t>
+            </a:r>
+          </a:p>
+          <a:p>
+            <a:r>
+              <a:rPr lang="es-BO" dirty="0"/>
+              <a:t>Por ejemplo, la siguiente publicación en su página web:</a:t>
+            </a:r>
+          </a:p>
+          <a:p>
+            <a:endParaRPr lang="es-BO" dirty="0"/>
+          </a:p>
+          <a:p>
+            <a:r>
+              <a:rPr lang="es-BO" i="1" dirty="0"/>
+              <a:t>¡Hoy rendimos homenaje a nuestro equipo de trabajo! Agradecemos a esta gran familia, que con su esfuerzo, dedicación, entusiasmo y compromiso diario nos han acercado a cada boliviano. </a:t>
+            </a:r>
+          </a:p>
+          <a:p>
             <a:endParaRPr lang="es-ES" dirty="0"/>
           </a:p>
         </p:txBody>
       </p:sp>
-      <p:sp>
-        <p:nvSpPr>
-          <p:cNvPr id="3" name="CuadroTexto 2">
-            <a:extLst>
-              <a:ext uri="{FF2B5EF4-FFF2-40B4-BE49-F238E27FC236}">
-                <a16:creationId xmlns:a16="http://schemas.microsoft.com/office/drawing/2014/main" id="{8D2447AD-C916-7250-E795-3A2BA4F7EC9C}"/>
-              </a:ext>
-            </a:extLst>
-          </p:cNvPr>
-          <p:cNvSpPr txBox="1"/>
-          <p:nvPr/>
-        </p:nvSpPr>
-        <p:spPr>
-          <a:xfrm>
-            <a:off x="740898" y="3101491"/>
-            <a:ext cx="6672776" cy="3139321"/>
-          </a:xfrm>
-          <a:prstGeom prst="rect">
-            <a:avLst/>
-          </a:prstGeom>
-          <a:noFill/>
-        </p:spPr>
-        <p:txBody>
-          <a:bodyPr wrap="square" rtlCol="0">
-            <a:spAutoFit/>
-          </a:bodyPr>
-          <a:lstStyle/>
-          <a:p>
-            <a:r>
-              <a:rPr lang="es-BO" dirty="0"/>
-              <a:t>Los sistemas de recompensas mejoran cuatro aspectos de la eficacia organizacional:</a:t>
-            </a:r>
-          </a:p>
-          <a:p>
-            <a:r>
-              <a:rPr lang="es-BO" dirty="0"/>
-              <a:t>•Motivan al personal a unirse a la organización.</a:t>
-            </a:r>
-          </a:p>
-          <a:p>
-            <a:endParaRPr lang="es-BO" dirty="0"/>
-          </a:p>
-          <a:p>
-            <a:r>
-              <a:rPr lang="es-BO" dirty="0"/>
-              <a:t>•Influyen sobre los trabajadores para que acudan a su trabajo.</a:t>
-            </a:r>
-          </a:p>
-          <a:p>
-            <a:endParaRPr lang="es-BO" dirty="0"/>
-          </a:p>
-          <a:p>
-            <a:r>
-              <a:rPr lang="es-BO" dirty="0"/>
-              <a:t>•Los motivan para actuar de manera eficaz.</a:t>
-            </a:r>
-          </a:p>
-          <a:p>
-            <a:endParaRPr lang="es-BO" dirty="0"/>
-          </a:p>
-          <a:p>
-            <a:r>
-              <a:rPr lang="es-BO" dirty="0"/>
-              <a:t>•Refuerzan la estructura de la organización para especificar la posición de sus diferentes</a:t>
-            </a:r>
-          </a:p>
-          <a:p>
-            <a:r>
-              <a:rPr lang="es-BO" dirty="0"/>
-              <a:t>miembros.</a:t>
-            </a:r>
-            <a:endParaRPr lang="es-ES" dirty="0"/>
-          </a:p>
-        </p:txBody>
-      </p:sp>
-      <p:pic>
-        <p:nvPicPr>
-          <p:cNvPr id="6" name="Picture 2" descr="Positive Feedback in Practice Management (Why and How to Focus on This) -  Power Diary Blog">
-            <a:extLst>
-              <a:ext uri="{FF2B5EF4-FFF2-40B4-BE49-F238E27FC236}">
-                <a16:creationId xmlns:a16="http://schemas.microsoft.com/office/drawing/2014/main" id="{28837289-D6C0-F1C1-4BF2-6BB79816A4AB}"/>
-              </a:ext>
-            </a:extLst>
-          </p:cNvPr>
-          <p:cNvPicPr>
-            <a:picLocks noChangeAspect="1" noChangeArrowheads="1"/>
-          </p:cNvPicPr>
-          <p:nvPr/>
-        </p:nvPicPr>
-        <p:blipFill>
-          <a:blip r:embed="rId2">
-            <a:extLst>
-              <a:ext uri="{28A0092B-C50C-407E-A947-70E740481C1C}">
-                <a14:useLocalDpi xmlns:a14="http://schemas.microsoft.com/office/drawing/2010/main" val="0"/>
-              </a:ext>
-            </a:extLst>
-          </a:blip>
-          <a:srcRect/>
-          <a:stretch>
-            <a:fillRect/>
-          </a:stretch>
-        </p:blipFill>
-        <p:spPr bwMode="auto">
-          <a:xfrm>
-            <a:off x="6747802" y="3688112"/>
-            <a:ext cx="4876800" cy="2552700"/>
-          </a:xfrm>
-          <a:prstGeom prst="rect">
-            <a:avLst/>
-          </a:prstGeom>
-          <a:noFill/>
-          <a:extLst>
-            <a:ext uri="{909E8E84-426E-40DD-AFC4-6F175D3DCCD1}">
-              <a14:hiddenFill xmlns:a14="http://schemas.microsoft.com/office/drawing/2010/main">
-                <a:solidFill>
-                  <a:srgbClr val="FFFFFF"/>
-                </a:solidFill>
-              </a14:hiddenFill>
-            </a:ext>
-          </a:extLst>
-        </p:spPr>
-      </p:pic>
     </p:spTree>
     <p:extLst>
       <p:ext uri="{BB962C8B-B14F-4D97-AF65-F5344CB8AC3E}">
-        <p14:creationId xmlns:p14="http://schemas.microsoft.com/office/powerpoint/2010/main" val="1852265742"/>
+        <p14:creationId xmlns:p14="http://schemas.microsoft.com/office/powerpoint/2010/main" val="1594107517"/>
       </p:ext>
     </p:extLst>
   </p:cSld>
@@ -4658,18 +4478,193 @@
         </p:spPr>
         <p:txBody>
           <a:bodyPr>
-            <a:normAutofit/>
+            <a:normAutofit fontScale="90000"/>
           </a:bodyPr>
           <a:lstStyle/>
           <a:p>
-            <a:endParaRPr lang="es-BO" b="1" dirty="0"/>
-          </a:p>
-        </p:txBody>
-      </p:sp>
+            <a:r>
+              <a:rPr lang="es-BO" b="1" dirty="0"/>
+              <a:t>4.	LIDERAZGO: Motivar y recompensar a los empleados</a:t>
+            </a:r>
+          </a:p>
+        </p:txBody>
+      </p:sp>
+      <p:sp>
+        <p:nvSpPr>
+          <p:cNvPr id="3" name="Marcador de contenido 2">
+            <a:extLst>
+              <a:ext uri="{FF2B5EF4-FFF2-40B4-BE49-F238E27FC236}">
+                <a16:creationId xmlns:a16="http://schemas.microsoft.com/office/drawing/2014/main" id="{A03F4793-332F-447C-FEBA-8C99D67BE98B}"/>
+              </a:ext>
+            </a:extLst>
+          </p:cNvPr>
+          <p:cNvSpPr>
+            <a:spLocks noGrp="1"/>
+          </p:cNvSpPr>
+          <p:nvPr>
+            <p:ph idx="1"/>
+          </p:nvPr>
+        </p:nvSpPr>
+        <p:spPr>
+          <a:xfrm>
+            <a:off x="911846" y="2180494"/>
+            <a:ext cx="4773637" cy="1364566"/>
+          </a:xfrm>
+        </p:spPr>
+        <p:txBody>
+          <a:bodyPr/>
+          <a:lstStyle/>
+          <a:p>
+            <a:pPr marL="0" indent="0">
+              <a:buNone/>
+            </a:pPr>
+            <a:r>
+              <a:rPr lang="es-BO" sz="1800" i="1" dirty="0">
+                <a:effectLst/>
+                <a:latin typeface="Calibri" panose="020F0502020204030204" pitchFamily="34" charset="0"/>
+                <a:ea typeface="Calibri" panose="020F0502020204030204" pitchFamily="34" charset="0"/>
+                <a:cs typeface="Arial" panose="020B0604020202020204" pitchFamily="34" charset="0"/>
+              </a:rPr>
+              <a:t>La motivación de empleados se define como el entusiasmo, el nivel de energía, el compromiso y la cantidad de creatividad que un empleado aporta diariamente a la organización.</a:t>
+            </a:r>
+            <a:endParaRPr lang="es-BO" dirty="0"/>
+          </a:p>
+        </p:txBody>
+      </p:sp>
+      <p:sp>
+        <p:nvSpPr>
+          <p:cNvPr id="4" name="CuadroTexto 3">
+            <a:extLst>
+              <a:ext uri="{FF2B5EF4-FFF2-40B4-BE49-F238E27FC236}">
+                <a16:creationId xmlns:a16="http://schemas.microsoft.com/office/drawing/2014/main" id="{5CA396EC-CDD8-A424-C378-96A2CD8F32D3}"/>
+              </a:ext>
+            </a:extLst>
+          </p:cNvPr>
+          <p:cNvSpPr txBox="1"/>
+          <p:nvPr/>
+        </p:nvSpPr>
+        <p:spPr>
+          <a:xfrm>
+            <a:off x="6330462" y="4451814"/>
+            <a:ext cx="4656406" cy="1200329"/>
+          </a:xfrm>
+          <a:prstGeom prst="rect">
+            <a:avLst/>
+          </a:prstGeom>
+          <a:noFill/>
+        </p:spPr>
+        <p:txBody>
+          <a:bodyPr wrap="square" rtlCol="0">
+            <a:spAutoFit/>
+          </a:bodyPr>
+          <a:lstStyle/>
+          <a:p>
+            <a:r>
+              <a:rPr lang="es-BO" i="1" dirty="0"/>
+              <a:t>La motivación juega un papel muy importante en la vida de un ser humano. Ya sea para mejorarnos a nosotros mismos o para mejorar el desempeño de nuestra organización. </a:t>
+            </a:r>
+            <a:endParaRPr lang="es-ES" i="1" dirty="0"/>
+          </a:p>
+        </p:txBody>
+      </p:sp>
+      <p:pic>
+        <p:nvPicPr>
+          <p:cNvPr id="1026" name="Picture 2" descr="Motivación laboral: claves y factores de la productividad empresarial -  NeoMercados.com">
+            <a:extLst>
+              <a:ext uri="{FF2B5EF4-FFF2-40B4-BE49-F238E27FC236}">
+                <a16:creationId xmlns:a16="http://schemas.microsoft.com/office/drawing/2014/main" id="{BE2015BA-1B4E-D336-825E-BDBF90E42258}"/>
+              </a:ext>
+            </a:extLst>
+          </p:cNvPr>
+          <p:cNvPicPr>
+            <a:picLocks noChangeAspect="1" noChangeArrowheads="1"/>
+          </p:cNvPicPr>
+          <p:nvPr/>
+        </p:nvPicPr>
+        <p:blipFill>
+          <a:blip r:embed="rId2">
+            <a:extLst>
+              <a:ext uri="{28A0092B-C50C-407E-A947-70E740481C1C}">
+                <a14:useLocalDpi xmlns:a14="http://schemas.microsoft.com/office/drawing/2010/main" val="0"/>
+              </a:ext>
+            </a:extLst>
+          </a:blip>
+          <a:srcRect/>
+          <a:stretch>
+            <a:fillRect/>
+          </a:stretch>
+        </p:blipFill>
+        <p:spPr bwMode="auto">
+          <a:xfrm>
+            <a:off x="6836377" y="2048612"/>
+            <a:ext cx="3521612" cy="2343991"/>
+          </a:xfrm>
+          <a:prstGeom prst="rect">
+            <a:avLst/>
+          </a:prstGeom>
+          <a:noFill/>
+          <a:extLst>
+            <a:ext uri="{909E8E84-426E-40DD-AFC4-6F175D3DCCD1}">
+              <a14:hiddenFill xmlns:a14="http://schemas.microsoft.com/office/drawing/2010/main">
+                <a:solidFill>
+                  <a:srgbClr val="FFFFFF"/>
+                </a:solidFill>
+              </a14:hiddenFill>
+            </a:ext>
+          </a:extLst>
+        </p:spPr>
+      </p:pic>
+      <p:pic>
+        <p:nvPicPr>
+          <p:cNvPr id="1028" name="Picture 4" descr="Motivación empresarial: ¿cómo mantenerla en tu personal?">
+            <a:extLst>
+              <a:ext uri="{FF2B5EF4-FFF2-40B4-BE49-F238E27FC236}">
+                <a16:creationId xmlns:a16="http://schemas.microsoft.com/office/drawing/2014/main" id="{4C1A32E2-A18C-23EB-CF9B-B16A94B2BCC1}"/>
+              </a:ext>
+            </a:extLst>
+          </p:cNvPr>
+          <p:cNvPicPr>
+            <a:picLocks noChangeAspect="1" noChangeArrowheads="1"/>
+          </p:cNvPicPr>
+          <p:nvPr/>
+        </p:nvPicPr>
+        <p:blipFill>
+          <a:blip r:embed="rId3">
+            <a:extLst>
+              <a:ext uri="{28A0092B-C50C-407E-A947-70E740481C1C}">
+                <a14:useLocalDpi xmlns:a14="http://schemas.microsoft.com/office/drawing/2010/main" val="0"/>
+              </a:ext>
+            </a:extLst>
+          </a:blip>
+          <a:srcRect/>
+          <a:stretch>
+            <a:fillRect/>
+          </a:stretch>
+        </p:blipFill>
+        <p:spPr bwMode="auto">
+          <a:xfrm>
+            <a:off x="1097332" y="3686779"/>
+            <a:ext cx="4258292" cy="2011045"/>
+          </a:xfrm>
+          <a:prstGeom prst="rect">
+            <a:avLst/>
+          </a:prstGeom>
+          <a:noFill/>
+          <a:extLst>
+            <a:ext uri="{909E8E84-426E-40DD-AFC4-6F175D3DCCD1}">
+              <a14:hiddenFill xmlns:a14="http://schemas.microsoft.com/office/drawing/2010/main">
+                <a:solidFill>
+                  <a:srgbClr val="FFFFFF"/>
+                </a:solidFill>
+              </a14:hiddenFill>
+            </a:ext>
+          </a:extLst>
+        </p:spPr>
+      </p:pic>
     </p:spTree>
     <p:extLst>
       <p:ext uri="{BB962C8B-B14F-4D97-AF65-F5344CB8AC3E}">
-        <p14:creationId xmlns:p14="http://schemas.microsoft.com/office/powerpoint/2010/main" val="3958070904"/>
+        <p14:creationId xmlns:p14="http://schemas.microsoft.com/office/powerpoint/2010/main" val="4004118298"/>
       </p:ext>
     </p:extLst>
   </p:cSld>
@@ -4720,11 +4715,14 @@
         </p:spPr>
         <p:txBody>
           <a:bodyPr>
-            <a:normAutofit/>
+            <a:normAutofit fontScale="90000"/>
           </a:bodyPr>
           <a:lstStyle/>
           <a:p>
-            <a:endParaRPr lang="es-BO" b="1" dirty="0"/>
+            <a:r>
+              <a:rPr lang="es-BO" b="1" dirty="0"/>
+              <a:t>4.	LIDERAZGO: ¿Cuál es la importancia de motivar a los empleados?</a:t>
+            </a:r>
           </a:p>
         </p:txBody>
       </p:sp>
@@ -4742,8 +4740,8 @@
         </p:nvSpPr>
         <p:spPr>
           <a:xfrm>
-            <a:off x="6452382" y="2037591"/>
-            <a:ext cx="3282462" cy="1200329"/>
+            <a:off x="740898" y="1829812"/>
+            <a:ext cx="11075963" cy="1754326"/>
           </a:xfrm>
           <a:prstGeom prst="rect">
             <a:avLst/>
@@ -4756,70 +4754,171 @@
           </a:bodyPr>
           <a:lstStyle/>
           <a:p>
-            <a:br>
+            <a:r>
               <a:rPr lang="es-BO" dirty="0"/>
-            </a:br>
-            <a:br>
+              <a:t>La motivación juega un papel muy importante en la vida de un ser humano. Ya sea para mejorarnos a nosotros mismos o para mejorar el desempeño de nuestra organización. Los empleados motivados no necesitan que se les diga cómo hacer las cosas, toman iniciativas, están ansiosos por asumir responsabilidades adicionales, son innovadores y emprendedores.</a:t>
+            </a:r>
+          </a:p>
+          <a:p>
+            <a:endParaRPr lang="es-BO" dirty="0"/>
+          </a:p>
+          <a:p>
+            <a:r>
               <a:rPr lang="es-BO" dirty="0"/>
-            </a:br>
-            <a:endParaRPr lang="es-BO" dirty="0"/>
-          </a:p>
-          <a:p>
+              <a:t>Para motivar y recompensar a los empleados , se pueden seguir las siguientes estrategias : </a:t>
+            </a:r>
             <a:endParaRPr lang="es-ES" dirty="0"/>
           </a:p>
         </p:txBody>
       </p:sp>
-      <p:pic>
-        <p:nvPicPr>
-          <p:cNvPr id="2052" name="Picture 4" descr="Colección De Dibujos De Helado Vector Dibujado Mano Linda. Conos Y Helados  De Diferentes Sabores Hechas En El Estilo De Dibujo. Ilustraciones Svg,  Vectoriales, Clip Art Vectorizado Libre De Derechos. Image 38006136.">
-            <a:extLst>
-              <a:ext uri="{FF2B5EF4-FFF2-40B4-BE49-F238E27FC236}">
-                <a16:creationId xmlns:a16="http://schemas.microsoft.com/office/drawing/2014/main" id="{EB583C3C-09E9-929B-6621-A8032C8577CA}"/>
-              </a:ext>
-            </a:extLst>
-          </p:cNvPr>
-          <p:cNvPicPr>
-            <a:picLocks noChangeAspect="1" noChangeArrowheads="1"/>
-          </p:cNvPicPr>
+      <p:sp>
+        <p:nvSpPr>
+          <p:cNvPr id="3" name="CuadroTexto 2">
+            <a:extLst>
+              <a:ext uri="{FF2B5EF4-FFF2-40B4-BE49-F238E27FC236}">
+                <a16:creationId xmlns:a16="http://schemas.microsoft.com/office/drawing/2014/main" id="{8D2447AD-C916-7250-E795-3A2BA4F7EC9C}"/>
+              </a:ext>
+            </a:extLst>
+          </p:cNvPr>
+          <p:cNvSpPr txBox="1"/>
           <p:nvPr/>
-        </p:nvPicPr>
-        <p:blipFill>
-          <a:blip r:embed="rId2">
-            <a:extLst>
-              <a:ext uri="{28A0092B-C50C-407E-A947-70E740481C1C}">
-                <a14:useLocalDpi xmlns:a14="http://schemas.microsoft.com/office/drawing/2010/main" val="0"/>
-              </a:ext>
-            </a:extLst>
-          </a:blip>
-          <a:srcRect/>
-          <a:stretch>
-            <a:fillRect/>
-          </a:stretch>
-        </p:blipFill>
-        <p:spPr bwMode="auto">
-          <a:xfrm>
-            <a:off x="1780736" y="2037591"/>
-            <a:ext cx="3749040" cy="3749040"/>
+        </p:nvSpPr>
+        <p:spPr>
+          <a:xfrm>
+            <a:off x="698695" y="3655489"/>
+            <a:ext cx="5166030" cy="2585323"/>
           </a:xfrm>
           <a:prstGeom prst="rect">
             <a:avLst/>
           </a:prstGeom>
           <a:noFill/>
-          <a:extLst>
-            <a:ext uri="{909E8E84-426E-40DD-AFC4-6F175D3DCCD1}">
-              <a14:hiddenFill xmlns:a14="http://schemas.microsoft.com/office/drawing/2010/main">
-                <a:solidFill>
-                  <a:srgbClr val="FFFFFF"/>
-                </a:solidFill>
-              </a14:hiddenFill>
-            </a:ext>
-          </a:extLst>
-        </p:spPr>
-      </p:pic>
+        </p:spPr>
+        <p:txBody>
+          <a:bodyPr wrap="none" rtlCol="0">
+            <a:spAutoFit/>
+          </a:bodyPr>
+          <a:lstStyle/>
+          <a:p>
+            <a:r>
+              <a:rPr lang="es-BO" dirty="0"/>
+              <a:t>•Premiar y reconocer a los empleados.</a:t>
+            </a:r>
+          </a:p>
+          <a:p>
+            <a:endParaRPr lang="es-BO" dirty="0"/>
+          </a:p>
+          <a:p>
+            <a:r>
+              <a:rPr lang="es-BO" dirty="0"/>
+              <a:t>•Mantener una comunicación constante y fluida.</a:t>
+            </a:r>
+          </a:p>
+          <a:p>
+            <a:endParaRPr lang="es-BO" dirty="0"/>
+          </a:p>
+          <a:p>
+            <a:r>
+              <a:rPr lang="es-BO" dirty="0"/>
+              <a:t>•Ofrecer formación y aprendizaje constante.</a:t>
+            </a:r>
+          </a:p>
+          <a:p>
+            <a:endParaRPr lang="es-BO" dirty="0"/>
+          </a:p>
+          <a:p>
+            <a:r>
+              <a:rPr lang="es-BO" dirty="0"/>
+              <a:t>•Proporcionar flexibilidad laboral.</a:t>
+            </a:r>
+          </a:p>
+          <a:p>
+            <a:endParaRPr lang="es-BO" dirty="0"/>
+          </a:p>
+          <a:p>
+            <a:r>
+              <a:rPr lang="es-BO" dirty="0"/>
+              <a:t>•Dar a los empleados objetivos que puedan controlar</a:t>
+            </a:r>
+            <a:endParaRPr lang="es-ES" dirty="0"/>
+          </a:p>
+        </p:txBody>
+      </p:sp>
+      <p:sp>
+        <p:nvSpPr>
+          <p:cNvPr id="5" name="CuadroTexto 4">
+            <a:extLst>
+              <a:ext uri="{FF2B5EF4-FFF2-40B4-BE49-F238E27FC236}">
+                <a16:creationId xmlns:a16="http://schemas.microsoft.com/office/drawing/2014/main" id="{9E4265F5-35D0-150D-3628-9268DFC9F634}"/>
+              </a:ext>
+            </a:extLst>
+          </p:cNvPr>
+          <p:cNvSpPr txBox="1"/>
+          <p:nvPr/>
+        </p:nvSpPr>
+        <p:spPr>
+          <a:xfrm>
+            <a:off x="5953820" y="3655488"/>
+            <a:ext cx="5863041" cy="3139321"/>
+          </a:xfrm>
+          <a:prstGeom prst="rect">
+            <a:avLst/>
+          </a:prstGeom>
+          <a:noFill/>
+        </p:spPr>
+        <p:txBody>
+          <a:bodyPr wrap="square" rtlCol="0">
+            <a:spAutoFit/>
+          </a:bodyPr>
+          <a:lstStyle/>
+          <a:p>
+            <a:r>
+              <a:rPr lang="es-BO" dirty="0"/>
+              <a:t>•Reforzar la comunicación de los directivos.</a:t>
+            </a:r>
+          </a:p>
+          <a:p>
+            <a:endParaRPr lang="es-BO" dirty="0"/>
+          </a:p>
+          <a:p>
+            <a:r>
+              <a:rPr lang="es-BO" dirty="0"/>
+              <a:t>•Diseñar un lugar de trabajo acogedor.</a:t>
+            </a:r>
+          </a:p>
+          <a:p>
+            <a:endParaRPr lang="es-BO" dirty="0"/>
+          </a:p>
+          <a:p>
+            <a:r>
+              <a:rPr lang="es-BO" dirty="0"/>
+              <a:t>•Reconocer y recompensar a los empleados.</a:t>
+            </a:r>
+          </a:p>
+          <a:p>
+            <a:endParaRPr lang="es-BO" dirty="0"/>
+          </a:p>
+          <a:p>
+            <a:r>
+              <a:rPr lang="es-BO" dirty="0"/>
+              <a:t>•Promover el crecimiento personal e implicar a los trabajadores en la toma de decisiones.</a:t>
+            </a:r>
+          </a:p>
+          <a:p>
+            <a:endParaRPr lang="es-BO" dirty="0"/>
+          </a:p>
+          <a:p>
+            <a:r>
+              <a:rPr lang="es-BO" dirty="0"/>
+              <a:t>•Ofrecer recompensas adicionales para motivar a los empleados a ir más allá de sus límites.</a:t>
+            </a:r>
+            <a:endParaRPr lang="es-ES" dirty="0"/>
+          </a:p>
+        </p:txBody>
+      </p:sp>
     </p:spTree>
     <p:extLst>
       <p:ext uri="{BB962C8B-B14F-4D97-AF65-F5344CB8AC3E}">
-        <p14:creationId xmlns:p14="http://schemas.microsoft.com/office/powerpoint/2010/main" val="1216260591"/>
+        <p14:creationId xmlns:p14="http://schemas.microsoft.com/office/powerpoint/2010/main" val="1987734335"/>
       </p:ext>
     </p:extLst>
   </p:cSld>
@@ -4874,6 +4973,14 @@
           </a:bodyPr>
           <a:lstStyle/>
           <a:p>
+            <a:r>
+              <a:rPr lang="es-BO" b="1" dirty="0"/>
+              <a:t>4.	LIDERAZGO: </a:t>
+            </a:r>
+            <a:r>
+              <a:rPr lang="es-ES" b="1" dirty="0"/>
+              <a:t>Recompensar</a:t>
+            </a:r>
             <a:endParaRPr lang="es-BO" b="1" dirty="0"/>
           </a:p>
         </p:txBody>
@@ -4892,8 +4999,8 @@
         </p:nvSpPr>
         <p:spPr>
           <a:xfrm>
-            <a:off x="1092592" y="2121997"/>
-            <a:ext cx="5913120" cy="1200329"/>
+            <a:off x="740898" y="1829812"/>
+            <a:ext cx="11075963" cy="1200329"/>
           </a:xfrm>
           <a:prstGeom prst="rect">
             <a:avLst/>
@@ -4906,25 +5013,95 @@
           </a:bodyPr>
           <a:lstStyle/>
           <a:p>
-            <a:br>
+            <a:r>
               <a:rPr lang="es-BO" dirty="0"/>
-            </a:br>
-            <a:br>
+              <a:t>En el ámbito empresarial de hoy en día, las recompensas y los reconocimientos han llegado a ser más importante que nunca ya que los gerentes disponen de menos manera de influir en sus empleados o de moldear su comportamiento. En tiempo de estrechez económica, las recompensas y el reconocimiento proporcionan una manera eficaz de estimular a los empleados para que logren más altos niveles de desempeño.</a:t>
+            </a:r>
+            <a:endParaRPr lang="es-ES" dirty="0"/>
+          </a:p>
+        </p:txBody>
+      </p:sp>
+      <p:sp>
+        <p:nvSpPr>
+          <p:cNvPr id="3" name="CuadroTexto 2">
+            <a:extLst>
+              <a:ext uri="{FF2B5EF4-FFF2-40B4-BE49-F238E27FC236}">
+                <a16:creationId xmlns:a16="http://schemas.microsoft.com/office/drawing/2014/main" id="{8D2447AD-C916-7250-E795-3A2BA4F7EC9C}"/>
+              </a:ext>
+            </a:extLst>
+          </p:cNvPr>
+          <p:cNvSpPr txBox="1"/>
+          <p:nvPr/>
+        </p:nvSpPr>
+        <p:spPr>
+          <a:xfrm>
+            <a:off x="740898" y="3101491"/>
+            <a:ext cx="6672776" cy="3139321"/>
+          </a:xfrm>
+          <a:prstGeom prst="rect">
+            <a:avLst/>
+          </a:prstGeom>
+          <a:noFill/>
+        </p:spPr>
+        <p:txBody>
+          <a:bodyPr wrap="square" rtlCol="0">
+            <a:spAutoFit/>
+          </a:bodyPr>
+          <a:lstStyle/>
+          <a:p>
+            <a:r>
               <a:rPr lang="es-BO" dirty="0"/>
-            </a:br>
+              <a:t>Los sistemas de recompensas mejoran cuatro aspectos de la eficacia organizacional:</a:t>
+            </a:r>
+          </a:p>
+          <a:p>
+            <a:r>
+              <a:rPr lang="es-BO" dirty="0"/>
+              <a:t>•Motivan al personal a unirse a la organización.</a:t>
+            </a:r>
+          </a:p>
+          <a:p>
             <a:endParaRPr lang="es-BO" dirty="0"/>
           </a:p>
           <a:p>
+            <a:r>
+              <a:rPr lang="es-BO" dirty="0"/>
+              <a:t>•Influyen sobre los trabajadores para que acudan a su trabajo.</a:t>
+            </a:r>
+          </a:p>
+          <a:p>
+            <a:endParaRPr lang="es-BO" dirty="0"/>
+          </a:p>
+          <a:p>
+            <a:r>
+              <a:rPr lang="es-BO" dirty="0"/>
+              <a:t>•Los motivan para actuar de manera eficaz.</a:t>
+            </a:r>
+          </a:p>
+          <a:p>
+            <a:endParaRPr lang="es-BO" dirty="0"/>
+          </a:p>
+          <a:p>
+            <a:r>
+              <a:rPr lang="es-BO" dirty="0"/>
+              <a:t>•Refuerzan la estructura de la organización para especificar la posición de sus diferentes</a:t>
+            </a:r>
+          </a:p>
+          <a:p>
+            <a:r>
+              <a:rPr lang="es-BO" dirty="0"/>
+              <a:t>miembros.</a:t>
+            </a:r>
             <a:endParaRPr lang="es-ES" dirty="0"/>
           </a:p>
         </p:txBody>
       </p:sp>
       <p:pic>
         <p:nvPicPr>
-          <p:cNvPr id="3074" name="Picture 2" descr="Creating A Positive Workplace Culture - A Little Kindness Goes A Long Way |  HuffPost Contributor">
-            <a:extLst>
-              <a:ext uri="{FF2B5EF4-FFF2-40B4-BE49-F238E27FC236}">
-                <a16:creationId xmlns:a16="http://schemas.microsoft.com/office/drawing/2014/main" id="{7B2013D5-DA9D-56AF-0DD4-4F5F846CFD41}"/>
+          <p:cNvPr id="6" name="Picture 2" descr="Positive Feedback in Practice Management (Why and How to Focus on This) -  Power Diary Blog">
+            <a:extLst>
+              <a:ext uri="{FF2B5EF4-FFF2-40B4-BE49-F238E27FC236}">
+                <a16:creationId xmlns:a16="http://schemas.microsoft.com/office/drawing/2014/main" id="{28837289-D6C0-F1C1-4BF2-6BB79816A4AB}"/>
               </a:ext>
             </a:extLst>
           </p:cNvPr>
@@ -4948,8 +5125,8 @@
         </p:blipFill>
         <p:spPr bwMode="auto">
           <a:xfrm>
-            <a:off x="7162874" y="2121998"/>
-            <a:ext cx="4354655" cy="2977542"/>
+            <a:off x="6747802" y="3688112"/>
+            <a:ext cx="4876800" cy="2552700"/>
           </a:xfrm>
           <a:prstGeom prst="rect">
             <a:avLst/>
@@ -4969,7 +5146,7 @@
     </p:spTree>
     <p:extLst>
       <p:ext uri="{BB962C8B-B14F-4D97-AF65-F5344CB8AC3E}">
-        <p14:creationId xmlns:p14="http://schemas.microsoft.com/office/powerpoint/2010/main" val="1504539169"/>
+        <p14:creationId xmlns:p14="http://schemas.microsoft.com/office/powerpoint/2010/main" val="1852265742"/>
       </p:ext>
     </p:extLst>
   </p:cSld>
@@ -5019,50 +5196,141 @@
           </a:xfrm>
         </p:spPr>
         <p:txBody>
-          <a:bodyPr/>
+          <a:bodyPr>
+            <a:normAutofit fontScale="90000"/>
+          </a:bodyPr>
           <a:lstStyle/>
           <a:p>
             <a:r>
               <a:rPr lang="es-BO" b="1" dirty="0"/>
-              <a:t>5.	CONTROL</a:t>
-            </a:r>
-          </a:p>
-        </p:txBody>
-      </p:sp>
-      <p:sp>
-        <p:nvSpPr>
-          <p:cNvPr id="3" name="Marcador de contenido 2">
-            <a:extLst>
-              <a:ext uri="{FF2B5EF4-FFF2-40B4-BE49-F238E27FC236}">
-                <a16:creationId xmlns:a16="http://schemas.microsoft.com/office/drawing/2014/main" id="{A03F4793-332F-447C-FEBA-8C99D67BE98B}"/>
-              </a:ext>
-            </a:extLst>
-          </p:cNvPr>
-          <p:cNvSpPr>
-            <a:spLocks noGrp="1"/>
-          </p:cNvSpPr>
-          <p:nvPr>
-            <p:ph idx="1"/>
-          </p:nvPr>
-        </p:nvSpPr>
-        <p:spPr>
-          <a:xfrm>
-            <a:off x="994117" y="1941342"/>
-            <a:ext cx="10203766" cy="3798685"/>
-          </a:xfrm>
-        </p:spPr>
-        <p:txBody>
-          <a:bodyPr/>
-          <a:lstStyle/>
-          <a:p>
-            <a:endParaRPr lang="es-BO" dirty="0"/>
-          </a:p>
-        </p:txBody>
-      </p:sp>
+              <a:t>4. LIDERAZGO: ADMINISTRAR LA COMUNICACIÓN Y LA INFORMACION:</a:t>
+            </a:r>
+          </a:p>
+        </p:txBody>
+      </p:sp>
+      <p:sp>
+        <p:nvSpPr>
+          <p:cNvPr id="3" name="CuadroTexto 2">
+            <a:extLst>
+              <a:ext uri="{FF2B5EF4-FFF2-40B4-BE49-F238E27FC236}">
+                <a16:creationId xmlns:a16="http://schemas.microsoft.com/office/drawing/2014/main" id="{7535EE82-8274-8646-FB67-B2984C52CFA3}"/>
+              </a:ext>
+            </a:extLst>
+          </p:cNvPr>
+          <p:cNvSpPr txBox="1"/>
+          <p:nvPr/>
+        </p:nvSpPr>
+        <p:spPr>
+          <a:xfrm>
+            <a:off x="994117" y="2006410"/>
+            <a:ext cx="10203766" cy="1200329"/>
+          </a:xfrm>
+          <a:prstGeom prst="rect">
+            <a:avLst/>
+          </a:prstGeom>
+          <a:noFill/>
+        </p:spPr>
+        <p:txBody>
+          <a:bodyPr wrap="square" rtlCol="0">
+            <a:spAutoFit/>
+          </a:bodyPr>
+          <a:lstStyle/>
+          <a:p>
+            <a:r>
+              <a:rPr lang="es-BO" sz="2400" i="1" dirty="0"/>
+              <a:t>La comunicación es eficaz es imprescindible para los gerentes por una razón especifica: todo lo que hace un gerente involucra a la comunicación. ¡no solo algunas cosas, sino todo. ¡Lo que hace! </a:t>
+            </a:r>
+            <a:endParaRPr lang="es-ES" sz="2400" i="1" dirty="0"/>
+          </a:p>
+        </p:txBody>
+      </p:sp>
+      <p:sp>
+        <p:nvSpPr>
+          <p:cNvPr id="4" name="CuadroTexto 3">
+            <a:extLst>
+              <a:ext uri="{FF2B5EF4-FFF2-40B4-BE49-F238E27FC236}">
+                <a16:creationId xmlns:a16="http://schemas.microsoft.com/office/drawing/2014/main" id="{44F551DA-0F90-3AF3-29D3-6CA0E16818C1}"/>
+              </a:ext>
+            </a:extLst>
+          </p:cNvPr>
+          <p:cNvSpPr txBox="1"/>
+          <p:nvPr/>
+        </p:nvSpPr>
+        <p:spPr>
+          <a:xfrm>
+            <a:off x="994117" y="3362750"/>
+            <a:ext cx="3461982" cy="2677656"/>
+          </a:xfrm>
+          <a:prstGeom prst="rect">
+            <a:avLst/>
+          </a:prstGeom>
+          <a:noFill/>
+        </p:spPr>
+        <p:txBody>
+          <a:bodyPr wrap="square" rtlCol="0">
+            <a:spAutoFit/>
+          </a:bodyPr>
+          <a:lstStyle/>
+          <a:p>
+            <a:r>
+              <a:rPr lang="es-BO" sz="2400" i="1" dirty="0"/>
+              <a:t>Un gerente no puede formular una estrategia o tomar una decisión, el siguiente paso es la comunicación. De lo contrario nadie sabrá que se tomó una decisión</a:t>
+            </a:r>
+            <a:endParaRPr lang="es-ES" sz="2400" i="1" dirty="0"/>
+          </a:p>
+        </p:txBody>
+      </p:sp>
+      <p:pic>
+        <p:nvPicPr>
+          <p:cNvPr id="4098" name="Picture 2" descr="Trabajo en Equipo y Comunicación Interna, dos partes de un todo">
+            <a:extLst>
+              <a:ext uri="{FF2B5EF4-FFF2-40B4-BE49-F238E27FC236}">
+                <a16:creationId xmlns:a16="http://schemas.microsoft.com/office/drawing/2014/main" id="{A5B240EB-71E8-91CA-1E42-DC5C4019BF6E}"/>
+              </a:ext>
+            </a:extLst>
+          </p:cNvPr>
+          <p:cNvPicPr>
+            <a:picLocks noChangeAspect="1" noChangeArrowheads="1"/>
+          </p:cNvPicPr>
+          <p:nvPr/>
+        </p:nvPicPr>
+        <p:blipFill>
+          <a:blip r:embed="rId2">
+            <a:extLst>
+              <a:ext uri="{28A0092B-C50C-407E-A947-70E740481C1C}">
+                <a14:useLocalDpi xmlns:a14="http://schemas.microsoft.com/office/drawing/2010/main" val="0"/>
+              </a:ext>
+            </a:extLst>
+          </a:blip>
+          <a:srcRect/>
+          <a:stretch>
+            <a:fillRect/>
+          </a:stretch>
+        </p:blipFill>
+        <p:spPr bwMode="auto">
+          <a:xfrm>
+            <a:off x="4862887" y="3206739"/>
+            <a:ext cx="5746031" cy="3229415"/>
+          </a:xfrm>
+          <a:prstGeom prst="rect">
+            <a:avLst/>
+          </a:prstGeom>
+          <a:noFill/>
+          <a:extLst>
+            <a:ext uri="{909E8E84-426E-40DD-AFC4-6F175D3DCCD1}">
+              <a14:hiddenFill xmlns:a14="http://schemas.microsoft.com/office/drawing/2010/main">
+                <a:solidFill>
+                  <a:srgbClr val="FFFFFF"/>
+                </a:solidFill>
+              </a14:hiddenFill>
+            </a:ext>
+          </a:extLst>
+        </p:spPr>
+      </p:pic>
     </p:spTree>
     <p:extLst>
       <p:ext uri="{BB962C8B-B14F-4D97-AF65-F5344CB8AC3E}">
-        <p14:creationId xmlns:p14="http://schemas.microsoft.com/office/powerpoint/2010/main" val="2018762944"/>
+        <p14:creationId xmlns:p14="http://schemas.microsoft.com/office/powerpoint/2010/main" val="3958070904"/>
       </p:ext>
     </p:extLst>
   </p:cSld>
@@ -5351,6 +5619,893 @@
 </file>
 
 <file path=ppt/slides/slide20.xml><?xml version="1.0" encoding="utf-8"?>
+<p:sld xmlns:a="http://schemas.openxmlformats.org/drawingml/2006/main" xmlns:r="http://schemas.openxmlformats.org/officeDocument/2006/relationships" xmlns:p="http://schemas.openxmlformats.org/presentationml/2006/main">
+  <p:cSld>
+    <p:spTree>
+      <p:nvGrpSpPr>
+        <p:cNvPr id="1" name=""/>
+        <p:cNvGrpSpPr/>
+        <p:nvPr/>
+      </p:nvGrpSpPr>
+      <p:grpSpPr>
+        <a:xfrm>
+          <a:off x="0" y="0"/>
+          <a:ext cx="0" cy="0"/>
+          <a:chOff x="0" y="0"/>
+          <a:chExt cx="0" cy="0"/>
+        </a:xfrm>
+      </p:grpSpPr>
+      <p:sp>
+        <p:nvSpPr>
+          <p:cNvPr id="2" name="Título 1">
+            <a:extLst>
+              <a:ext uri="{FF2B5EF4-FFF2-40B4-BE49-F238E27FC236}">
+                <a16:creationId xmlns:a16="http://schemas.microsoft.com/office/drawing/2014/main" id="{E28CA087-FA30-60BE-45DB-5FAAAEE20665}"/>
+              </a:ext>
+            </a:extLst>
+          </p:cNvPr>
+          <p:cNvSpPr>
+            <a:spLocks noGrp="1"/>
+          </p:cNvSpPr>
+          <p:nvPr>
+            <p:ph type="title"/>
+          </p:nvPr>
+        </p:nvSpPr>
+        <p:spPr>
+          <a:xfrm>
+            <a:off x="994117" y="964692"/>
+            <a:ext cx="10203766" cy="793770"/>
+          </a:xfrm>
+        </p:spPr>
+        <p:txBody>
+          <a:bodyPr>
+            <a:normAutofit fontScale="90000"/>
+          </a:bodyPr>
+          <a:lstStyle/>
+          <a:p>
+            <a:r>
+              <a:rPr lang="es-BO" b="1" dirty="0"/>
+              <a:t>4. LIDERAZGO: PROCESO DE LA COMUNICACIÓN:</a:t>
+            </a:r>
+          </a:p>
+        </p:txBody>
+      </p:sp>
+      <p:pic>
+        <p:nvPicPr>
+          <p:cNvPr id="33" name="Imagen 32">
+            <a:extLst>
+              <a:ext uri="{FF2B5EF4-FFF2-40B4-BE49-F238E27FC236}">
+                <a16:creationId xmlns:a16="http://schemas.microsoft.com/office/drawing/2014/main" id="{533FBE36-B833-41ED-C21E-E83B031AAC25}"/>
+              </a:ext>
+            </a:extLst>
+          </p:cNvPr>
+          <p:cNvPicPr>
+            <a:picLocks noChangeAspect="1"/>
+          </p:cNvPicPr>
+          <p:nvPr/>
+        </p:nvPicPr>
+        <p:blipFill>
+          <a:blip r:embed="rId2"/>
+          <a:stretch>
+            <a:fillRect/>
+          </a:stretch>
+        </p:blipFill>
+        <p:spPr>
+          <a:xfrm>
+            <a:off x="2349607" y="1965589"/>
+            <a:ext cx="7933876" cy="4705826"/>
+          </a:xfrm>
+          <a:prstGeom prst="rect">
+            <a:avLst/>
+          </a:prstGeom>
+        </p:spPr>
+      </p:pic>
+    </p:spTree>
+    <p:extLst>
+      <p:ext uri="{BB962C8B-B14F-4D97-AF65-F5344CB8AC3E}">
+        <p14:creationId xmlns:p14="http://schemas.microsoft.com/office/powerpoint/2010/main" val="2532617875"/>
+      </p:ext>
+    </p:extLst>
+  </p:cSld>
+  <p:clrMapOvr>
+    <a:masterClrMapping/>
+  </p:clrMapOvr>
+</p:sld>
+</file>
+
+<file path=ppt/slides/slide21.xml><?xml version="1.0" encoding="utf-8"?>
+<p:sld xmlns:a="http://schemas.openxmlformats.org/drawingml/2006/main" xmlns:r="http://schemas.openxmlformats.org/officeDocument/2006/relationships" xmlns:p="http://schemas.openxmlformats.org/presentationml/2006/main">
+  <p:cSld>
+    <p:spTree>
+      <p:nvGrpSpPr>
+        <p:cNvPr id="1" name=""/>
+        <p:cNvGrpSpPr/>
+        <p:nvPr/>
+      </p:nvGrpSpPr>
+      <p:grpSpPr>
+        <a:xfrm>
+          <a:off x="0" y="0"/>
+          <a:ext cx="0" cy="0"/>
+          <a:chOff x="0" y="0"/>
+          <a:chExt cx="0" cy="0"/>
+        </a:xfrm>
+      </p:grpSpPr>
+      <p:sp>
+        <p:nvSpPr>
+          <p:cNvPr id="2" name="Título 1">
+            <a:extLst>
+              <a:ext uri="{FF2B5EF4-FFF2-40B4-BE49-F238E27FC236}">
+                <a16:creationId xmlns:a16="http://schemas.microsoft.com/office/drawing/2014/main" id="{E28CA087-FA30-60BE-45DB-5FAAAEE20665}"/>
+              </a:ext>
+            </a:extLst>
+          </p:cNvPr>
+          <p:cNvSpPr>
+            <a:spLocks noGrp="1"/>
+          </p:cNvSpPr>
+          <p:nvPr>
+            <p:ph type="title"/>
+          </p:nvPr>
+        </p:nvSpPr>
+        <p:spPr>
+          <a:xfrm>
+            <a:off x="994117" y="964692"/>
+            <a:ext cx="10203766" cy="793770"/>
+          </a:xfrm>
+        </p:spPr>
+        <p:txBody>
+          <a:bodyPr>
+            <a:normAutofit fontScale="90000"/>
+          </a:bodyPr>
+          <a:lstStyle/>
+          <a:p>
+            <a:r>
+              <a:rPr lang="es-BO" b="1" dirty="0"/>
+              <a:t>4. LIDERAZGO: ¿COMO PUEDEN LOS GERENTES SUPERAR LAS BARRERAS DE COMUNICACIÓN?</a:t>
+            </a:r>
+          </a:p>
+        </p:txBody>
+      </p:sp>
+      <p:sp>
+        <p:nvSpPr>
+          <p:cNvPr id="3" name="CuadroTexto 2">
+            <a:extLst>
+              <a:ext uri="{FF2B5EF4-FFF2-40B4-BE49-F238E27FC236}">
+                <a16:creationId xmlns:a16="http://schemas.microsoft.com/office/drawing/2014/main" id="{F019EB06-A5DA-C7B0-499F-B69E0C98C257}"/>
+              </a:ext>
+            </a:extLst>
+          </p:cNvPr>
+          <p:cNvSpPr txBox="1"/>
+          <p:nvPr/>
+        </p:nvSpPr>
+        <p:spPr>
+          <a:xfrm>
+            <a:off x="1702191" y="2419643"/>
+            <a:ext cx="184731" cy="369332"/>
+          </a:xfrm>
+          <a:prstGeom prst="rect">
+            <a:avLst/>
+          </a:prstGeom>
+          <a:noFill/>
+        </p:spPr>
+        <p:txBody>
+          <a:bodyPr wrap="none" rtlCol="0">
+            <a:spAutoFit/>
+          </a:bodyPr>
+          <a:lstStyle/>
+          <a:p>
+            <a:endParaRPr lang="es-ES" dirty="0"/>
+          </a:p>
+        </p:txBody>
+      </p:sp>
+      <p:sp>
+        <p:nvSpPr>
+          <p:cNvPr id="4" name="CuadroTexto 3">
+            <a:extLst>
+              <a:ext uri="{FF2B5EF4-FFF2-40B4-BE49-F238E27FC236}">
+                <a16:creationId xmlns:a16="http://schemas.microsoft.com/office/drawing/2014/main" id="{2A37C82D-422B-0696-6A9F-407D25370731}"/>
+              </a:ext>
+            </a:extLst>
+          </p:cNvPr>
+          <p:cNvSpPr txBox="1"/>
+          <p:nvPr/>
+        </p:nvSpPr>
+        <p:spPr>
+          <a:xfrm>
+            <a:off x="422031" y="2194558"/>
+            <a:ext cx="11408898" cy="4370427"/>
+          </a:xfrm>
+          <a:prstGeom prst="rect">
+            <a:avLst/>
+          </a:prstGeom>
+          <a:noFill/>
+        </p:spPr>
+        <p:txBody>
+          <a:bodyPr wrap="square" rtlCol="0">
+            <a:spAutoFit/>
+          </a:bodyPr>
+          <a:lstStyle/>
+          <a:p>
+            <a:r>
+              <a:rPr lang="es-BO" sz="2000" b="1" dirty="0"/>
+              <a:t>1. USAR LA RETROALIMENTACION: </a:t>
+            </a:r>
+            <a:r>
+              <a:rPr lang="es-BO" sz="2000" dirty="0"/>
+              <a:t>Verificar la precisión de lo que se esta comunicando o de lo que se está hablando.</a:t>
+            </a:r>
+          </a:p>
+          <a:p>
+            <a:endParaRPr lang="es-BO" sz="2000" dirty="0"/>
+          </a:p>
+          <a:p>
+            <a:r>
+              <a:rPr lang="es-BO" sz="2000" b="1" dirty="0"/>
+              <a:t>2. SIMPLIFICAR EL MENSAJE: </a:t>
+            </a:r>
+            <a:r>
+              <a:rPr lang="es-BO" sz="2000" dirty="0"/>
+              <a:t>Utilizar palabras que la audiencia a la que van dirigidas comprenda.</a:t>
+            </a:r>
+          </a:p>
+          <a:p>
+            <a:endParaRPr lang="es-BO" sz="2000" dirty="0"/>
+          </a:p>
+          <a:p>
+            <a:r>
+              <a:rPr lang="es-BO" sz="2000" b="1" dirty="0"/>
+              <a:t>3. ESCUCHAR ACTIVAMENTE: </a:t>
+            </a:r>
+            <a:r>
+              <a:rPr lang="es-BO" sz="2000" dirty="0"/>
+              <a:t>Escuchar el significado completo del mensaje o pensar en lo que se va decir como respuesta.</a:t>
+            </a:r>
+          </a:p>
+          <a:p>
+            <a:endParaRPr lang="es-BO" sz="2000" dirty="0"/>
+          </a:p>
+          <a:p>
+            <a:r>
+              <a:rPr lang="es-BO" sz="2000" b="1" dirty="0"/>
+              <a:t>4. CONTROLAR LAS EMOCIONES: </a:t>
+            </a:r>
+            <a:r>
+              <a:rPr lang="es-BO" sz="2000" dirty="0"/>
+              <a:t>Reconocer cuando nuestras emociones estén desbocadas, si lo están, no debemos comunicarnos sino hasta habernos tranquilizado.</a:t>
+            </a:r>
+          </a:p>
+          <a:p>
+            <a:endParaRPr lang="es-BO" sz="2000" dirty="0"/>
+          </a:p>
+          <a:p>
+            <a:r>
+              <a:rPr lang="es-BO" sz="2000" b="1" dirty="0"/>
+              <a:t>5. OBSERVAR PISTAS NO VERBALES: </a:t>
+            </a:r>
+            <a:r>
+              <a:rPr lang="es-BO" sz="2000" dirty="0"/>
+              <a:t>Seamos conscientes de que nuestras acciones hablan con mas esfuerzos que las palabras.</a:t>
+            </a:r>
+          </a:p>
+          <a:p>
+            <a:endParaRPr lang="es-ES" dirty="0"/>
+          </a:p>
+        </p:txBody>
+      </p:sp>
+    </p:spTree>
+    <p:extLst>
+      <p:ext uri="{BB962C8B-B14F-4D97-AF65-F5344CB8AC3E}">
+        <p14:creationId xmlns:p14="http://schemas.microsoft.com/office/powerpoint/2010/main" val="1949543472"/>
+      </p:ext>
+    </p:extLst>
+  </p:cSld>
+  <p:clrMapOvr>
+    <a:masterClrMapping/>
+  </p:clrMapOvr>
+</p:sld>
+</file>
+
+<file path=ppt/slides/slide22.xml><?xml version="1.0" encoding="utf-8"?>
+<p:sld xmlns:a="http://schemas.openxmlformats.org/drawingml/2006/main" xmlns:r="http://schemas.openxmlformats.org/officeDocument/2006/relationships" xmlns:p="http://schemas.openxmlformats.org/presentationml/2006/main">
+  <p:cSld>
+    <p:spTree>
+      <p:nvGrpSpPr>
+        <p:cNvPr id="1" name=""/>
+        <p:cNvGrpSpPr/>
+        <p:nvPr/>
+      </p:nvGrpSpPr>
+      <p:grpSpPr>
+        <a:xfrm>
+          <a:off x="0" y="0"/>
+          <a:ext cx="0" cy="0"/>
+          <a:chOff x="0" y="0"/>
+          <a:chExt cx="0" cy="0"/>
+        </a:xfrm>
+      </p:grpSpPr>
+      <p:sp>
+        <p:nvSpPr>
+          <p:cNvPr id="2" name="Título 1">
+            <a:extLst>
+              <a:ext uri="{FF2B5EF4-FFF2-40B4-BE49-F238E27FC236}">
+                <a16:creationId xmlns:a16="http://schemas.microsoft.com/office/drawing/2014/main" id="{E28CA087-FA30-60BE-45DB-5FAAAEE20665}"/>
+              </a:ext>
+            </a:extLst>
+          </p:cNvPr>
+          <p:cNvSpPr>
+            <a:spLocks noGrp="1"/>
+          </p:cNvSpPr>
+          <p:nvPr>
+            <p:ph type="title"/>
+          </p:nvPr>
+        </p:nvSpPr>
+        <p:spPr>
+          <a:xfrm>
+            <a:off x="994117" y="964692"/>
+            <a:ext cx="10203766" cy="793770"/>
+          </a:xfrm>
+        </p:spPr>
+        <p:txBody>
+          <a:bodyPr>
+            <a:normAutofit/>
+          </a:bodyPr>
+          <a:lstStyle/>
+          <a:p>
+            <a:r>
+              <a:rPr lang="es-BO" b="1" dirty="0"/>
+              <a:t>4. LIDERAZGO: COMUNICACIÓN ETICA:</a:t>
+            </a:r>
+          </a:p>
+        </p:txBody>
+      </p:sp>
+      <p:sp>
+        <p:nvSpPr>
+          <p:cNvPr id="3" name="CuadroTexto 2">
+            <a:extLst>
+              <a:ext uri="{FF2B5EF4-FFF2-40B4-BE49-F238E27FC236}">
+                <a16:creationId xmlns:a16="http://schemas.microsoft.com/office/drawing/2014/main" id="{F019EB06-A5DA-C7B0-499F-B69E0C98C257}"/>
+              </a:ext>
+            </a:extLst>
+          </p:cNvPr>
+          <p:cNvSpPr txBox="1"/>
+          <p:nvPr/>
+        </p:nvSpPr>
+        <p:spPr>
+          <a:xfrm>
+            <a:off x="1702191" y="2419643"/>
+            <a:ext cx="184731" cy="369332"/>
+          </a:xfrm>
+          <a:prstGeom prst="rect">
+            <a:avLst/>
+          </a:prstGeom>
+          <a:noFill/>
+        </p:spPr>
+        <p:txBody>
+          <a:bodyPr wrap="none" rtlCol="0">
+            <a:spAutoFit/>
+          </a:bodyPr>
+          <a:lstStyle/>
+          <a:p>
+            <a:endParaRPr lang="es-ES" dirty="0"/>
+          </a:p>
+        </p:txBody>
+      </p:sp>
+      <p:sp>
+        <p:nvSpPr>
+          <p:cNvPr id="4" name="CuadroTexto 3">
+            <a:extLst>
+              <a:ext uri="{FF2B5EF4-FFF2-40B4-BE49-F238E27FC236}">
+                <a16:creationId xmlns:a16="http://schemas.microsoft.com/office/drawing/2014/main" id="{2A37C82D-422B-0696-6A9F-407D25370731}"/>
+              </a:ext>
+            </a:extLst>
+          </p:cNvPr>
+          <p:cNvSpPr txBox="1"/>
+          <p:nvPr/>
+        </p:nvSpPr>
+        <p:spPr>
+          <a:xfrm>
+            <a:off x="881575" y="2004144"/>
+            <a:ext cx="10696135" cy="400110"/>
+          </a:xfrm>
+          <a:prstGeom prst="rect">
+            <a:avLst/>
+          </a:prstGeom>
+          <a:noFill/>
+        </p:spPr>
+        <p:txBody>
+          <a:bodyPr wrap="square" rtlCol="0">
+            <a:spAutoFit/>
+          </a:bodyPr>
+          <a:lstStyle/>
+          <a:p>
+            <a:r>
+              <a:rPr lang="es-BO" sz="2000" dirty="0"/>
+              <a:t>Es importante en la actualidad que los esfuerzos de comunicación de una empresa sean éticos. </a:t>
+            </a:r>
+            <a:endParaRPr lang="es-ES" dirty="0"/>
+          </a:p>
+        </p:txBody>
+      </p:sp>
+      <p:sp>
+        <p:nvSpPr>
+          <p:cNvPr id="5" name="CuadroTexto 4">
+            <a:extLst>
+              <a:ext uri="{FF2B5EF4-FFF2-40B4-BE49-F238E27FC236}">
+                <a16:creationId xmlns:a16="http://schemas.microsoft.com/office/drawing/2014/main" id="{ADAEB2FB-EFA6-D33B-0F00-66F8584D59CF}"/>
+              </a:ext>
+            </a:extLst>
+          </p:cNvPr>
+          <p:cNvSpPr txBox="1"/>
+          <p:nvPr/>
+        </p:nvSpPr>
+        <p:spPr>
+          <a:xfrm>
+            <a:off x="881575" y="2692287"/>
+            <a:ext cx="5838093" cy="3477875"/>
+          </a:xfrm>
+          <a:prstGeom prst="rect">
+            <a:avLst/>
+          </a:prstGeom>
+          <a:noFill/>
+        </p:spPr>
+        <p:txBody>
+          <a:bodyPr wrap="square" rtlCol="0">
+            <a:spAutoFit/>
+          </a:bodyPr>
+          <a:lstStyle/>
+          <a:p>
+            <a:r>
+              <a:rPr lang="es-BO" sz="2000" dirty="0"/>
+              <a:t>La comunicación ética abarca toda la información relevante que es verdadera en todos los sentidos y no engañosa en ninguna forma. Por otra parte, la comunicación antiética suele distorsionar la verdad o manipular a las audiencias. Algunas maneras en que las empresas se comunican de manera antiética son cuando omiten la información esencial. </a:t>
+            </a:r>
+          </a:p>
+          <a:p>
+            <a:endParaRPr lang="es-BO" sz="2000" dirty="0"/>
+          </a:p>
+          <a:p>
+            <a:r>
+              <a:rPr lang="es-BO" sz="2000" dirty="0"/>
+              <a:t>Por ejemplo: no decir a los empleados que algunos de ellos perderán su trabajo por una fusión inminente es una comunicación antiética.</a:t>
+            </a:r>
+            <a:endParaRPr lang="es-ES" sz="2000" dirty="0"/>
+          </a:p>
+        </p:txBody>
+      </p:sp>
+      <p:pic>
+        <p:nvPicPr>
+          <p:cNvPr id="8" name="Imagen 7">
+            <a:extLst>
+              <a:ext uri="{FF2B5EF4-FFF2-40B4-BE49-F238E27FC236}">
+                <a16:creationId xmlns:a16="http://schemas.microsoft.com/office/drawing/2014/main" id="{C75937A8-3F02-2D18-7CA9-0085D51BE6DD}"/>
+              </a:ext>
+            </a:extLst>
+          </p:cNvPr>
+          <p:cNvPicPr>
+            <a:picLocks noChangeAspect="1"/>
+          </p:cNvPicPr>
+          <p:nvPr/>
+        </p:nvPicPr>
+        <p:blipFill>
+          <a:blip r:embed="rId2"/>
+          <a:stretch>
+            <a:fillRect/>
+          </a:stretch>
+        </p:blipFill>
+        <p:spPr>
+          <a:xfrm>
+            <a:off x="7078787" y="2692287"/>
+            <a:ext cx="3942660" cy="3477875"/>
+          </a:xfrm>
+          <a:prstGeom prst="rect">
+            <a:avLst/>
+          </a:prstGeom>
+        </p:spPr>
+      </p:pic>
+    </p:spTree>
+    <p:extLst>
+      <p:ext uri="{BB962C8B-B14F-4D97-AF65-F5344CB8AC3E}">
+        <p14:creationId xmlns:p14="http://schemas.microsoft.com/office/powerpoint/2010/main" val="2786554904"/>
+      </p:ext>
+    </p:extLst>
+  </p:cSld>
+  <p:clrMapOvr>
+    <a:masterClrMapping/>
+  </p:clrMapOvr>
+</p:sld>
+</file>
+
+<file path=ppt/slides/slide23.xml><?xml version="1.0" encoding="utf-8"?>
+<p:sld xmlns:a="http://schemas.openxmlformats.org/drawingml/2006/main" xmlns:r="http://schemas.openxmlformats.org/officeDocument/2006/relationships" xmlns:p="http://schemas.openxmlformats.org/presentationml/2006/main">
+  <p:cSld>
+    <p:spTree>
+      <p:nvGrpSpPr>
+        <p:cNvPr id="1" name=""/>
+        <p:cNvGrpSpPr/>
+        <p:nvPr/>
+      </p:nvGrpSpPr>
+      <p:grpSpPr>
+        <a:xfrm>
+          <a:off x="0" y="0"/>
+          <a:ext cx="0" cy="0"/>
+          <a:chOff x="0" y="0"/>
+          <a:chExt cx="0" cy="0"/>
+        </a:xfrm>
+      </p:grpSpPr>
+      <p:sp>
+        <p:nvSpPr>
+          <p:cNvPr id="2" name="Título 1">
+            <a:extLst>
+              <a:ext uri="{FF2B5EF4-FFF2-40B4-BE49-F238E27FC236}">
+                <a16:creationId xmlns:a16="http://schemas.microsoft.com/office/drawing/2014/main" id="{E28CA087-FA30-60BE-45DB-5FAAAEE20665}"/>
+              </a:ext>
+            </a:extLst>
+          </p:cNvPr>
+          <p:cNvSpPr>
+            <a:spLocks noGrp="1"/>
+          </p:cNvSpPr>
+          <p:nvPr>
+            <p:ph type="title"/>
+          </p:nvPr>
+        </p:nvSpPr>
+        <p:spPr>
+          <a:xfrm>
+            <a:off x="994117" y="964692"/>
+            <a:ext cx="10203766" cy="793770"/>
+          </a:xfrm>
+        </p:spPr>
+        <p:txBody>
+          <a:bodyPr>
+            <a:normAutofit/>
+          </a:bodyPr>
+          <a:lstStyle/>
+          <a:p>
+            <a:endParaRPr lang="es-BO" b="1" dirty="0"/>
+          </a:p>
+        </p:txBody>
+      </p:sp>
+      <p:sp>
+        <p:nvSpPr>
+          <p:cNvPr id="7" name="CuadroTexto 6">
+            <a:extLst>
+              <a:ext uri="{FF2B5EF4-FFF2-40B4-BE49-F238E27FC236}">
+                <a16:creationId xmlns:a16="http://schemas.microsoft.com/office/drawing/2014/main" id="{9754003E-35C5-D223-5F22-3C71D7660B60}"/>
+              </a:ext>
+            </a:extLst>
+          </p:cNvPr>
+          <p:cNvSpPr txBox="1"/>
+          <p:nvPr/>
+        </p:nvSpPr>
+        <p:spPr>
+          <a:xfrm>
+            <a:off x="6452382" y="2037591"/>
+            <a:ext cx="3282462" cy="1200329"/>
+          </a:xfrm>
+          <a:prstGeom prst="rect">
+            <a:avLst/>
+          </a:prstGeom>
+          <a:noFill/>
+        </p:spPr>
+        <p:txBody>
+          <a:bodyPr wrap="square" rtlCol="0">
+            <a:spAutoFit/>
+          </a:bodyPr>
+          <a:lstStyle/>
+          <a:p>
+            <a:br>
+              <a:rPr lang="es-BO" dirty="0"/>
+            </a:br>
+            <a:br>
+              <a:rPr lang="es-BO" dirty="0"/>
+            </a:br>
+            <a:endParaRPr lang="es-BO" dirty="0"/>
+          </a:p>
+          <a:p>
+            <a:endParaRPr lang="es-ES" dirty="0"/>
+          </a:p>
+        </p:txBody>
+      </p:sp>
+      <p:pic>
+        <p:nvPicPr>
+          <p:cNvPr id="2052" name="Picture 4" descr="Colección De Dibujos De Helado Vector Dibujado Mano Linda. Conos Y Helados  De Diferentes Sabores Hechas En El Estilo De Dibujo. Ilustraciones Svg,  Vectoriales, Clip Art Vectorizado Libre De Derechos. Image 38006136.">
+            <a:extLst>
+              <a:ext uri="{FF2B5EF4-FFF2-40B4-BE49-F238E27FC236}">
+                <a16:creationId xmlns:a16="http://schemas.microsoft.com/office/drawing/2014/main" id="{EB583C3C-09E9-929B-6621-A8032C8577CA}"/>
+              </a:ext>
+            </a:extLst>
+          </p:cNvPr>
+          <p:cNvPicPr>
+            <a:picLocks noChangeAspect="1" noChangeArrowheads="1"/>
+          </p:cNvPicPr>
+          <p:nvPr/>
+        </p:nvPicPr>
+        <p:blipFill>
+          <a:blip r:embed="rId2">
+            <a:extLst>
+              <a:ext uri="{28A0092B-C50C-407E-A947-70E740481C1C}">
+                <a14:useLocalDpi xmlns:a14="http://schemas.microsoft.com/office/drawing/2010/main" val="0"/>
+              </a:ext>
+            </a:extLst>
+          </a:blip>
+          <a:srcRect/>
+          <a:stretch>
+            <a:fillRect/>
+          </a:stretch>
+        </p:blipFill>
+        <p:spPr bwMode="auto">
+          <a:xfrm>
+            <a:off x="1780736" y="2037591"/>
+            <a:ext cx="3749040" cy="3749040"/>
+          </a:xfrm>
+          <a:prstGeom prst="rect">
+            <a:avLst/>
+          </a:prstGeom>
+          <a:noFill/>
+          <a:extLst>
+            <a:ext uri="{909E8E84-426E-40DD-AFC4-6F175D3DCCD1}">
+              <a14:hiddenFill xmlns:a14="http://schemas.microsoft.com/office/drawing/2010/main">
+                <a:solidFill>
+                  <a:srgbClr val="FFFFFF"/>
+                </a:solidFill>
+              </a14:hiddenFill>
+            </a:ext>
+          </a:extLst>
+        </p:spPr>
+      </p:pic>
+    </p:spTree>
+    <p:extLst>
+      <p:ext uri="{BB962C8B-B14F-4D97-AF65-F5344CB8AC3E}">
+        <p14:creationId xmlns:p14="http://schemas.microsoft.com/office/powerpoint/2010/main" val="1216260591"/>
+      </p:ext>
+    </p:extLst>
+  </p:cSld>
+  <p:clrMapOvr>
+    <a:masterClrMapping/>
+  </p:clrMapOvr>
+</p:sld>
+</file>
+
+<file path=ppt/slides/slide24.xml><?xml version="1.0" encoding="utf-8"?>
+<p:sld xmlns:a="http://schemas.openxmlformats.org/drawingml/2006/main" xmlns:r="http://schemas.openxmlformats.org/officeDocument/2006/relationships" xmlns:p="http://schemas.openxmlformats.org/presentationml/2006/main">
+  <p:cSld>
+    <p:spTree>
+      <p:nvGrpSpPr>
+        <p:cNvPr id="1" name=""/>
+        <p:cNvGrpSpPr/>
+        <p:nvPr/>
+      </p:nvGrpSpPr>
+      <p:grpSpPr>
+        <a:xfrm>
+          <a:off x="0" y="0"/>
+          <a:ext cx="0" cy="0"/>
+          <a:chOff x="0" y="0"/>
+          <a:chExt cx="0" cy="0"/>
+        </a:xfrm>
+      </p:grpSpPr>
+      <p:sp>
+        <p:nvSpPr>
+          <p:cNvPr id="2" name="Título 1">
+            <a:extLst>
+              <a:ext uri="{FF2B5EF4-FFF2-40B4-BE49-F238E27FC236}">
+                <a16:creationId xmlns:a16="http://schemas.microsoft.com/office/drawing/2014/main" id="{E28CA087-FA30-60BE-45DB-5FAAAEE20665}"/>
+              </a:ext>
+            </a:extLst>
+          </p:cNvPr>
+          <p:cNvSpPr>
+            <a:spLocks noGrp="1"/>
+          </p:cNvSpPr>
+          <p:nvPr>
+            <p:ph type="title"/>
+          </p:nvPr>
+        </p:nvSpPr>
+        <p:spPr>
+          <a:xfrm>
+            <a:off x="994117" y="964692"/>
+            <a:ext cx="10203766" cy="793770"/>
+          </a:xfrm>
+        </p:spPr>
+        <p:txBody>
+          <a:bodyPr>
+            <a:normAutofit/>
+          </a:bodyPr>
+          <a:lstStyle/>
+          <a:p>
+            <a:endParaRPr lang="es-BO" b="1" dirty="0"/>
+          </a:p>
+        </p:txBody>
+      </p:sp>
+      <p:sp>
+        <p:nvSpPr>
+          <p:cNvPr id="7" name="CuadroTexto 6">
+            <a:extLst>
+              <a:ext uri="{FF2B5EF4-FFF2-40B4-BE49-F238E27FC236}">
+                <a16:creationId xmlns:a16="http://schemas.microsoft.com/office/drawing/2014/main" id="{9754003E-35C5-D223-5F22-3C71D7660B60}"/>
+              </a:ext>
+            </a:extLst>
+          </p:cNvPr>
+          <p:cNvSpPr txBox="1"/>
+          <p:nvPr/>
+        </p:nvSpPr>
+        <p:spPr>
+          <a:xfrm>
+            <a:off x="1092592" y="2121997"/>
+            <a:ext cx="5913120" cy="1200329"/>
+          </a:xfrm>
+          <a:prstGeom prst="rect">
+            <a:avLst/>
+          </a:prstGeom>
+          <a:noFill/>
+        </p:spPr>
+        <p:txBody>
+          <a:bodyPr wrap="square" rtlCol="0">
+            <a:spAutoFit/>
+          </a:bodyPr>
+          <a:lstStyle/>
+          <a:p>
+            <a:br>
+              <a:rPr lang="es-BO" dirty="0"/>
+            </a:br>
+            <a:br>
+              <a:rPr lang="es-BO" dirty="0"/>
+            </a:br>
+            <a:endParaRPr lang="es-BO" dirty="0"/>
+          </a:p>
+          <a:p>
+            <a:endParaRPr lang="es-ES" dirty="0"/>
+          </a:p>
+        </p:txBody>
+      </p:sp>
+      <p:pic>
+        <p:nvPicPr>
+          <p:cNvPr id="3074" name="Picture 2" descr="Creating A Positive Workplace Culture - A Little Kindness Goes A Long Way |  HuffPost Contributor">
+            <a:extLst>
+              <a:ext uri="{FF2B5EF4-FFF2-40B4-BE49-F238E27FC236}">
+                <a16:creationId xmlns:a16="http://schemas.microsoft.com/office/drawing/2014/main" id="{7B2013D5-DA9D-56AF-0DD4-4F5F846CFD41}"/>
+              </a:ext>
+            </a:extLst>
+          </p:cNvPr>
+          <p:cNvPicPr>
+            <a:picLocks noChangeAspect="1" noChangeArrowheads="1"/>
+          </p:cNvPicPr>
+          <p:nvPr/>
+        </p:nvPicPr>
+        <p:blipFill>
+          <a:blip r:embed="rId2">
+            <a:extLst>
+              <a:ext uri="{28A0092B-C50C-407E-A947-70E740481C1C}">
+                <a14:useLocalDpi xmlns:a14="http://schemas.microsoft.com/office/drawing/2010/main" val="0"/>
+              </a:ext>
+            </a:extLst>
+          </a:blip>
+          <a:srcRect/>
+          <a:stretch>
+            <a:fillRect/>
+          </a:stretch>
+        </p:blipFill>
+        <p:spPr bwMode="auto">
+          <a:xfrm>
+            <a:off x="7162874" y="2121998"/>
+            <a:ext cx="4354655" cy="2977542"/>
+          </a:xfrm>
+          <a:prstGeom prst="rect">
+            <a:avLst/>
+          </a:prstGeom>
+          <a:noFill/>
+          <a:extLst>
+            <a:ext uri="{909E8E84-426E-40DD-AFC4-6F175D3DCCD1}">
+              <a14:hiddenFill xmlns:a14="http://schemas.microsoft.com/office/drawing/2010/main">
+                <a:solidFill>
+                  <a:srgbClr val="FFFFFF"/>
+                </a:solidFill>
+              </a14:hiddenFill>
+            </a:ext>
+          </a:extLst>
+        </p:spPr>
+      </p:pic>
+    </p:spTree>
+    <p:extLst>
+      <p:ext uri="{BB962C8B-B14F-4D97-AF65-F5344CB8AC3E}">
+        <p14:creationId xmlns:p14="http://schemas.microsoft.com/office/powerpoint/2010/main" val="1504539169"/>
+      </p:ext>
+    </p:extLst>
+  </p:cSld>
+  <p:clrMapOvr>
+    <a:masterClrMapping/>
+  </p:clrMapOvr>
+</p:sld>
+</file>
+
+<file path=ppt/slides/slide25.xml><?xml version="1.0" encoding="utf-8"?>
+<p:sld xmlns:a="http://schemas.openxmlformats.org/drawingml/2006/main" xmlns:r="http://schemas.openxmlformats.org/officeDocument/2006/relationships" xmlns:p="http://schemas.openxmlformats.org/presentationml/2006/main">
+  <p:cSld>
+    <p:spTree>
+      <p:nvGrpSpPr>
+        <p:cNvPr id="1" name=""/>
+        <p:cNvGrpSpPr/>
+        <p:nvPr/>
+      </p:nvGrpSpPr>
+      <p:grpSpPr>
+        <a:xfrm>
+          <a:off x="0" y="0"/>
+          <a:ext cx="0" cy="0"/>
+          <a:chOff x="0" y="0"/>
+          <a:chExt cx="0" cy="0"/>
+        </a:xfrm>
+      </p:grpSpPr>
+      <p:sp>
+        <p:nvSpPr>
+          <p:cNvPr id="2" name="Título 1">
+            <a:extLst>
+              <a:ext uri="{FF2B5EF4-FFF2-40B4-BE49-F238E27FC236}">
+                <a16:creationId xmlns:a16="http://schemas.microsoft.com/office/drawing/2014/main" id="{E28CA087-FA30-60BE-45DB-5FAAAEE20665}"/>
+              </a:ext>
+            </a:extLst>
+          </p:cNvPr>
+          <p:cNvSpPr>
+            <a:spLocks noGrp="1"/>
+          </p:cNvSpPr>
+          <p:nvPr>
+            <p:ph type="title"/>
+          </p:nvPr>
+        </p:nvSpPr>
+        <p:spPr>
+          <a:xfrm>
+            <a:off x="994117" y="964692"/>
+            <a:ext cx="10203766" cy="793770"/>
+          </a:xfrm>
+        </p:spPr>
+        <p:txBody>
+          <a:bodyPr/>
+          <a:lstStyle/>
+          <a:p>
+            <a:r>
+              <a:rPr lang="es-BO" b="1" dirty="0"/>
+              <a:t>5.	CONTROL</a:t>
+            </a:r>
+          </a:p>
+        </p:txBody>
+      </p:sp>
+      <p:sp>
+        <p:nvSpPr>
+          <p:cNvPr id="3" name="Marcador de contenido 2">
+            <a:extLst>
+              <a:ext uri="{FF2B5EF4-FFF2-40B4-BE49-F238E27FC236}">
+                <a16:creationId xmlns:a16="http://schemas.microsoft.com/office/drawing/2014/main" id="{A03F4793-332F-447C-FEBA-8C99D67BE98B}"/>
+              </a:ext>
+            </a:extLst>
+          </p:cNvPr>
+          <p:cNvSpPr>
+            <a:spLocks noGrp="1"/>
+          </p:cNvSpPr>
+          <p:nvPr>
+            <p:ph idx="1"/>
+          </p:nvPr>
+        </p:nvSpPr>
+        <p:spPr>
+          <a:xfrm>
+            <a:off x="994117" y="1941342"/>
+            <a:ext cx="10203766" cy="3798685"/>
+          </a:xfrm>
+        </p:spPr>
+        <p:txBody>
+          <a:bodyPr/>
+          <a:lstStyle/>
+          <a:p>
+            <a:endParaRPr lang="es-BO" dirty="0"/>
+          </a:p>
+        </p:txBody>
+      </p:sp>
+    </p:spTree>
+    <p:extLst>
+      <p:ext uri="{BB962C8B-B14F-4D97-AF65-F5344CB8AC3E}">
+        <p14:creationId xmlns:p14="http://schemas.microsoft.com/office/powerpoint/2010/main" val="2018762944"/>
+      </p:ext>
+    </p:extLst>
+  </p:cSld>
+  <p:clrMapOvr>
+    <a:masterClrMapping/>
+  </p:clrMapOvr>
+</p:sld>
+</file>
+
+<file path=ppt/slides/slide26.xml><?xml version="1.0" encoding="utf-8"?>
 <p:sld xmlns:a="http://schemas.openxmlformats.org/drawingml/2006/main" xmlns:r="http://schemas.openxmlformats.org/officeDocument/2006/relationships" xmlns:p="http://schemas.openxmlformats.org/presentationml/2006/main">
   <p:cSld>
     <p:spTree>

</xml_diff>